<commit_message>
Veriage change; new slide for introduction
</commit_message>
<xml_diff>
--- a/Presentation/Database-Bootcamp-Presentation.pptx
+++ b/Presentation/Database-Bootcamp-Presentation.pptx
@@ -7,8 +7,10 @@
   <p:sldIdLst>
     <p:sldId id="256" r:id="rId2"/>
     <p:sldId id="257" r:id="rId3"/>
-    <p:sldId id="258" r:id="rId4"/>
-    <p:sldId id="259" r:id="rId5"/>
+    <p:sldId id="260" r:id="rId4"/>
+    <p:sldId id="258" r:id="rId5"/>
+    <p:sldId id="259" r:id="rId6"/>
+    <p:sldId id="261" r:id="rId7"/>
   </p:sldIdLst>
   <p:sldSz cx="12192000" cy="6858000"/>
   <p:notesSz cx="6858000" cy="9144000"/>
@@ -107,6 +109,11 @@
       </a:defRPr>
     </a:lvl9pPr>
   </p:defaultTextStyle>
+  <p:extLst>
+    <p:ext uri="{EFAFB233-063F-42B5-8137-9DF3F51BA10A}">
+      <p15:sldGuideLst xmlns:p15="http://schemas.microsoft.com/office/powerpoint/2012/main"/>
+    </p:ext>
+  </p:extLst>
 </p:presentation>
 </file>
 
@@ -296,7 +303,7 @@
           <a:p>
             <a:fld id="{9DC1F441-9BCC-4383-B80D-68C31DF95A71}" type="datetimeFigureOut">
               <a:rPr lang="en-US" smtClean="0"/>
-              <a:t>1/2/2016</a:t>
+              <a:t>1/3/2016</a:t>
             </a:fld>
             <a:endParaRPr lang="en-US"/>
           </a:p>
@@ -576,7 +583,7 @@
           <a:p>
             <a:fld id="{9DC1F441-9BCC-4383-B80D-68C31DF95A71}" type="datetimeFigureOut">
               <a:rPr lang="en-US" smtClean="0"/>
-              <a:t>1/2/2016</a:t>
+              <a:t>1/3/2016</a:t>
             </a:fld>
             <a:endParaRPr lang="en-US"/>
           </a:p>
@@ -770,7 +777,7 @@
           <a:p>
             <a:fld id="{9DC1F441-9BCC-4383-B80D-68C31DF95A71}" type="datetimeFigureOut">
               <a:rPr lang="en-US" smtClean="0"/>
-              <a:t>1/2/2016</a:t>
+              <a:t>1/3/2016</a:t>
             </a:fld>
             <a:endParaRPr lang="en-US"/>
           </a:p>
@@ -1043,7 +1050,7 @@
           <a:p>
             <a:fld id="{9DC1F441-9BCC-4383-B80D-68C31DF95A71}" type="datetimeFigureOut">
               <a:rPr lang="en-US" smtClean="0"/>
-              <a:t>1/2/2016</a:t>
+              <a:t>1/3/2016</a:t>
             </a:fld>
             <a:endParaRPr lang="en-US"/>
           </a:p>
@@ -1384,7 +1391,7 @@
           <a:p>
             <a:fld id="{9DC1F441-9BCC-4383-B80D-68C31DF95A71}" type="datetimeFigureOut">
               <a:rPr lang="en-US" smtClean="0"/>
-              <a:t>1/2/2016</a:t>
+              <a:t>1/3/2016</a:t>
             </a:fld>
             <a:endParaRPr lang="en-US"/>
           </a:p>
@@ -2007,7 +2014,7 @@
           <a:p>
             <a:fld id="{9DC1F441-9BCC-4383-B80D-68C31DF95A71}" type="datetimeFigureOut">
               <a:rPr lang="en-US" smtClean="0"/>
-              <a:t>1/2/2016</a:t>
+              <a:t>1/3/2016</a:t>
             </a:fld>
             <a:endParaRPr lang="en-US"/>
           </a:p>
@@ -2867,7 +2874,7 @@
           <a:p>
             <a:fld id="{9DC1F441-9BCC-4383-B80D-68C31DF95A71}" type="datetimeFigureOut">
               <a:rPr lang="en-US" smtClean="0"/>
-              <a:t>1/2/2016</a:t>
+              <a:t>1/3/2016</a:t>
             </a:fld>
             <a:endParaRPr lang="en-US"/>
           </a:p>
@@ -3037,7 +3044,7 @@
           <a:p>
             <a:fld id="{9DC1F441-9BCC-4383-B80D-68C31DF95A71}" type="datetimeFigureOut">
               <a:rPr lang="en-US" smtClean="0"/>
-              <a:t>1/2/2016</a:t>
+              <a:t>1/3/2016</a:t>
             </a:fld>
             <a:endParaRPr lang="en-US"/>
           </a:p>
@@ -3217,7 +3224,7 @@
           <a:p>
             <a:fld id="{9DC1F441-9BCC-4383-B80D-68C31DF95A71}" type="datetimeFigureOut">
               <a:rPr lang="en-US" smtClean="0"/>
-              <a:t>1/2/2016</a:t>
+              <a:t>1/3/2016</a:t>
             </a:fld>
             <a:endParaRPr lang="en-US"/>
           </a:p>
@@ -3392,7 +3399,7 @@
           <a:p>
             <a:fld id="{9DC1F441-9BCC-4383-B80D-68C31DF95A71}" type="datetimeFigureOut">
               <a:rPr lang="en-US" smtClean="0"/>
-              <a:t>1/2/2016</a:t>
+              <a:t>1/3/2016</a:t>
             </a:fld>
             <a:endParaRPr lang="en-US"/>
           </a:p>
@@ -3639,7 +3646,7 @@
           <a:p>
             <a:fld id="{9DC1F441-9BCC-4383-B80D-68C31DF95A71}" type="datetimeFigureOut">
               <a:rPr lang="en-US" smtClean="0"/>
-              <a:t>1/2/2016</a:t>
+              <a:t>1/3/2016</a:t>
             </a:fld>
             <a:endParaRPr lang="en-US"/>
           </a:p>
@@ -3936,7 +3943,7 @@
           <a:p>
             <a:fld id="{9DC1F441-9BCC-4383-B80D-68C31DF95A71}" type="datetimeFigureOut">
               <a:rPr lang="en-US" smtClean="0"/>
-              <a:t>1/2/2016</a:t>
+              <a:t>1/3/2016</a:t>
             </a:fld>
             <a:endParaRPr lang="en-US"/>
           </a:p>
@@ -4380,7 +4387,7 @@
           <a:p>
             <a:fld id="{9DC1F441-9BCC-4383-B80D-68C31DF95A71}" type="datetimeFigureOut">
               <a:rPr lang="en-US" smtClean="0"/>
-              <a:t>1/2/2016</a:t>
+              <a:t>1/3/2016</a:t>
             </a:fld>
             <a:endParaRPr lang="en-US"/>
           </a:p>
@@ -4498,7 +4505,7 @@
           <a:p>
             <a:fld id="{9DC1F441-9BCC-4383-B80D-68C31DF95A71}" type="datetimeFigureOut">
               <a:rPr lang="en-US" smtClean="0"/>
-              <a:t>1/2/2016</a:t>
+              <a:t>1/3/2016</a:t>
             </a:fld>
             <a:endParaRPr lang="en-US"/>
           </a:p>
@@ -4593,7 +4600,7 @@
           <a:p>
             <a:fld id="{9DC1F441-9BCC-4383-B80D-68C31DF95A71}" type="datetimeFigureOut">
               <a:rPr lang="en-US" smtClean="0"/>
-              <a:t>1/2/2016</a:t>
+              <a:t>1/3/2016</a:t>
             </a:fld>
             <a:endParaRPr lang="en-US"/>
           </a:p>
@@ -4877,7 +4884,7 @@
           <a:p>
             <a:fld id="{9DC1F441-9BCC-4383-B80D-68C31DF95A71}" type="datetimeFigureOut">
               <a:rPr lang="en-US" smtClean="0"/>
-              <a:t>1/2/2016</a:t>
+              <a:t>1/3/2016</a:t>
             </a:fld>
             <a:endParaRPr lang="en-US"/>
           </a:p>
@@ -5157,7 +5164,7 @@
           <a:p>
             <a:fld id="{9DC1F441-9BCC-4383-B80D-68C31DF95A71}" type="datetimeFigureOut">
               <a:rPr lang="en-US" smtClean="0"/>
-              <a:t>1/2/2016</a:t>
+              <a:t>1/3/2016</a:t>
             </a:fld>
             <a:endParaRPr lang="en-US"/>
           </a:p>
@@ -5586,7 +5593,7 @@
           <a:p>
             <a:fld id="{9DC1F441-9BCC-4383-B80D-68C31DF95A71}" type="datetimeFigureOut">
               <a:rPr lang="en-US" smtClean="0"/>
-              <a:t>1/2/2016</a:t>
+              <a:t>1/3/2016</a:t>
             </a:fld>
             <a:endParaRPr lang="en-US"/>
           </a:p>
@@ -6269,7 +6276,11 @@
             <a:pPr lvl="1"/>
             <a:r>
               <a:rPr lang="en-US" dirty="0" smtClean="0"/>
-              <a:t>Take away from this </a:t>
+              <a:t>Expectations from </a:t>
+            </a:r>
+            <a:r>
+              <a:rPr lang="en-US" dirty="0" smtClean="0"/>
+              <a:t>this </a:t>
             </a:r>
             <a:r>
               <a:rPr lang="en-US" dirty="0" err="1" smtClean="0"/>
@@ -6326,7 +6337,7 @@
           <a:p>
             <a:r>
               <a:rPr lang="en-US" dirty="0" smtClean="0"/>
-              <a:t>DB in daily use</a:t>
+              <a:t>Lets start!</a:t>
             </a:r>
             <a:endParaRPr lang="en-US" dirty="0"/>
           </a:p>
@@ -6349,60 +6360,28 @@
           <a:p>
             <a:r>
               <a:rPr lang="en-US" dirty="0" smtClean="0"/>
-              <a:t>Search engines</a:t>
+              <a:t>DB around us</a:t>
             </a:r>
           </a:p>
           <a:p>
             <a:r>
               <a:rPr lang="en-US" dirty="0" smtClean="0"/>
-              <a:t>Android/iOS</a:t>
+              <a:t>Why MySQL</a:t>
             </a:r>
           </a:p>
           <a:p>
             <a:r>
               <a:rPr lang="en-US" dirty="0" smtClean="0"/>
-              <a:t>Browsers</a:t>
-            </a:r>
-          </a:p>
-          <a:p>
-            <a:r>
-              <a:rPr lang="en-US" dirty="0" smtClean="0"/>
-              <a:t>Excel/Access</a:t>
-            </a:r>
-          </a:p>
-          <a:p>
-            <a:r>
-              <a:rPr lang="en-US" dirty="0" smtClean="0"/>
-              <a:t>Email systems</a:t>
-            </a:r>
-          </a:p>
-          <a:p>
-            <a:r>
-              <a:rPr lang="en-US" dirty="0" smtClean="0"/>
-              <a:t>Social media</a:t>
-            </a:r>
-          </a:p>
-          <a:p>
-            <a:pPr marL="0" indent="0">
-              <a:buNone/>
-            </a:pPr>
+              <a:t>Let’s install MySQL!</a:t>
+            </a:r>
             <a:endParaRPr lang="en-US" dirty="0"/>
-          </a:p>
-          <a:p>
-            <a:pPr marL="0" indent="0">
-              <a:buNone/>
-            </a:pPr>
-            <a:r>
-              <a:rPr lang="en-US" dirty="0" smtClean="0"/>
-              <a:t>Many products that we use today store data in databases. It’s all around us.</a:t>
-            </a:r>
           </a:p>
         </p:txBody>
       </p:sp>
     </p:spTree>
     <p:extLst>
       <p:ext uri="{BB962C8B-B14F-4D97-AF65-F5344CB8AC3E}">
-        <p14:creationId xmlns:p14="http://schemas.microsoft.com/office/powerpoint/2010/main" val="3118407676"/>
+        <p14:creationId xmlns:p14="http://schemas.microsoft.com/office/powerpoint/2010/main" val="2124208653"/>
       </p:ext>
     </p:extLst>
   </p:cSld>
@@ -6446,7 +6425,127 @@
           <a:p>
             <a:r>
               <a:rPr lang="en-US" dirty="0" smtClean="0"/>
-              <a:t>MySQL</a:t>
+              <a:t>DB in daily use</a:t>
+            </a:r>
+            <a:endParaRPr lang="en-US" dirty="0"/>
+          </a:p>
+        </p:txBody>
+      </p:sp>
+      <p:sp>
+        <p:nvSpPr>
+          <p:cNvPr id="3" name="Content Placeholder 2"/>
+          <p:cNvSpPr>
+            <a:spLocks noGrp="1"/>
+          </p:cNvSpPr>
+          <p:nvPr>
+            <p:ph idx="1"/>
+          </p:nvPr>
+        </p:nvSpPr>
+        <p:spPr/>
+        <p:txBody>
+          <a:bodyPr/>
+          <a:lstStyle/>
+          <a:p>
+            <a:r>
+              <a:rPr lang="en-US" dirty="0" smtClean="0"/>
+              <a:t>Search engines</a:t>
+            </a:r>
+          </a:p>
+          <a:p>
+            <a:r>
+              <a:rPr lang="en-US" dirty="0" smtClean="0"/>
+              <a:t>Android/iOS</a:t>
+            </a:r>
+          </a:p>
+          <a:p>
+            <a:r>
+              <a:rPr lang="en-US" dirty="0" smtClean="0"/>
+              <a:t>Browsers</a:t>
+            </a:r>
+          </a:p>
+          <a:p>
+            <a:r>
+              <a:rPr lang="en-US" dirty="0" smtClean="0"/>
+              <a:t>Excel/Access</a:t>
+            </a:r>
+          </a:p>
+          <a:p>
+            <a:r>
+              <a:rPr lang="en-US" dirty="0" smtClean="0"/>
+              <a:t>Email systems</a:t>
+            </a:r>
+          </a:p>
+          <a:p>
+            <a:r>
+              <a:rPr lang="en-US" dirty="0" smtClean="0"/>
+              <a:t>Social media</a:t>
+            </a:r>
+          </a:p>
+          <a:p>
+            <a:pPr marL="0" indent="0">
+              <a:buNone/>
+            </a:pPr>
+            <a:endParaRPr lang="en-US" dirty="0"/>
+          </a:p>
+          <a:p>
+            <a:pPr marL="0" indent="0">
+              <a:buNone/>
+            </a:pPr>
+            <a:r>
+              <a:rPr lang="en-US" dirty="0" smtClean="0"/>
+              <a:t>Many products that we use today store data in databases. It’s all around us.</a:t>
+            </a:r>
+          </a:p>
+        </p:txBody>
+      </p:sp>
+    </p:spTree>
+    <p:extLst>
+      <p:ext uri="{BB962C8B-B14F-4D97-AF65-F5344CB8AC3E}">
+        <p14:creationId xmlns:p14="http://schemas.microsoft.com/office/powerpoint/2010/main" val="3118407676"/>
+      </p:ext>
+    </p:extLst>
+  </p:cSld>
+  <p:clrMapOvr>
+    <a:masterClrMapping/>
+  </p:clrMapOvr>
+</p:sld>
+</file>
+
+<file path=ppt/slides/slide5.xml><?xml version="1.0" encoding="utf-8"?>
+<p:sld xmlns:a="http://schemas.openxmlformats.org/drawingml/2006/main" xmlns:r="http://schemas.openxmlformats.org/officeDocument/2006/relationships" xmlns:p="http://schemas.openxmlformats.org/presentationml/2006/main">
+  <p:cSld>
+    <p:spTree>
+      <p:nvGrpSpPr>
+        <p:cNvPr id="1" name=""/>
+        <p:cNvGrpSpPr/>
+        <p:nvPr/>
+      </p:nvGrpSpPr>
+      <p:grpSpPr>
+        <a:xfrm>
+          <a:off x="0" y="0"/>
+          <a:ext cx="0" cy="0"/>
+          <a:chOff x="0" y="0"/>
+          <a:chExt cx="0" cy="0"/>
+        </a:xfrm>
+      </p:grpSpPr>
+      <p:sp>
+        <p:nvSpPr>
+          <p:cNvPr id="2" name="Title 1"/>
+          <p:cNvSpPr>
+            <a:spLocks noGrp="1"/>
+          </p:cNvSpPr>
+          <p:nvPr>
+            <p:ph type="title"/>
+          </p:nvPr>
+        </p:nvSpPr>
+        <p:spPr/>
+        <p:txBody>
+          <a:bodyPr/>
+          <a:lstStyle/>
+          <a:p>
+            <a:r>
+              <a:rPr lang="en-US" dirty="0" smtClean="0"/>
+              <a:t>Why MySQL</a:t>
             </a:r>
             <a:endParaRPr lang="en-US" dirty="0"/>
           </a:p>
@@ -6487,7 +6586,17 @@
           <a:p>
             <a:r>
               <a:rPr lang="en-US" dirty="0" smtClean="0"/>
-              <a:t>Easily available</a:t>
+              <a:t>Easily </a:t>
+            </a:r>
+            <a:r>
+              <a:rPr lang="en-US" dirty="0" smtClean="0"/>
+              <a:t>available</a:t>
+            </a:r>
+          </a:p>
+          <a:p>
+            <a:r>
+              <a:rPr lang="en-US" dirty="0" smtClean="0"/>
+              <a:t>Great community support</a:t>
             </a:r>
             <a:endParaRPr lang="en-US" dirty="0"/>
           </a:p>
@@ -6497,6 +6606,85 @@
     <p:extLst>
       <p:ext uri="{BB962C8B-B14F-4D97-AF65-F5344CB8AC3E}">
         <p14:creationId xmlns:p14="http://schemas.microsoft.com/office/powerpoint/2010/main" val="451513678"/>
+      </p:ext>
+    </p:extLst>
+  </p:cSld>
+  <p:clrMapOvr>
+    <a:masterClrMapping/>
+  </p:clrMapOvr>
+</p:sld>
+</file>
+
+<file path=ppt/slides/slide6.xml><?xml version="1.0" encoding="utf-8"?>
+<p:sld xmlns:a="http://schemas.openxmlformats.org/drawingml/2006/main" xmlns:r="http://schemas.openxmlformats.org/officeDocument/2006/relationships" xmlns:p="http://schemas.openxmlformats.org/presentationml/2006/main">
+  <p:cSld>
+    <p:spTree>
+      <p:nvGrpSpPr>
+        <p:cNvPr id="1" name=""/>
+        <p:cNvGrpSpPr/>
+        <p:nvPr/>
+      </p:nvGrpSpPr>
+      <p:grpSpPr>
+        <a:xfrm>
+          <a:off x="0" y="0"/>
+          <a:ext cx="0" cy="0"/>
+          <a:chOff x="0" y="0"/>
+          <a:chExt cx="0" cy="0"/>
+        </a:xfrm>
+      </p:grpSpPr>
+      <p:sp>
+        <p:nvSpPr>
+          <p:cNvPr id="2" name="Title 1"/>
+          <p:cNvSpPr>
+            <a:spLocks noGrp="1"/>
+          </p:cNvSpPr>
+          <p:nvPr>
+            <p:ph type="title"/>
+          </p:nvPr>
+        </p:nvSpPr>
+        <p:spPr/>
+        <p:txBody>
+          <a:bodyPr/>
+          <a:lstStyle/>
+          <a:p>
+            <a:r>
+              <a:rPr lang="en-US" dirty="0" smtClean="0"/>
+              <a:t>Installing MySQL</a:t>
+            </a:r>
+            <a:endParaRPr lang="en-US" dirty="0"/>
+          </a:p>
+        </p:txBody>
+      </p:sp>
+      <p:sp>
+        <p:nvSpPr>
+          <p:cNvPr id="3" name="Content Placeholder 2"/>
+          <p:cNvSpPr>
+            <a:spLocks noGrp="1"/>
+          </p:cNvSpPr>
+          <p:nvPr>
+            <p:ph idx="1"/>
+          </p:nvPr>
+        </p:nvSpPr>
+        <p:spPr/>
+        <p:txBody>
+          <a:bodyPr/>
+          <a:lstStyle/>
+          <a:p>
+            <a:r>
+              <a:rPr lang="en-US" dirty="0" smtClean="0"/>
+              <a:t>http</a:t>
+            </a:r>
+            <a:r>
+              <a:rPr lang="en-US" dirty="0"/>
+              <a:t>://zedfox.us/index.php/2016/01/install-mysql-5-7-on-windows-10/</a:t>
+            </a:r>
+          </a:p>
+        </p:txBody>
+      </p:sp>
+    </p:spTree>
+    <p:extLst>
+      <p:ext uri="{BB962C8B-B14F-4D97-AF65-F5344CB8AC3E}">
+        <p14:creationId xmlns:p14="http://schemas.microsoft.com/office/powerpoint/2010/main" val="1321342305"/>
       </p:ext>
     </p:extLst>
   </p:cSld>

</xml_diff>

<commit_message>
Day 2 slides included
</commit_message>
<xml_diff>
--- a/Presentation/Database-Bootcamp-Presentation.pptx
+++ b/Presentation/Database-Bootcamp-Presentation.pptx
@@ -6,11 +6,15 @@
   </p:sldMasterIdLst>
   <p:sldIdLst>
     <p:sldId id="256" r:id="rId2"/>
-    <p:sldId id="257" r:id="rId3"/>
-    <p:sldId id="260" r:id="rId4"/>
+    <p:sldId id="260" r:id="rId3"/>
+    <p:sldId id="257" r:id="rId4"/>
     <p:sldId id="258" r:id="rId5"/>
     <p:sldId id="259" r:id="rId6"/>
     <p:sldId id="261" r:id="rId7"/>
+    <p:sldId id="262" r:id="rId8"/>
+    <p:sldId id="263" r:id="rId9"/>
+    <p:sldId id="264" r:id="rId10"/>
+    <p:sldId id="265" r:id="rId11"/>
   </p:sldIdLst>
   <p:sldSz cx="12192000" cy="6858000"/>
   <p:notesSz cx="6858000" cy="9144000"/>
@@ -6185,6 +6189,174 @@
 </p:sld>
 </file>
 
+<file path=ppt/slides/slide10.xml><?xml version="1.0" encoding="utf-8"?>
+<p:sld xmlns:a="http://schemas.openxmlformats.org/drawingml/2006/main" xmlns:r="http://schemas.openxmlformats.org/officeDocument/2006/relationships" xmlns:p="http://schemas.openxmlformats.org/presentationml/2006/main">
+  <p:cSld>
+    <p:spTree>
+      <p:nvGrpSpPr>
+        <p:cNvPr id="1" name=""/>
+        <p:cNvGrpSpPr/>
+        <p:nvPr/>
+      </p:nvGrpSpPr>
+      <p:grpSpPr>
+        <a:xfrm>
+          <a:off x="0" y="0"/>
+          <a:ext cx="0" cy="0"/>
+          <a:chOff x="0" y="0"/>
+          <a:chExt cx="0" cy="0"/>
+        </a:xfrm>
+      </p:grpSpPr>
+      <p:sp>
+        <p:nvSpPr>
+          <p:cNvPr id="2" name="Title 1"/>
+          <p:cNvSpPr>
+            <a:spLocks noGrp="1"/>
+          </p:cNvSpPr>
+          <p:nvPr>
+            <p:ph type="title"/>
+          </p:nvPr>
+        </p:nvSpPr>
+        <p:spPr/>
+        <p:txBody>
+          <a:bodyPr/>
+          <a:lstStyle/>
+          <a:p>
+            <a:r>
+              <a:rPr lang="en-US" dirty="0" smtClean="0"/>
+              <a:t>Database terminologies</a:t>
+            </a:r>
+            <a:endParaRPr lang="en-US" dirty="0"/>
+          </a:p>
+        </p:txBody>
+      </p:sp>
+      <p:sp>
+        <p:nvSpPr>
+          <p:cNvPr id="3" name="Content Placeholder 2"/>
+          <p:cNvSpPr>
+            <a:spLocks noGrp="1"/>
+          </p:cNvSpPr>
+          <p:nvPr>
+            <p:ph idx="1"/>
+          </p:nvPr>
+        </p:nvSpPr>
+        <p:spPr>
+          <a:xfrm>
+            <a:off x="1103312" y="2052918"/>
+            <a:ext cx="8946541" cy="4628298"/>
+          </a:xfrm>
+        </p:spPr>
+        <p:txBody>
+          <a:bodyPr/>
+          <a:lstStyle/>
+          <a:p>
+            <a:r>
+              <a:rPr lang="en-US" dirty="0"/>
+              <a:t>Server: Operating </a:t>
+            </a:r>
+            <a:r>
+              <a:rPr lang="en-US" dirty="0" smtClean="0"/>
+              <a:t>System (e.g. Windows/Linux)</a:t>
+            </a:r>
+            <a:endParaRPr lang="en-US" dirty="0"/>
+          </a:p>
+          <a:p>
+            <a:r>
+              <a:rPr lang="en-US" dirty="0"/>
+              <a:t>Server: Database </a:t>
+            </a:r>
+            <a:r>
+              <a:rPr lang="en-US" dirty="0" smtClean="0"/>
+              <a:t>server (e.g. MySQL)</a:t>
+            </a:r>
+            <a:endParaRPr lang="en-US" dirty="0"/>
+          </a:p>
+          <a:p>
+            <a:r>
+              <a:rPr lang="en-US" dirty="0"/>
+              <a:t>Database </a:t>
+            </a:r>
+            <a:r>
+              <a:rPr lang="en-US" dirty="0" smtClean="0"/>
+              <a:t>instance (e.g. MySQL57 service)</a:t>
+            </a:r>
+          </a:p>
+          <a:p>
+            <a:r>
+              <a:rPr lang="en-US" dirty="0" smtClean="0"/>
+              <a:t>Schema and schema objects </a:t>
+            </a:r>
+            <a:r>
+              <a:rPr lang="en-US" b="1" dirty="0" smtClean="0"/>
+              <a:t>(replication happens here)</a:t>
+            </a:r>
+          </a:p>
+          <a:p>
+            <a:endParaRPr lang="en-US" dirty="0"/>
+          </a:p>
+          <a:p>
+            <a:r>
+              <a:rPr lang="en-US" dirty="0" smtClean="0"/>
+              <a:t>SQL Server has:</a:t>
+            </a:r>
+          </a:p>
+          <a:p>
+            <a:pPr lvl="1"/>
+            <a:r>
+              <a:rPr lang="en-US" dirty="0" smtClean="0"/>
+              <a:t>OS</a:t>
+            </a:r>
+          </a:p>
+          <a:p>
+            <a:pPr lvl="1"/>
+            <a:r>
+              <a:rPr lang="en-US" dirty="0" smtClean="0"/>
+              <a:t>DB server</a:t>
+            </a:r>
+          </a:p>
+          <a:p>
+            <a:pPr lvl="1"/>
+            <a:r>
+              <a:rPr lang="en-US" dirty="0" smtClean="0"/>
+              <a:t>DB instance</a:t>
+            </a:r>
+          </a:p>
+          <a:p>
+            <a:pPr lvl="1"/>
+            <a:r>
+              <a:rPr lang="en-US" b="1" dirty="0" smtClean="0"/>
+              <a:t>Database name (notice this extra layer)</a:t>
+            </a:r>
+          </a:p>
+          <a:p>
+            <a:pPr lvl="1"/>
+            <a:r>
+              <a:rPr lang="en-US" dirty="0" smtClean="0"/>
+              <a:t>Schema and schema objects </a:t>
+            </a:r>
+            <a:r>
+              <a:rPr lang="en-US" b="1" dirty="0" smtClean="0"/>
+              <a:t>(replication happens here)</a:t>
+            </a:r>
+          </a:p>
+          <a:p>
+            <a:pPr lvl="1"/>
+            <a:endParaRPr lang="en-US" dirty="0" smtClean="0"/>
+          </a:p>
+        </p:txBody>
+      </p:sp>
+    </p:spTree>
+    <p:extLst>
+      <p:ext uri="{BB962C8B-B14F-4D97-AF65-F5344CB8AC3E}">
+        <p14:creationId xmlns:p14="http://schemas.microsoft.com/office/powerpoint/2010/main" val="1603048806"/>
+      </p:ext>
+    </p:extLst>
+  </p:cSld>
+  <p:clrMapOvr>
+    <a:masterClrMapping/>
+  </p:clrMapOvr>
+</p:sld>
+</file>
+
 <file path=ppt/slides/slide2.xml><?xml version="1.0" encoding="utf-8"?>
 <p:sld xmlns:a="http://schemas.openxmlformats.org/drawingml/2006/main" xmlns:r="http://schemas.openxmlformats.org/officeDocument/2006/relationships" xmlns:p="http://schemas.openxmlformats.org/presentationml/2006/main">
   <p:cSld>
@@ -6219,72 +6391,52 @@
           <a:p>
             <a:r>
               <a:rPr lang="en-US" dirty="0" smtClean="0"/>
+              <a:t>Day 1</a:t>
+            </a:r>
+            <a:endParaRPr lang="en-US" dirty="0"/>
+          </a:p>
+        </p:txBody>
+      </p:sp>
+      <p:sp>
+        <p:nvSpPr>
+          <p:cNvPr id="3" name="Content Placeholder 2"/>
+          <p:cNvSpPr>
+            <a:spLocks noGrp="1"/>
+          </p:cNvSpPr>
+          <p:nvPr>
+            <p:ph idx="1"/>
+          </p:nvPr>
+        </p:nvSpPr>
+        <p:spPr/>
+        <p:txBody>
+          <a:bodyPr/>
+          <a:lstStyle/>
+          <a:p>
+            <a:r>
+              <a:rPr lang="en-US" dirty="0" smtClean="0"/>
               <a:t>Introductions</a:t>
             </a:r>
-            <a:endParaRPr lang="en-US" dirty="0"/>
-          </a:p>
-        </p:txBody>
-      </p:sp>
-      <p:sp>
-        <p:nvSpPr>
-          <p:cNvPr id="3" name="Content Placeholder 2"/>
-          <p:cNvSpPr>
-            <a:spLocks noGrp="1"/>
-          </p:cNvSpPr>
-          <p:nvPr>
-            <p:ph idx="1"/>
-          </p:nvPr>
-        </p:nvSpPr>
-        <p:spPr/>
-        <p:txBody>
-          <a:bodyPr/>
-          <a:lstStyle/>
+          </a:p>
           <a:p>
             <a:r>
               <a:rPr lang="en-US" dirty="0" smtClean="0"/>
-              <a:t>Who am I ?</a:t>
-            </a:r>
-          </a:p>
-          <a:p>
+              <a:t>DB </a:t>
+            </a:r>
             <a:r>
               <a:rPr lang="en-US" dirty="0" smtClean="0"/>
-              <a:t>Why database </a:t>
-            </a:r>
-            <a:r>
-              <a:rPr lang="en-US" dirty="0" err="1" smtClean="0"/>
-              <a:t>bootcamp</a:t>
-            </a:r>
+              <a:t>around us</a:t>
+            </a:r>
+          </a:p>
+          <a:p>
             <a:r>
               <a:rPr lang="en-US" dirty="0" smtClean="0"/>
-              <a:t> ?</a:t>
+              <a:t>Why MySQL</a:t>
             </a:r>
           </a:p>
           <a:p>
             <a:r>
               <a:rPr lang="en-US" dirty="0" smtClean="0"/>
-              <a:t>Tell me something about you</a:t>
-            </a:r>
-          </a:p>
-          <a:p>
-            <a:pPr lvl="1"/>
-            <a:r>
-              <a:rPr lang="en-US" dirty="0" smtClean="0"/>
-              <a:t>Name &amp; organization</a:t>
-            </a:r>
-          </a:p>
-          <a:p>
-            <a:pPr lvl="1"/>
-            <a:r>
-              <a:rPr lang="en-US" dirty="0" smtClean="0"/>
-              <a:t>Expectations from </a:t>
-            </a:r>
-            <a:r>
-              <a:rPr lang="en-US" dirty="0" smtClean="0"/>
-              <a:t>this </a:t>
-            </a:r>
-            <a:r>
-              <a:rPr lang="en-US" dirty="0" err="1" smtClean="0"/>
-              <a:t>bootcamp</a:t>
+              <a:t>Let’s install MySQL!</a:t>
             </a:r>
             <a:endParaRPr lang="en-US" dirty="0"/>
           </a:p>
@@ -6293,7 +6445,7 @@
     </p:spTree>
     <p:extLst>
       <p:ext uri="{BB962C8B-B14F-4D97-AF65-F5344CB8AC3E}">
-        <p14:creationId xmlns:p14="http://schemas.microsoft.com/office/powerpoint/2010/main" val="4293307980"/>
+        <p14:creationId xmlns:p14="http://schemas.microsoft.com/office/powerpoint/2010/main" val="2124208653"/>
       </p:ext>
     </p:extLst>
   </p:cSld>
@@ -6337,7 +6489,7 @@
           <a:p>
             <a:r>
               <a:rPr lang="en-US" dirty="0" smtClean="0"/>
-              <a:t>Lets start!</a:t>
+              <a:t>Introductions</a:t>
             </a:r>
             <a:endParaRPr lang="en-US" dirty="0"/>
           </a:p>
@@ -6360,19 +6512,45 @@
           <a:p>
             <a:r>
               <a:rPr lang="en-US" dirty="0" smtClean="0"/>
-              <a:t>DB around us</a:t>
+              <a:t>Who am I ?</a:t>
             </a:r>
           </a:p>
           <a:p>
             <a:r>
               <a:rPr lang="en-US" dirty="0" smtClean="0"/>
-              <a:t>Why MySQL</a:t>
-            </a:r>
-          </a:p>
-          <a:p>
+              <a:t>Why database </a:t>
+            </a:r>
+            <a:r>
+              <a:rPr lang="en-US" dirty="0" err="1" smtClean="0"/>
+              <a:t>bootcamp</a:t>
+            </a:r>
             <a:r>
               <a:rPr lang="en-US" dirty="0" smtClean="0"/>
-              <a:t>Let’s install MySQL!</a:t>
+              <a:t> ?</a:t>
+            </a:r>
+          </a:p>
+          <a:p>
+            <a:r>
+              <a:rPr lang="en-US" dirty="0" smtClean="0"/>
+              <a:t>Tell me something about you</a:t>
+            </a:r>
+          </a:p>
+          <a:p>
+            <a:pPr lvl="1"/>
+            <a:r>
+              <a:rPr lang="en-US" dirty="0" smtClean="0"/>
+              <a:t>Name &amp; organization</a:t>
+            </a:r>
+          </a:p>
+          <a:p>
+            <a:pPr lvl="1"/>
+            <a:r>
+              <a:rPr lang="en-US" dirty="0" smtClean="0"/>
+              <a:t>Expectations from this </a:t>
+            </a:r>
+            <a:r>
+              <a:rPr lang="en-US" dirty="0" err="1" smtClean="0"/>
+              <a:t>bootcamp</a:t>
             </a:r>
             <a:endParaRPr lang="en-US" dirty="0"/>
           </a:p>
@@ -6381,7 +6559,7 @@
     </p:spTree>
     <p:extLst>
       <p:ext uri="{BB962C8B-B14F-4D97-AF65-F5344CB8AC3E}">
-        <p14:creationId xmlns:p14="http://schemas.microsoft.com/office/powerpoint/2010/main" val="2124208653"/>
+        <p14:creationId xmlns:p14="http://schemas.microsoft.com/office/powerpoint/2010/main" val="4293307980"/>
       </p:ext>
     </p:extLst>
   </p:cSld>
@@ -6586,11 +6764,7 @@
           <a:p>
             <a:r>
               <a:rPr lang="en-US" dirty="0" smtClean="0"/>
-              <a:t>Easily </a:t>
-            </a:r>
-            <a:r>
-              <a:rPr lang="en-US" dirty="0" smtClean="0"/>
-              <a:t>available</a:t>
+              <a:t>Easily available</a:t>
             </a:r>
           </a:p>
           <a:p>
@@ -6671,13 +6845,71 @@
           <a:lstStyle/>
           <a:p>
             <a:r>
+              <a:rPr lang="en-US" dirty="0" smtClean="0">
+                <a:hlinkClick r:id="rId2"/>
+              </a:rPr>
+              <a:t>http</a:t>
+            </a:r>
+            <a:r>
+              <a:rPr lang="en-US" dirty="0">
+                <a:hlinkClick r:id="rId2"/>
+              </a:rPr>
+              <a:t>://zedfox.us/blog/install-mysql-5-7-on-windows-10</a:t>
+            </a:r>
+            <a:r>
+              <a:rPr lang="en-US" dirty="0" smtClean="0">
+                <a:hlinkClick r:id="rId2"/>
+              </a:rPr>
+              <a:t>/</a:t>
+            </a:r>
+            <a:r>
               <a:rPr lang="en-US" dirty="0" smtClean="0"/>
-              <a:t>http</a:t>
-            </a:r>
-            <a:r>
-              <a:rPr lang="en-US" dirty="0"/>
-              <a:t>://zedfox.us/index.php/2016/01/install-mysql-5-7-on-windows-10/</a:t>
-            </a:r>
+              <a:t> for Windows users</a:t>
+            </a:r>
+          </a:p>
+          <a:p>
+            <a:r>
+              <a:rPr lang="en-US" dirty="0" smtClean="0"/>
+              <a:t>I’ll assist Mac and GNU/Linux users</a:t>
+            </a:r>
+          </a:p>
+          <a:p>
+            <a:r>
+              <a:rPr lang="en-US" dirty="0" smtClean="0"/>
+              <a:t>What to install?</a:t>
+            </a:r>
+          </a:p>
+          <a:p>
+            <a:pPr lvl="1"/>
+            <a:r>
+              <a:rPr lang="en-US" dirty="0" smtClean="0"/>
+              <a:t>Server</a:t>
+            </a:r>
+          </a:p>
+          <a:p>
+            <a:pPr lvl="1"/>
+            <a:r>
+              <a:rPr lang="en-US" dirty="0" smtClean="0"/>
+              <a:t>Workbench</a:t>
+            </a:r>
+          </a:p>
+          <a:p>
+            <a:pPr lvl="1"/>
+            <a:r>
+              <a:rPr lang="en-US" dirty="0" smtClean="0"/>
+              <a:t>Sample</a:t>
+            </a:r>
+          </a:p>
+          <a:p>
+            <a:pPr lvl="1"/>
+            <a:r>
+              <a:rPr lang="en-US" dirty="0" smtClean="0"/>
+              <a:t>Documentation (optional)</a:t>
+            </a:r>
+          </a:p>
+          <a:p>
+            <a:pPr lvl="1"/>
+            <a:endParaRPr lang="en-US" dirty="0"/>
           </a:p>
         </p:txBody>
       </p:sp>
@@ -6685,6 +6917,376 @@
     <p:extLst>
       <p:ext uri="{BB962C8B-B14F-4D97-AF65-F5344CB8AC3E}">
         <p14:creationId xmlns:p14="http://schemas.microsoft.com/office/powerpoint/2010/main" val="1321342305"/>
+      </p:ext>
+    </p:extLst>
+  </p:cSld>
+  <p:clrMapOvr>
+    <a:masterClrMapping/>
+  </p:clrMapOvr>
+</p:sld>
+</file>
+
+<file path=ppt/slides/slide7.xml><?xml version="1.0" encoding="utf-8"?>
+<p:sld xmlns:a="http://schemas.openxmlformats.org/drawingml/2006/main" xmlns:r="http://schemas.openxmlformats.org/officeDocument/2006/relationships" xmlns:p="http://schemas.openxmlformats.org/presentationml/2006/main">
+  <p:cSld>
+    <p:spTree>
+      <p:nvGrpSpPr>
+        <p:cNvPr id="1" name=""/>
+        <p:cNvGrpSpPr/>
+        <p:nvPr/>
+      </p:nvGrpSpPr>
+      <p:grpSpPr>
+        <a:xfrm>
+          <a:off x="0" y="0"/>
+          <a:ext cx="0" cy="0"/>
+          <a:chOff x="0" y="0"/>
+          <a:chExt cx="0" cy="0"/>
+        </a:xfrm>
+      </p:grpSpPr>
+      <p:sp>
+        <p:nvSpPr>
+          <p:cNvPr id="2" name="Title 1"/>
+          <p:cNvSpPr>
+            <a:spLocks noGrp="1"/>
+          </p:cNvSpPr>
+          <p:nvPr>
+            <p:ph type="title"/>
+          </p:nvPr>
+        </p:nvSpPr>
+        <p:spPr/>
+        <p:txBody>
+          <a:bodyPr/>
+          <a:lstStyle/>
+          <a:p>
+            <a:r>
+              <a:rPr lang="en-US" dirty="0" smtClean="0"/>
+              <a:t>Day 2: Exploring database</a:t>
+            </a:r>
+            <a:endParaRPr lang="en-US" dirty="0"/>
+          </a:p>
+        </p:txBody>
+      </p:sp>
+      <p:sp>
+        <p:nvSpPr>
+          <p:cNvPr id="3" name="Content Placeholder 2"/>
+          <p:cNvSpPr>
+            <a:spLocks noGrp="1"/>
+          </p:cNvSpPr>
+          <p:nvPr>
+            <p:ph idx="1"/>
+          </p:nvPr>
+        </p:nvSpPr>
+        <p:spPr>
+          <a:xfrm>
+            <a:off x="1103312" y="2052918"/>
+            <a:ext cx="8946541" cy="4262538"/>
+          </a:xfrm>
+        </p:spPr>
+        <p:txBody>
+          <a:bodyPr>
+            <a:normAutofit/>
+          </a:bodyPr>
+          <a:lstStyle/>
+          <a:p>
+            <a:r>
+              <a:rPr lang="en-US" dirty="0" smtClean="0"/>
+              <a:t>Let’s see what Workbench shows us</a:t>
+            </a:r>
+          </a:p>
+          <a:p>
+            <a:r>
+              <a:rPr lang="en-US" dirty="0" smtClean="0"/>
+              <a:t>Database terminologies</a:t>
+            </a:r>
+          </a:p>
+          <a:p>
+            <a:pPr lvl="1"/>
+            <a:r>
+              <a:rPr lang="en-US" dirty="0" smtClean="0"/>
+              <a:t>Server: Operating System</a:t>
+            </a:r>
+          </a:p>
+          <a:p>
+            <a:pPr lvl="1"/>
+            <a:r>
+              <a:rPr lang="en-US" dirty="0" smtClean="0"/>
+              <a:t>Server: Database server</a:t>
+            </a:r>
+          </a:p>
+          <a:p>
+            <a:pPr lvl="1"/>
+            <a:r>
+              <a:rPr lang="en-US" dirty="0" smtClean="0"/>
+              <a:t>Database instance</a:t>
+            </a:r>
+          </a:p>
+          <a:p>
+            <a:pPr lvl="1"/>
+            <a:r>
+              <a:rPr lang="en-US" dirty="0" smtClean="0"/>
+              <a:t>Schema</a:t>
+            </a:r>
+          </a:p>
+          <a:p>
+            <a:pPr lvl="2"/>
+            <a:r>
+              <a:rPr lang="en-US" dirty="0" smtClean="0"/>
+              <a:t>Table – has constraints, keys, triggers</a:t>
+            </a:r>
+          </a:p>
+          <a:p>
+            <a:pPr lvl="2"/>
+            <a:r>
+              <a:rPr lang="en-US" dirty="0" smtClean="0"/>
+              <a:t>View</a:t>
+            </a:r>
+          </a:p>
+          <a:p>
+            <a:pPr lvl="2"/>
+            <a:r>
+              <a:rPr lang="en-US" dirty="0" smtClean="0"/>
+              <a:t>Stored procedures</a:t>
+            </a:r>
+          </a:p>
+          <a:p>
+            <a:pPr lvl="2"/>
+            <a:r>
+              <a:rPr lang="en-US" dirty="0" smtClean="0"/>
+              <a:t>Functions</a:t>
+            </a:r>
+            <a:endParaRPr lang="en-US" dirty="0"/>
+          </a:p>
+        </p:txBody>
+      </p:sp>
+    </p:spTree>
+    <p:extLst>
+      <p:ext uri="{BB962C8B-B14F-4D97-AF65-F5344CB8AC3E}">
+        <p14:creationId xmlns:p14="http://schemas.microsoft.com/office/powerpoint/2010/main" val="86598072"/>
+      </p:ext>
+    </p:extLst>
+  </p:cSld>
+  <p:clrMapOvr>
+    <a:masterClrMapping/>
+  </p:clrMapOvr>
+</p:sld>
+</file>
+
+<file path=ppt/slides/slide8.xml><?xml version="1.0" encoding="utf-8"?>
+<p:sld xmlns:a="http://schemas.openxmlformats.org/drawingml/2006/main" xmlns:r="http://schemas.openxmlformats.org/officeDocument/2006/relationships" xmlns:p="http://schemas.openxmlformats.org/presentationml/2006/main">
+  <p:cSld>
+    <p:spTree>
+      <p:nvGrpSpPr>
+        <p:cNvPr id="1" name=""/>
+        <p:cNvGrpSpPr/>
+        <p:nvPr/>
+      </p:nvGrpSpPr>
+      <p:grpSpPr>
+        <a:xfrm>
+          <a:off x="0" y="0"/>
+          <a:ext cx="0" cy="0"/>
+          <a:chOff x="0" y="0"/>
+          <a:chExt cx="0" cy="0"/>
+        </a:xfrm>
+      </p:grpSpPr>
+      <p:sp>
+        <p:nvSpPr>
+          <p:cNvPr id="2" name="Title 1"/>
+          <p:cNvSpPr>
+            <a:spLocks noGrp="1"/>
+          </p:cNvSpPr>
+          <p:nvPr>
+            <p:ph type="title"/>
+          </p:nvPr>
+        </p:nvSpPr>
+        <p:spPr/>
+        <p:txBody>
+          <a:bodyPr/>
+          <a:lstStyle/>
+          <a:p>
+            <a:r>
+              <a:rPr lang="en-US" dirty="0" smtClean="0"/>
+              <a:t>Workbench</a:t>
+            </a:r>
+            <a:endParaRPr lang="en-US" dirty="0"/>
+          </a:p>
+        </p:txBody>
+      </p:sp>
+      <p:sp>
+        <p:nvSpPr>
+          <p:cNvPr id="3" name="Content Placeholder 2"/>
+          <p:cNvSpPr>
+            <a:spLocks noGrp="1"/>
+          </p:cNvSpPr>
+          <p:nvPr>
+            <p:ph idx="1"/>
+          </p:nvPr>
+        </p:nvSpPr>
+        <p:spPr/>
+        <p:txBody>
+          <a:bodyPr/>
+          <a:lstStyle/>
+          <a:p>
+            <a:r>
+              <a:rPr lang="en-US" dirty="0" smtClean="0"/>
+              <a:t>Items that interest Database Administrators</a:t>
+            </a:r>
+          </a:p>
+          <a:p>
+            <a:r>
+              <a:rPr lang="en-US" dirty="0" smtClean="0"/>
+              <a:t>Server status</a:t>
+            </a:r>
+          </a:p>
+          <a:p>
+            <a:r>
+              <a:rPr lang="en-US" dirty="0" smtClean="0"/>
+              <a:t>Users</a:t>
+            </a:r>
+          </a:p>
+          <a:p>
+            <a:r>
+              <a:rPr lang="en-US" dirty="0" smtClean="0"/>
+              <a:t>Client connections</a:t>
+            </a:r>
+          </a:p>
+          <a:p>
+            <a:r>
+              <a:rPr lang="en-US" dirty="0" smtClean="0"/>
+              <a:t>Variables</a:t>
+            </a:r>
+          </a:p>
+          <a:p>
+            <a:r>
+              <a:rPr lang="en-US" dirty="0" smtClean="0"/>
+              <a:t>Performance</a:t>
+            </a:r>
+          </a:p>
+          <a:p>
+            <a:r>
+              <a:rPr lang="en-US" dirty="0" smtClean="0"/>
+              <a:t>Other management tasks</a:t>
+            </a:r>
+            <a:endParaRPr lang="en-US" dirty="0"/>
+          </a:p>
+        </p:txBody>
+      </p:sp>
+    </p:spTree>
+    <p:extLst>
+      <p:ext uri="{BB962C8B-B14F-4D97-AF65-F5344CB8AC3E}">
+        <p14:creationId xmlns:p14="http://schemas.microsoft.com/office/powerpoint/2010/main" val="1236169324"/>
+      </p:ext>
+    </p:extLst>
+  </p:cSld>
+  <p:clrMapOvr>
+    <a:masterClrMapping/>
+  </p:clrMapOvr>
+</p:sld>
+</file>
+
+<file path=ppt/slides/slide9.xml><?xml version="1.0" encoding="utf-8"?>
+<p:sld xmlns:a="http://schemas.openxmlformats.org/drawingml/2006/main" xmlns:r="http://schemas.openxmlformats.org/officeDocument/2006/relationships" xmlns:p="http://schemas.openxmlformats.org/presentationml/2006/main">
+  <p:cSld>
+    <p:spTree>
+      <p:nvGrpSpPr>
+        <p:cNvPr id="1" name=""/>
+        <p:cNvGrpSpPr/>
+        <p:nvPr/>
+      </p:nvGrpSpPr>
+      <p:grpSpPr>
+        <a:xfrm>
+          <a:off x="0" y="0"/>
+          <a:ext cx="0" cy="0"/>
+          <a:chOff x="0" y="0"/>
+          <a:chExt cx="0" cy="0"/>
+        </a:xfrm>
+      </p:grpSpPr>
+      <p:sp>
+        <p:nvSpPr>
+          <p:cNvPr id="2" name="Title 1"/>
+          <p:cNvSpPr>
+            <a:spLocks noGrp="1"/>
+          </p:cNvSpPr>
+          <p:nvPr>
+            <p:ph type="title"/>
+          </p:nvPr>
+        </p:nvSpPr>
+        <p:spPr/>
+        <p:txBody>
+          <a:bodyPr/>
+          <a:lstStyle/>
+          <a:p>
+            <a:r>
+              <a:rPr lang="en-US" dirty="0" smtClean="0"/>
+              <a:t>Database objects</a:t>
+            </a:r>
+            <a:endParaRPr lang="en-US" dirty="0"/>
+          </a:p>
+        </p:txBody>
+      </p:sp>
+      <p:sp>
+        <p:nvSpPr>
+          <p:cNvPr id="3" name="Content Placeholder 2"/>
+          <p:cNvSpPr>
+            <a:spLocks noGrp="1"/>
+          </p:cNvSpPr>
+          <p:nvPr>
+            <p:ph idx="1"/>
+          </p:nvPr>
+        </p:nvSpPr>
+        <p:spPr/>
+        <p:txBody>
+          <a:bodyPr/>
+          <a:lstStyle/>
+          <a:p>
+            <a:r>
+              <a:rPr lang="en-US" dirty="0" smtClean="0"/>
+              <a:t>Items that interest Database Developers</a:t>
+            </a:r>
+          </a:p>
+          <a:p>
+            <a:r>
+              <a:rPr lang="en-US" dirty="0" smtClean="0"/>
+              <a:t>Schema</a:t>
+            </a:r>
+            <a:endParaRPr lang="en-US" dirty="0"/>
+          </a:p>
+          <a:p>
+            <a:pPr lvl="1"/>
+            <a:r>
+              <a:rPr lang="en-US" dirty="0"/>
+              <a:t>Table – has constraints, keys, triggers</a:t>
+            </a:r>
+          </a:p>
+          <a:p>
+            <a:pPr lvl="1"/>
+            <a:r>
+              <a:rPr lang="en-US" dirty="0"/>
+              <a:t>View</a:t>
+            </a:r>
+          </a:p>
+          <a:p>
+            <a:pPr lvl="1"/>
+            <a:r>
+              <a:rPr lang="en-US" dirty="0"/>
+              <a:t>Stored procedures</a:t>
+            </a:r>
+          </a:p>
+          <a:p>
+            <a:pPr lvl="1"/>
+            <a:r>
+              <a:rPr lang="en-US" dirty="0"/>
+              <a:t>Functions</a:t>
+            </a:r>
+          </a:p>
+          <a:p>
+            <a:endParaRPr lang="en-US" dirty="0"/>
+          </a:p>
+        </p:txBody>
+      </p:sp>
+    </p:spTree>
+    <p:extLst>
+      <p:ext uri="{BB962C8B-B14F-4D97-AF65-F5344CB8AC3E}">
+        <p14:creationId xmlns:p14="http://schemas.microsoft.com/office/powerpoint/2010/main" val="3209666376"/>
       </p:ext>
     </p:extLst>
   </p:cSld>

</xml_diff>

<commit_message>
Day 3 table creation
</commit_message>
<xml_diff>
--- a/Presentation/Database-Bootcamp-Presentation.pptx
+++ b/Presentation/Database-Bootcamp-Presentation.pptx
@@ -8,13 +8,21 @@
     <p:sldId id="256" r:id="rId2"/>
     <p:sldId id="260" r:id="rId3"/>
     <p:sldId id="257" r:id="rId4"/>
-    <p:sldId id="258" r:id="rId5"/>
-    <p:sldId id="259" r:id="rId6"/>
-    <p:sldId id="261" r:id="rId7"/>
-    <p:sldId id="262" r:id="rId8"/>
-    <p:sldId id="263" r:id="rId9"/>
-    <p:sldId id="264" r:id="rId10"/>
-    <p:sldId id="265" r:id="rId11"/>
+    <p:sldId id="266" r:id="rId5"/>
+    <p:sldId id="258" r:id="rId6"/>
+    <p:sldId id="259" r:id="rId7"/>
+    <p:sldId id="261" r:id="rId8"/>
+    <p:sldId id="262" r:id="rId9"/>
+    <p:sldId id="263" r:id="rId10"/>
+    <p:sldId id="264" r:id="rId11"/>
+    <p:sldId id="265" r:id="rId12"/>
+    <p:sldId id="267" r:id="rId13"/>
+    <p:sldId id="268" r:id="rId14"/>
+    <p:sldId id="269" r:id="rId15"/>
+    <p:sldId id="270" r:id="rId16"/>
+    <p:sldId id="271" r:id="rId17"/>
+    <p:sldId id="272" r:id="rId18"/>
+    <p:sldId id="273" r:id="rId19"/>
   </p:sldIdLst>
   <p:sldSz cx="12192000" cy="6858000"/>
   <p:notesSz cx="6858000" cy="9144000"/>
@@ -307,7 +315,7 @@
           <a:p>
             <a:fld id="{9DC1F441-9BCC-4383-B80D-68C31DF95A71}" type="datetimeFigureOut">
               <a:rPr lang="en-US" smtClean="0"/>
-              <a:t>1/3/2016</a:t>
+              <a:t>1/4/2016</a:t>
             </a:fld>
             <a:endParaRPr lang="en-US"/>
           </a:p>
@@ -587,7 +595,7 @@
           <a:p>
             <a:fld id="{9DC1F441-9BCC-4383-B80D-68C31DF95A71}" type="datetimeFigureOut">
               <a:rPr lang="en-US" smtClean="0"/>
-              <a:t>1/3/2016</a:t>
+              <a:t>1/4/2016</a:t>
             </a:fld>
             <a:endParaRPr lang="en-US"/>
           </a:p>
@@ -781,7 +789,7 @@
           <a:p>
             <a:fld id="{9DC1F441-9BCC-4383-B80D-68C31DF95A71}" type="datetimeFigureOut">
               <a:rPr lang="en-US" smtClean="0"/>
-              <a:t>1/3/2016</a:t>
+              <a:t>1/4/2016</a:t>
             </a:fld>
             <a:endParaRPr lang="en-US"/>
           </a:p>
@@ -1054,7 +1062,7 @@
           <a:p>
             <a:fld id="{9DC1F441-9BCC-4383-B80D-68C31DF95A71}" type="datetimeFigureOut">
               <a:rPr lang="en-US" smtClean="0"/>
-              <a:t>1/3/2016</a:t>
+              <a:t>1/4/2016</a:t>
             </a:fld>
             <a:endParaRPr lang="en-US"/>
           </a:p>
@@ -1395,7 +1403,7 @@
           <a:p>
             <a:fld id="{9DC1F441-9BCC-4383-B80D-68C31DF95A71}" type="datetimeFigureOut">
               <a:rPr lang="en-US" smtClean="0"/>
-              <a:t>1/3/2016</a:t>
+              <a:t>1/4/2016</a:t>
             </a:fld>
             <a:endParaRPr lang="en-US"/>
           </a:p>
@@ -2018,7 +2026,7 @@
           <a:p>
             <a:fld id="{9DC1F441-9BCC-4383-B80D-68C31DF95A71}" type="datetimeFigureOut">
               <a:rPr lang="en-US" smtClean="0"/>
-              <a:t>1/3/2016</a:t>
+              <a:t>1/4/2016</a:t>
             </a:fld>
             <a:endParaRPr lang="en-US"/>
           </a:p>
@@ -2878,7 +2886,7 @@
           <a:p>
             <a:fld id="{9DC1F441-9BCC-4383-B80D-68C31DF95A71}" type="datetimeFigureOut">
               <a:rPr lang="en-US" smtClean="0"/>
-              <a:t>1/3/2016</a:t>
+              <a:t>1/4/2016</a:t>
             </a:fld>
             <a:endParaRPr lang="en-US"/>
           </a:p>
@@ -3048,7 +3056,7 @@
           <a:p>
             <a:fld id="{9DC1F441-9BCC-4383-B80D-68C31DF95A71}" type="datetimeFigureOut">
               <a:rPr lang="en-US" smtClean="0"/>
-              <a:t>1/3/2016</a:t>
+              <a:t>1/4/2016</a:t>
             </a:fld>
             <a:endParaRPr lang="en-US"/>
           </a:p>
@@ -3228,7 +3236,7 @@
           <a:p>
             <a:fld id="{9DC1F441-9BCC-4383-B80D-68C31DF95A71}" type="datetimeFigureOut">
               <a:rPr lang="en-US" smtClean="0"/>
-              <a:t>1/3/2016</a:t>
+              <a:t>1/4/2016</a:t>
             </a:fld>
             <a:endParaRPr lang="en-US"/>
           </a:p>
@@ -3403,7 +3411,7 @@
           <a:p>
             <a:fld id="{9DC1F441-9BCC-4383-B80D-68C31DF95A71}" type="datetimeFigureOut">
               <a:rPr lang="en-US" smtClean="0"/>
-              <a:t>1/3/2016</a:t>
+              <a:t>1/4/2016</a:t>
             </a:fld>
             <a:endParaRPr lang="en-US"/>
           </a:p>
@@ -3650,7 +3658,7 @@
           <a:p>
             <a:fld id="{9DC1F441-9BCC-4383-B80D-68C31DF95A71}" type="datetimeFigureOut">
               <a:rPr lang="en-US" smtClean="0"/>
-              <a:t>1/3/2016</a:t>
+              <a:t>1/4/2016</a:t>
             </a:fld>
             <a:endParaRPr lang="en-US"/>
           </a:p>
@@ -3947,7 +3955,7 @@
           <a:p>
             <a:fld id="{9DC1F441-9BCC-4383-B80D-68C31DF95A71}" type="datetimeFigureOut">
               <a:rPr lang="en-US" smtClean="0"/>
-              <a:t>1/3/2016</a:t>
+              <a:t>1/4/2016</a:t>
             </a:fld>
             <a:endParaRPr lang="en-US"/>
           </a:p>
@@ -4391,7 +4399,7 @@
           <a:p>
             <a:fld id="{9DC1F441-9BCC-4383-B80D-68C31DF95A71}" type="datetimeFigureOut">
               <a:rPr lang="en-US" smtClean="0"/>
-              <a:t>1/3/2016</a:t>
+              <a:t>1/4/2016</a:t>
             </a:fld>
             <a:endParaRPr lang="en-US"/>
           </a:p>
@@ -4509,7 +4517,7 @@
           <a:p>
             <a:fld id="{9DC1F441-9BCC-4383-B80D-68C31DF95A71}" type="datetimeFigureOut">
               <a:rPr lang="en-US" smtClean="0"/>
-              <a:t>1/3/2016</a:t>
+              <a:t>1/4/2016</a:t>
             </a:fld>
             <a:endParaRPr lang="en-US"/>
           </a:p>
@@ -4604,7 +4612,7 @@
           <a:p>
             <a:fld id="{9DC1F441-9BCC-4383-B80D-68C31DF95A71}" type="datetimeFigureOut">
               <a:rPr lang="en-US" smtClean="0"/>
-              <a:t>1/3/2016</a:t>
+              <a:t>1/4/2016</a:t>
             </a:fld>
             <a:endParaRPr lang="en-US"/>
           </a:p>
@@ -4888,7 +4896,7 @@
           <a:p>
             <a:fld id="{9DC1F441-9BCC-4383-B80D-68C31DF95A71}" type="datetimeFigureOut">
               <a:rPr lang="en-US" smtClean="0"/>
-              <a:t>1/3/2016</a:t>
+              <a:t>1/4/2016</a:t>
             </a:fld>
             <a:endParaRPr lang="en-US"/>
           </a:p>
@@ -5168,7 +5176,7 @@
           <a:p>
             <a:fld id="{9DC1F441-9BCC-4383-B80D-68C31DF95A71}" type="datetimeFigureOut">
               <a:rPr lang="en-US" smtClean="0"/>
-              <a:t>1/3/2016</a:t>
+              <a:t>1/4/2016</a:t>
             </a:fld>
             <a:endParaRPr lang="en-US"/>
           </a:p>
@@ -5597,7 +5605,7 @@
           <a:p>
             <a:fld id="{9DC1F441-9BCC-4383-B80D-68C31DF95A71}" type="datetimeFigureOut">
               <a:rPr lang="en-US" smtClean="0"/>
-              <a:t>1/3/2016</a:t>
+              <a:t>1/4/2016</a:t>
             </a:fld>
             <a:endParaRPr lang="en-US"/>
           </a:p>
@@ -6223,6 +6231,119 @@
           <a:p>
             <a:r>
               <a:rPr lang="en-US" dirty="0" smtClean="0"/>
+              <a:t>Database objects</a:t>
+            </a:r>
+            <a:endParaRPr lang="en-US" dirty="0"/>
+          </a:p>
+        </p:txBody>
+      </p:sp>
+      <p:sp>
+        <p:nvSpPr>
+          <p:cNvPr id="3" name="Content Placeholder 2"/>
+          <p:cNvSpPr>
+            <a:spLocks noGrp="1"/>
+          </p:cNvSpPr>
+          <p:nvPr>
+            <p:ph idx="1"/>
+          </p:nvPr>
+        </p:nvSpPr>
+        <p:spPr/>
+        <p:txBody>
+          <a:bodyPr/>
+          <a:lstStyle/>
+          <a:p>
+            <a:r>
+              <a:rPr lang="en-US" dirty="0" smtClean="0"/>
+              <a:t>Items that interest Database Developers</a:t>
+            </a:r>
+          </a:p>
+          <a:p>
+            <a:r>
+              <a:rPr lang="en-US" dirty="0" smtClean="0"/>
+              <a:t>Schema</a:t>
+            </a:r>
+            <a:endParaRPr lang="en-US" dirty="0"/>
+          </a:p>
+          <a:p>
+            <a:pPr lvl="1"/>
+            <a:r>
+              <a:rPr lang="en-US" dirty="0"/>
+              <a:t>Table – has constraints, keys, triggers</a:t>
+            </a:r>
+          </a:p>
+          <a:p>
+            <a:pPr lvl="1"/>
+            <a:r>
+              <a:rPr lang="en-US" dirty="0"/>
+              <a:t>View</a:t>
+            </a:r>
+          </a:p>
+          <a:p>
+            <a:pPr lvl="1"/>
+            <a:r>
+              <a:rPr lang="en-US" dirty="0"/>
+              <a:t>Stored procedures</a:t>
+            </a:r>
+          </a:p>
+          <a:p>
+            <a:pPr lvl="1"/>
+            <a:r>
+              <a:rPr lang="en-US" dirty="0"/>
+              <a:t>Functions</a:t>
+            </a:r>
+          </a:p>
+          <a:p>
+            <a:endParaRPr lang="en-US" dirty="0"/>
+          </a:p>
+        </p:txBody>
+      </p:sp>
+    </p:spTree>
+    <p:extLst>
+      <p:ext uri="{BB962C8B-B14F-4D97-AF65-F5344CB8AC3E}">
+        <p14:creationId xmlns:p14="http://schemas.microsoft.com/office/powerpoint/2010/main" val="3209666376"/>
+      </p:ext>
+    </p:extLst>
+  </p:cSld>
+  <p:clrMapOvr>
+    <a:masterClrMapping/>
+  </p:clrMapOvr>
+</p:sld>
+</file>
+
+<file path=ppt/slides/slide11.xml><?xml version="1.0" encoding="utf-8"?>
+<p:sld xmlns:a="http://schemas.openxmlformats.org/drawingml/2006/main" xmlns:r="http://schemas.openxmlformats.org/officeDocument/2006/relationships" xmlns:p="http://schemas.openxmlformats.org/presentationml/2006/main">
+  <p:cSld>
+    <p:spTree>
+      <p:nvGrpSpPr>
+        <p:cNvPr id="1" name=""/>
+        <p:cNvGrpSpPr/>
+        <p:nvPr/>
+      </p:nvGrpSpPr>
+      <p:grpSpPr>
+        <a:xfrm>
+          <a:off x="0" y="0"/>
+          <a:ext cx="0" cy="0"/>
+          <a:chOff x="0" y="0"/>
+          <a:chExt cx="0" cy="0"/>
+        </a:xfrm>
+      </p:grpSpPr>
+      <p:sp>
+        <p:nvSpPr>
+          <p:cNvPr id="2" name="Title 1"/>
+          <p:cNvSpPr>
+            <a:spLocks noGrp="1"/>
+          </p:cNvSpPr>
+          <p:nvPr>
+            <p:ph type="title"/>
+          </p:nvPr>
+        </p:nvSpPr>
+        <p:spPr/>
+        <p:txBody>
+          <a:bodyPr/>
+          <a:lstStyle/>
+          <a:p>
+            <a:r>
+              <a:rPr lang="en-US" dirty="0" smtClean="0"/>
               <a:t>Database terminologies</a:t>
             </a:r>
             <a:endParaRPr lang="en-US" dirty="0"/>
@@ -6348,6 +6469,1074 @@
     <p:extLst>
       <p:ext uri="{BB962C8B-B14F-4D97-AF65-F5344CB8AC3E}">
         <p14:creationId xmlns:p14="http://schemas.microsoft.com/office/powerpoint/2010/main" val="1603048806"/>
+      </p:ext>
+    </p:extLst>
+  </p:cSld>
+  <p:clrMapOvr>
+    <a:masterClrMapping/>
+  </p:clrMapOvr>
+</p:sld>
+</file>
+
+<file path=ppt/slides/slide12.xml><?xml version="1.0" encoding="utf-8"?>
+<p:sld xmlns:a="http://schemas.openxmlformats.org/drawingml/2006/main" xmlns:r="http://schemas.openxmlformats.org/officeDocument/2006/relationships" xmlns:p="http://schemas.openxmlformats.org/presentationml/2006/main">
+  <p:cSld>
+    <p:spTree>
+      <p:nvGrpSpPr>
+        <p:cNvPr id="1" name=""/>
+        <p:cNvGrpSpPr/>
+        <p:nvPr/>
+      </p:nvGrpSpPr>
+      <p:grpSpPr>
+        <a:xfrm>
+          <a:off x="0" y="0"/>
+          <a:ext cx="0" cy="0"/>
+          <a:chOff x="0" y="0"/>
+          <a:chExt cx="0" cy="0"/>
+        </a:xfrm>
+      </p:grpSpPr>
+      <p:sp>
+        <p:nvSpPr>
+          <p:cNvPr id="2" name="Title 1"/>
+          <p:cNvSpPr>
+            <a:spLocks noGrp="1"/>
+          </p:cNvSpPr>
+          <p:nvPr>
+            <p:ph type="title"/>
+          </p:nvPr>
+        </p:nvSpPr>
+        <p:spPr/>
+        <p:txBody>
+          <a:bodyPr/>
+          <a:lstStyle/>
+          <a:p>
+            <a:r>
+              <a:rPr lang="en-US" dirty="0" smtClean="0"/>
+              <a:t>Day 3: Tables</a:t>
+            </a:r>
+            <a:endParaRPr lang="en-US" dirty="0"/>
+          </a:p>
+        </p:txBody>
+      </p:sp>
+      <p:sp>
+        <p:nvSpPr>
+          <p:cNvPr id="3" name="Content Placeholder 2"/>
+          <p:cNvSpPr>
+            <a:spLocks noGrp="1"/>
+          </p:cNvSpPr>
+          <p:nvPr>
+            <p:ph idx="1"/>
+          </p:nvPr>
+        </p:nvSpPr>
+        <p:spPr/>
+        <p:txBody>
+          <a:bodyPr>
+            <a:normAutofit/>
+          </a:bodyPr>
+          <a:lstStyle/>
+          <a:p>
+            <a:r>
+              <a:rPr lang="en-US" dirty="0" smtClean="0"/>
+              <a:t>Let’s create a TEST schema for ourselves</a:t>
+            </a:r>
+          </a:p>
+          <a:p>
+            <a:r>
+              <a:rPr lang="en-US" dirty="0" smtClean="0"/>
+              <a:t>Let’s create a table in TEST schema</a:t>
+            </a:r>
+          </a:p>
+          <a:p>
+            <a:r>
+              <a:rPr lang="en-US" dirty="0" smtClean="0"/>
+              <a:t>Normalization – very important</a:t>
+            </a:r>
+          </a:p>
+        </p:txBody>
+      </p:sp>
+    </p:spTree>
+    <p:extLst>
+      <p:ext uri="{BB962C8B-B14F-4D97-AF65-F5344CB8AC3E}">
+        <p14:creationId xmlns:p14="http://schemas.microsoft.com/office/powerpoint/2010/main" val="1524809256"/>
+      </p:ext>
+    </p:extLst>
+  </p:cSld>
+  <p:clrMapOvr>
+    <a:masterClrMapping/>
+  </p:clrMapOvr>
+</p:sld>
+</file>
+
+<file path=ppt/slides/slide13.xml><?xml version="1.0" encoding="utf-8"?>
+<p:sld xmlns:a="http://schemas.openxmlformats.org/drawingml/2006/main" xmlns:r="http://schemas.openxmlformats.org/officeDocument/2006/relationships" xmlns:p="http://schemas.openxmlformats.org/presentationml/2006/main">
+  <p:cSld>
+    <p:spTree>
+      <p:nvGrpSpPr>
+        <p:cNvPr id="1" name=""/>
+        <p:cNvGrpSpPr/>
+        <p:nvPr/>
+      </p:nvGrpSpPr>
+      <p:grpSpPr>
+        <a:xfrm>
+          <a:off x="0" y="0"/>
+          <a:ext cx="0" cy="0"/>
+          <a:chOff x="0" y="0"/>
+          <a:chExt cx="0" cy="0"/>
+        </a:xfrm>
+      </p:grpSpPr>
+      <p:sp>
+        <p:nvSpPr>
+          <p:cNvPr id="2" name="Title 1"/>
+          <p:cNvSpPr>
+            <a:spLocks noGrp="1"/>
+          </p:cNvSpPr>
+          <p:nvPr>
+            <p:ph type="title"/>
+          </p:nvPr>
+        </p:nvSpPr>
+        <p:spPr/>
+        <p:txBody>
+          <a:bodyPr/>
+          <a:lstStyle/>
+          <a:p>
+            <a:r>
+              <a:rPr lang="en-US" dirty="0" smtClean="0"/>
+              <a:t>Table</a:t>
+            </a:r>
+            <a:endParaRPr lang="en-US" dirty="0"/>
+          </a:p>
+        </p:txBody>
+      </p:sp>
+      <p:sp>
+        <p:nvSpPr>
+          <p:cNvPr id="3" name="Content Placeholder 2"/>
+          <p:cNvSpPr>
+            <a:spLocks noGrp="1"/>
+          </p:cNvSpPr>
+          <p:nvPr>
+            <p:ph idx="1"/>
+          </p:nvPr>
+        </p:nvSpPr>
+        <p:spPr/>
+        <p:txBody>
+          <a:bodyPr/>
+          <a:lstStyle/>
+          <a:p>
+            <a:r>
+              <a:rPr lang="en-US" dirty="0" smtClean="0"/>
+              <a:t>Table </a:t>
+            </a:r>
+            <a:r>
+              <a:rPr lang="en-US" dirty="0"/>
+              <a:t>is like a blank Excel sheet with strict rules</a:t>
+            </a:r>
+          </a:p>
+          <a:p>
+            <a:r>
+              <a:rPr lang="en-US" dirty="0"/>
+              <a:t>Table has </a:t>
+            </a:r>
+            <a:r>
+              <a:rPr lang="en-US" dirty="0" smtClean="0"/>
+              <a:t>columns</a:t>
+            </a:r>
+          </a:p>
+          <a:p>
+            <a:r>
+              <a:rPr lang="en-US" dirty="0" smtClean="0"/>
+              <a:t>Table has constraints (i.e. rules)</a:t>
+            </a:r>
+          </a:p>
+          <a:p>
+            <a:r>
+              <a:rPr lang="en-US" dirty="0" smtClean="0"/>
+              <a:t>Table has keys (i.e. ways to find information faster)</a:t>
+            </a:r>
+            <a:endParaRPr lang="en-US" dirty="0"/>
+          </a:p>
+        </p:txBody>
+      </p:sp>
+    </p:spTree>
+    <p:extLst>
+      <p:ext uri="{BB962C8B-B14F-4D97-AF65-F5344CB8AC3E}">
+        <p14:creationId xmlns:p14="http://schemas.microsoft.com/office/powerpoint/2010/main" val="183543592"/>
+      </p:ext>
+    </p:extLst>
+  </p:cSld>
+  <p:clrMapOvr>
+    <a:masterClrMapping/>
+  </p:clrMapOvr>
+</p:sld>
+</file>
+
+<file path=ppt/slides/slide14.xml><?xml version="1.0" encoding="utf-8"?>
+<p:sld xmlns:a="http://schemas.openxmlformats.org/drawingml/2006/main" xmlns:r="http://schemas.openxmlformats.org/officeDocument/2006/relationships" xmlns:p="http://schemas.openxmlformats.org/presentationml/2006/main">
+  <p:cSld>
+    <p:spTree>
+      <p:nvGrpSpPr>
+        <p:cNvPr id="1" name=""/>
+        <p:cNvGrpSpPr/>
+        <p:nvPr/>
+      </p:nvGrpSpPr>
+      <p:grpSpPr>
+        <a:xfrm>
+          <a:off x="0" y="0"/>
+          <a:ext cx="0" cy="0"/>
+          <a:chOff x="0" y="0"/>
+          <a:chExt cx="0" cy="0"/>
+        </a:xfrm>
+      </p:grpSpPr>
+      <p:sp>
+        <p:nvSpPr>
+          <p:cNvPr id="2" name="Title 1"/>
+          <p:cNvSpPr>
+            <a:spLocks noGrp="1"/>
+          </p:cNvSpPr>
+          <p:nvPr>
+            <p:ph type="title"/>
+          </p:nvPr>
+        </p:nvSpPr>
+        <p:spPr/>
+        <p:txBody>
+          <a:bodyPr/>
+          <a:lstStyle/>
+          <a:p>
+            <a:r>
+              <a:rPr lang="en-US" dirty="0" smtClean="0"/>
+              <a:t>Columns</a:t>
+            </a:r>
+            <a:endParaRPr lang="en-US" dirty="0"/>
+          </a:p>
+        </p:txBody>
+      </p:sp>
+      <p:sp>
+        <p:nvSpPr>
+          <p:cNvPr id="3" name="Content Placeholder 2"/>
+          <p:cNvSpPr>
+            <a:spLocks noGrp="1"/>
+          </p:cNvSpPr>
+          <p:nvPr>
+            <p:ph idx="1"/>
+          </p:nvPr>
+        </p:nvSpPr>
+        <p:spPr/>
+        <p:txBody>
+          <a:bodyPr/>
+          <a:lstStyle/>
+          <a:p>
+            <a:r>
+              <a:rPr lang="en-US" dirty="0"/>
+              <a:t>Each column has a name (Ex: </a:t>
+            </a:r>
+            <a:r>
+              <a:rPr lang="en-US" dirty="0" err="1"/>
+              <a:t>firstname</a:t>
+            </a:r>
+            <a:r>
+              <a:rPr lang="en-US" dirty="0"/>
+              <a:t>)</a:t>
+            </a:r>
+          </a:p>
+          <a:p>
+            <a:r>
+              <a:rPr lang="en-US" dirty="0"/>
+              <a:t>Each column can hold one kind of information</a:t>
+            </a:r>
+          </a:p>
+          <a:p>
+            <a:pPr lvl="1"/>
+            <a:r>
+              <a:rPr lang="en-US" dirty="0"/>
+              <a:t>Ex: </a:t>
+            </a:r>
+            <a:r>
+              <a:rPr lang="en-US" dirty="0" err="1"/>
+              <a:t>firstname</a:t>
+            </a:r>
+            <a:r>
+              <a:rPr lang="en-US" dirty="0"/>
+              <a:t> can hold text</a:t>
+            </a:r>
+          </a:p>
+          <a:p>
+            <a:r>
+              <a:rPr lang="en-US" dirty="0"/>
+              <a:t>Column can contain information from another table. Oh fun!</a:t>
+            </a:r>
+          </a:p>
+          <a:p>
+            <a:endParaRPr lang="en-US" dirty="0"/>
+          </a:p>
+        </p:txBody>
+      </p:sp>
+    </p:spTree>
+    <p:extLst>
+      <p:ext uri="{BB962C8B-B14F-4D97-AF65-F5344CB8AC3E}">
+        <p14:creationId xmlns:p14="http://schemas.microsoft.com/office/powerpoint/2010/main" val="2968453939"/>
+      </p:ext>
+    </p:extLst>
+  </p:cSld>
+  <p:clrMapOvr>
+    <a:masterClrMapping/>
+  </p:clrMapOvr>
+</p:sld>
+</file>
+
+<file path=ppt/slides/slide15.xml><?xml version="1.0" encoding="utf-8"?>
+<p:sld xmlns:a="http://schemas.openxmlformats.org/drawingml/2006/main" xmlns:r="http://schemas.openxmlformats.org/officeDocument/2006/relationships" xmlns:p="http://schemas.openxmlformats.org/presentationml/2006/main">
+  <p:cSld>
+    <p:spTree>
+      <p:nvGrpSpPr>
+        <p:cNvPr id="1" name=""/>
+        <p:cNvGrpSpPr/>
+        <p:nvPr/>
+      </p:nvGrpSpPr>
+      <p:grpSpPr>
+        <a:xfrm>
+          <a:off x="0" y="0"/>
+          <a:ext cx="0" cy="0"/>
+          <a:chOff x="0" y="0"/>
+          <a:chExt cx="0" cy="0"/>
+        </a:xfrm>
+      </p:grpSpPr>
+      <p:sp>
+        <p:nvSpPr>
+          <p:cNvPr id="2" name="Title 1"/>
+          <p:cNvSpPr>
+            <a:spLocks noGrp="1"/>
+          </p:cNvSpPr>
+          <p:nvPr>
+            <p:ph type="title"/>
+          </p:nvPr>
+        </p:nvSpPr>
+        <p:spPr/>
+        <p:txBody>
+          <a:bodyPr/>
+          <a:lstStyle/>
+          <a:p>
+            <a:r>
+              <a:rPr lang="en-US" dirty="0" smtClean="0"/>
+              <a:t>Constraint</a:t>
+            </a:r>
+            <a:endParaRPr lang="en-US" dirty="0"/>
+          </a:p>
+        </p:txBody>
+      </p:sp>
+      <p:sp>
+        <p:nvSpPr>
+          <p:cNvPr id="3" name="Content Placeholder 2"/>
+          <p:cNvSpPr>
+            <a:spLocks noGrp="1"/>
+          </p:cNvSpPr>
+          <p:nvPr>
+            <p:ph idx="1"/>
+          </p:nvPr>
+        </p:nvSpPr>
+        <p:spPr/>
+        <p:txBody>
+          <a:bodyPr/>
+          <a:lstStyle/>
+          <a:p>
+            <a:r>
+              <a:rPr lang="en-US" dirty="0" smtClean="0"/>
+              <a:t>Ideal to have 1 column that is unique per row (e.g. </a:t>
+            </a:r>
+            <a:r>
+              <a:rPr lang="en-US" dirty="0" err="1" smtClean="0"/>
+              <a:t>empno</a:t>
+            </a:r>
+            <a:r>
+              <a:rPr lang="en-US" dirty="0" smtClean="0"/>
+              <a:t>) and cannot be empty</a:t>
+            </a:r>
+          </a:p>
+          <a:p>
+            <a:r>
+              <a:rPr lang="en-US" dirty="0" smtClean="0"/>
+              <a:t>That’s PRIMARY KEY CONSTRAINT</a:t>
+            </a:r>
+          </a:p>
+          <a:p>
+            <a:endParaRPr lang="en-US" dirty="0"/>
+          </a:p>
+          <a:p>
+            <a:r>
+              <a:rPr lang="en-US" dirty="0" smtClean="0"/>
+              <a:t>May have a column that is unique per row OR is empty (e.g. SSN)</a:t>
+            </a:r>
+          </a:p>
+          <a:p>
+            <a:r>
+              <a:rPr lang="en-US" dirty="0" smtClean="0"/>
+              <a:t>That’s UNIQUE KEY CONSTRAINT</a:t>
+            </a:r>
+          </a:p>
+          <a:p>
+            <a:endParaRPr lang="en-US" dirty="0" smtClean="0"/>
+          </a:p>
+          <a:p>
+            <a:r>
+              <a:rPr lang="en-US" dirty="0" err="1" smtClean="0"/>
+              <a:t>WorkHours</a:t>
+            </a:r>
+            <a:r>
+              <a:rPr lang="en-US" dirty="0" smtClean="0"/>
+              <a:t> table may contain a field called </a:t>
+            </a:r>
+            <a:r>
+              <a:rPr lang="en-US" dirty="0" err="1" smtClean="0"/>
+              <a:t>empno</a:t>
+            </a:r>
+            <a:endParaRPr lang="en-US" dirty="0" smtClean="0"/>
+          </a:p>
+          <a:p>
+            <a:r>
+              <a:rPr lang="en-US" dirty="0" smtClean="0"/>
+              <a:t>This </a:t>
+            </a:r>
+            <a:r>
+              <a:rPr lang="en-US" dirty="0" err="1" smtClean="0"/>
+              <a:t>empno</a:t>
+            </a:r>
+            <a:r>
+              <a:rPr lang="en-US" dirty="0" smtClean="0"/>
+              <a:t> can be a link to Employees table’s </a:t>
+            </a:r>
+            <a:r>
+              <a:rPr lang="en-US" dirty="0" err="1" smtClean="0"/>
+              <a:t>empno</a:t>
+            </a:r>
+            <a:r>
+              <a:rPr lang="en-US" dirty="0" smtClean="0"/>
+              <a:t>!</a:t>
+            </a:r>
+          </a:p>
+          <a:p>
+            <a:r>
+              <a:rPr lang="en-US" dirty="0" smtClean="0"/>
+              <a:t>That’s FOREIGN KEY CONSTRAINT</a:t>
+            </a:r>
+            <a:endParaRPr lang="en-US" dirty="0"/>
+          </a:p>
+        </p:txBody>
+      </p:sp>
+    </p:spTree>
+    <p:extLst>
+      <p:ext uri="{BB962C8B-B14F-4D97-AF65-F5344CB8AC3E}">
+        <p14:creationId xmlns:p14="http://schemas.microsoft.com/office/powerpoint/2010/main" val="2025133263"/>
+      </p:ext>
+    </p:extLst>
+  </p:cSld>
+  <p:clrMapOvr>
+    <a:masterClrMapping/>
+  </p:clrMapOvr>
+</p:sld>
+</file>
+
+<file path=ppt/slides/slide16.xml><?xml version="1.0" encoding="utf-8"?>
+<p:sld xmlns:a="http://schemas.openxmlformats.org/drawingml/2006/main" xmlns:r="http://schemas.openxmlformats.org/officeDocument/2006/relationships" xmlns:p="http://schemas.openxmlformats.org/presentationml/2006/main">
+  <p:cSld>
+    <p:spTree>
+      <p:nvGrpSpPr>
+        <p:cNvPr id="1" name=""/>
+        <p:cNvGrpSpPr/>
+        <p:nvPr/>
+      </p:nvGrpSpPr>
+      <p:grpSpPr>
+        <a:xfrm>
+          <a:off x="0" y="0"/>
+          <a:ext cx="0" cy="0"/>
+          <a:chOff x="0" y="0"/>
+          <a:chExt cx="0" cy="0"/>
+        </a:xfrm>
+      </p:grpSpPr>
+      <p:sp>
+        <p:nvSpPr>
+          <p:cNvPr id="2" name="Title 1"/>
+          <p:cNvSpPr>
+            <a:spLocks noGrp="1"/>
+          </p:cNvSpPr>
+          <p:nvPr>
+            <p:ph type="title"/>
+          </p:nvPr>
+        </p:nvSpPr>
+        <p:spPr/>
+        <p:txBody>
+          <a:bodyPr/>
+          <a:lstStyle/>
+          <a:p>
+            <a:r>
+              <a:rPr lang="en-US" dirty="0" smtClean="0"/>
+              <a:t>Keys/Indexes</a:t>
+            </a:r>
+            <a:endParaRPr lang="en-US" dirty="0"/>
+          </a:p>
+        </p:txBody>
+      </p:sp>
+      <p:sp>
+        <p:nvSpPr>
+          <p:cNvPr id="3" name="Content Placeholder 2"/>
+          <p:cNvSpPr>
+            <a:spLocks noGrp="1"/>
+          </p:cNvSpPr>
+          <p:nvPr>
+            <p:ph idx="1"/>
+          </p:nvPr>
+        </p:nvSpPr>
+        <p:spPr/>
+        <p:txBody>
+          <a:bodyPr/>
+          <a:lstStyle/>
+          <a:p>
+            <a:r>
+              <a:rPr lang="en-US" dirty="0" smtClean="0"/>
+              <a:t>Column or columns can be marked as a key</a:t>
+            </a:r>
+          </a:p>
+          <a:p>
+            <a:r>
+              <a:rPr lang="en-US" dirty="0" smtClean="0"/>
+              <a:t>Key is a mini-table like an index in the back of a book to quickly locate information</a:t>
+            </a:r>
+          </a:p>
+          <a:p>
+            <a:r>
+              <a:rPr lang="en-US" dirty="0" smtClean="0"/>
+              <a:t>Keys are one of the core components of SQL queries</a:t>
+            </a:r>
+            <a:endParaRPr lang="en-US" dirty="0"/>
+          </a:p>
+        </p:txBody>
+      </p:sp>
+    </p:spTree>
+    <p:extLst>
+      <p:ext uri="{BB962C8B-B14F-4D97-AF65-F5344CB8AC3E}">
+        <p14:creationId xmlns:p14="http://schemas.microsoft.com/office/powerpoint/2010/main" val="3806072778"/>
+      </p:ext>
+    </p:extLst>
+  </p:cSld>
+  <p:clrMapOvr>
+    <a:masterClrMapping/>
+  </p:clrMapOvr>
+</p:sld>
+</file>
+
+<file path=ppt/slides/slide17.xml><?xml version="1.0" encoding="utf-8"?>
+<p:sld xmlns:a="http://schemas.openxmlformats.org/drawingml/2006/main" xmlns:r="http://schemas.openxmlformats.org/officeDocument/2006/relationships" xmlns:p="http://schemas.openxmlformats.org/presentationml/2006/main">
+  <p:cSld>
+    <p:spTree>
+      <p:nvGrpSpPr>
+        <p:cNvPr id="1" name=""/>
+        <p:cNvGrpSpPr/>
+        <p:nvPr/>
+      </p:nvGrpSpPr>
+      <p:grpSpPr>
+        <a:xfrm>
+          <a:off x="0" y="0"/>
+          <a:ext cx="0" cy="0"/>
+          <a:chOff x="0" y="0"/>
+          <a:chExt cx="0" cy="0"/>
+        </a:xfrm>
+      </p:grpSpPr>
+      <p:sp>
+        <p:nvSpPr>
+          <p:cNvPr id="2" name="Title 1"/>
+          <p:cNvSpPr>
+            <a:spLocks noGrp="1"/>
+          </p:cNvSpPr>
+          <p:nvPr>
+            <p:ph type="title"/>
+          </p:nvPr>
+        </p:nvSpPr>
+        <p:spPr/>
+        <p:txBody>
+          <a:bodyPr/>
+          <a:lstStyle/>
+          <a:p>
+            <a:r>
+              <a:rPr lang="en-US" dirty="0" smtClean="0"/>
+              <a:t>Employees</a:t>
+            </a:r>
+            <a:endParaRPr lang="en-US" dirty="0"/>
+          </a:p>
+        </p:txBody>
+      </p:sp>
+      <p:sp>
+        <p:nvSpPr>
+          <p:cNvPr id="3" name="Content Placeholder 2"/>
+          <p:cNvSpPr>
+            <a:spLocks noGrp="1"/>
+          </p:cNvSpPr>
+          <p:nvPr>
+            <p:ph idx="1"/>
+          </p:nvPr>
+        </p:nvSpPr>
+        <p:spPr/>
+        <p:txBody>
+          <a:bodyPr>
+            <a:normAutofit lnSpcReduction="10000"/>
+          </a:bodyPr>
+          <a:lstStyle/>
+          <a:p>
+            <a:pPr marL="0" indent="0">
+              <a:buNone/>
+            </a:pPr>
+            <a:r>
+              <a:rPr lang="en-US" dirty="0" smtClean="0"/>
+              <a:t>CREATE TABLE employees (</a:t>
+            </a:r>
+          </a:p>
+          <a:p>
+            <a:pPr marL="0" indent="0">
+              <a:buNone/>
+            </a:pPr>
+            <a:r>
+              <a:rPr lang="en-US" dirty="0"/>
+              <a:t>	</a:t>
+            </a:r>
+            <a:r>
+              <a:rPr lang="en-US" dirty="0" err="1" smtClean="0"/>
+              <a:t>empno</a:t>
+            </a:r>
+            <a:r>
+              <a:rPr lang="en-US" dirty="0" smtClean="0"/>
+              <a:t> INT NOT NULL AUTO_INCREMENT,</a:t>
+            </a:r>
+          </a:p>
+          <a:p>
+            <a:pPr marL="0" indent="0">
+              <a:buNone/>
+            </a:pPr>
+            <a:r>
+              <a:rPr lang="en-US" dirty="0"/>
+              <a:t>	</a:t>
+            </a:r>
+            <a:r>
+              <a:rPr lang="en-US" dirty="0" err="1" smtClean="0"/>
+              <a:t>firstname</a:t>
+            </a:r>
+            <a:r>
+              <a:rPr lang="en-US" dirty="0" smtClean="0"/>
+              <a:t> varchar(50),</a:t>
+            </a:r>
+          </a:p>
+          <a:p>
+            <a:pPr marL="0" indent="0">
+              <a:buNone/>
+            </a:pPr>
+            <a:r>
+              <a:rPr lang="en-US" dirty="0"/>
+              <a:t>	</a:t>
+            </a:r>
+            <a:r>
+              <a:rPr lang="en-US" dirty="0" err="1" smtClean="0"/>
+              <a:t>lastname</a:t>
+            </a:r>
+            <a:r>
+              <a:rPr lang="en-US" dirty="0" smtClean="0"/>
+              <a:t> varchar(50) NOT NULL,</a:t>
+            </a:r>
+          </a:p>
+          <a:p>
+            <a:pPr marL="0" indent="0">
+              <a:buNone/>
+            </a:pPr>
+            <a:r>
+              <a:rPr lang="en-US" dirty="0"/>
+              <a:t>	</a:t>
+            </a:r>
+            <a:r>
+              <a:rPr lang="en-US" dirty="0" smtClean="0"/>
+              <a:t>age </a:t>
+            </a:r>
+            <a:r>
+              <a:rPr lang="en-US" dirty="0" err="1" smtClean="0"/>
+              <a:t>int</a:t>
+            </a:r>
+            <a:r>
+              <a:rPr lang="en-US" dirty="0" smtClean="0"/>
+              <a:t> NOT NULL DEFAULT 0,</a:t>
+            </a:r>
+          </a:p>
+          <a:p>
+            <a:pPr marL="0" indent="0">
+              <a:buNone/>
+            </a:pPr>
+            <a:r>
+              <a:rPr lang="en-US" dirty="0"/>
+              <a:t>	</a:t>
+            </a:r>
+            <a:r>
+              <a:rPr lang="en-US" dirty="0" err="1" smtClean="0"/>
+              <a:t>ssn</a:t>
+            </a:r>
+            <a:r>
+              <a:rPr lang="en-US" dirty="0" smtClean="0"/>
+              <a:t> char(9),</a:t>
+            </a:r>
+          </a:p>
+          <a:p>
+            <a:pPr marL="0" indent="0">
+              <a:buNone/>
+            </a:pPr>
+            <a:r>
+              <a:rPr lang="en-US" dirty="0" smtClean="0"/>
+              <a:t>	CONSTRAINT </a:t>
+            </a:r>
+            <a:r>
+              <a:rPr lang="en-US" dirty="0" err="1" smtClean="0"/>
+              <a:t>pk_employees_empno</a:t>
+            </a:r>
+            <a:r>
+              <a:rPr lang="en-US" dirty="0" smtClean="0"/>
+              <a:t> PRIMARY KEY (</a:t>
+            </a:r>
+            <a:r>
+              <a:rPr lang="en-US" dirty="0" err="1" smtClean="0"/>
+              <a:t>empno</a:t>
+            </a:r>
+            <a:r>
+              <a:rPr lang="en-US" dirty="0" smtClean="0"/>
+              <a:t>),</a:t>
+            </a:r>
+          </a:p>
+          <a:p>
+            <a:pPr marL="0" indent="0">
+              <a:buNone/>
+            </a:pPr>
+            <a:r>
+              <a:rPr lang="en-US" dirty="0"/>
+              <a:t>	</a:t>
+            </a:r>
+            <a:r>
+              <a:rPr lang="en-US" dirty="0" smtClean="0"/>
+              <a:t>CONSTRAINT </a:t>
+            </a:r>
+            <a:r>
+              <a:rPr lang="en-US" dirty="0" err="1" smtClean="0"/>
+              <a:t>uk_employees_ssn</a:t>
+            </a:r>
+            <a:r>
+              <a:rPr lang="en-US" dirty="0" smtClean="0"/>
+              <a:t> UNIQUE KEY (</a:t>
+            </a:r>
+            <a:r>
+              <a:rPr lang="en-US" dirty="0" err="1" smtClean="0"/>
+              <a:t>ssn</a:t>
+            </a:r>
+            <a:r>
+              <a:rPr lang="en-US" dirty="0" smtClean="0"/>
+              <a:t>),</a:t>
+            </a:r>
+          </a:p>
+          <a:p>
+            <a:pPr marL="0" indent="0">
+              <a:buNone/>
+            </a:pPr>
+            <a:r>
+              <a:rPr lang="en-US" dirty="0"/>
+              <a:t>	</a:t>
+            </a:r>
+            <a:r>
+              <a:rPr lang="en-US" dirty="0" smtClean="0"/>
+              <a:t>INDEX </a:t>
+            </a:r>
+            <a:r>
+              <a:rPr lang="en-US" dirty="0" err="1" smtClean="0"/>
+              <a:t>idx_employees_ln_fn_age</a:t>
+            </a:r>
+            <a:r>
+              <a:rPr lang="en-US" dirty="0" smtClean="0"/>
+              <a:t> (</a:t>
+            </a:r>
+            <a:r>
+              <a:rPr lang="en-US" dirty="0" err="1" smtClean="0"/>
+              <a:t>lastname</a:t>
+            </a:r>
+            <a:r>
+              <a:rPr lang="en-US" dirty="0" smtClean="0"/>
+              <a:t>, </a:t>
+            </a:r>
+            <a:r>
+              <a:rPr lang="en-US" dirty="0" err="1" smtClean="0"/>
+              <a:t>firstname</a:t>
+            </a:r>
+            <a:r>
+              <a:rPr lang="en-US" dirty="0" smtClean="0"/>
+              <a:t>, age)</a:t>
+            </a:r>
+          </a:p>
+          <a:p>
+            <a:pPr marL="0" indent="0">
+              <a:buNone/>
+            </a:pPr>
+            <a:r>
+              <a:rPr lang="en-US" dirty="0" smtClean="0"/>
+              <a:t>);</a:t>
+            </a:r>
+            <a:endParaRPr lang="en-US" dirty="0"/>
+          </a:p>
+        </p:txBody>
+      </p:sp>
+    </p:spTree>
+    <p:extLst>
+      <p:ext uri="{BB962C8B-B14F-4D97-AF65-F5344CB8AC3E}">
+        <p14:creationId xmlns:p14="http://schemas.microsoft.com/office/powerpoint/2010/main" val="1719237454"/>
+      </p:ext>
+    </p:extLst>
+  </p:cSld>
+  <p:clrMapOvr>
+    <a:masterClrMapping/>
+  </p:clrMapOvr>
+</p:sld>
+</file>
+
+<file path=ppt/slides/slide18.xml><?xml version="1.0" encoding="utf-8"?>
+<p:sld xmlns:a="http://schemas.openxmlformats.org/drawingml/2006/main" xmlns:r="http://schemas.openxmlformats.org/officeDocument/2006/relationships" xmlns:p="http://schemas.openxmlformats.org/presentationml/2006/main">
+  <p:cSld>
+    <p:spTree>
+      <p:nvGrpSpPr>
+        <p:cNvPr id="1" name=""/>
+        <p:cNvGrpSpPr/>
+        <p:nvPr/>
+      </p:nvGrpSpPr>
+      <p:grpSpPr>
+        <a:xfrm>
+          <a:off x="0" y="0"/>
+          <a:ext cx="0" cy="0"/>
+          <a:chOff x="0" y="0"/>
+          <a:chExt cx="0" cy="0"/>
+        </a:xfrm>
+      </p:grpSpPr>
+      <p:sp>
+        <p:nvSpPr>
+          <p:cNvPr id="2" name="Title 1"/>
+          <p:cNvSpPr>
+            <a:spLocks noGrp="1"/>
+          </p:cNvSpPr>
+          <p:nvPr>
+            <p:ph type="title"/>
+          </p:nvPr>
+        </p:nvSpPr>
+        <p:spPr/>
+        <p:txBody>
+          <a:bodyPr/>
+          <a:lstStyle/>
+          <a:p>
+            <a:r>
+              <a:rPr lang="en-US" dirty="0" err="1" smtClean="0"/>
+              <a:t>WorkHours</a:t>
+            </a:r>
+            <a:endParaRPr lang="en-US" dirty="0"/>
+          </a:p>
+        </p:txBody>
+      </p:sp>
+      <p:sp>
+        <p:nvSpPr>
+          <p:cNvPr id="3" name="Content Placeholder 2"/>
+          <p:cNvSpPr>
+            <a:spLocks noGrp="1"/>
+          </p:cNvSpPr>
+          <p:nvPr>
+            <p:ph idx="1"/>
+          </p:nvPr>
+        </p:nvSpPr>
+        <p:spPr>
+          <a:xfrm>
+            <a:off x="1103312" y="2052918"/>
+            <a:ext cx="8946541" cy="4494186"/>
+          </a:xfrm>
+        </p:spPr>
+        <p:txBody>
+          <a:bodyPr>
+            <a:normAutofit/>
+          </a:bodyPr>
+          <a:lstStyle/>
+          <a:p>
+            <a:pPr marL="0" indent="0">
+              <a:buNone/>
+            </a:pPr>
+            <a:r>
+              <a:rPr lang="en-US" dirty="0" smtClean="0"/>
+              <a:t>CREATE TABLE workhours (</a:t>
+            </a:r>
+          </a:p>
+          <a:p>
+            <a:pPr marL="0" indent="0">
+              <a:buNone/>
+            </a:pPr>
+            <a:r>
+              <a:rPr lang="en-US" dirty="0"/>
+              <a:t>	</a:t>
+            </a:r>
+            <a:r>
+              <a:rPr lang="en-US" dirty="0" smtClean="0"/>
+              <a:t>id INT NOT NULL AUTO_INCREMENT,</a:t>
+            </a:r>
+          </a:p>
+          <a:p>
+            <a:pPr marL="0" indent="0">
+              <a:buNone/>
+            </a:pPr>
+            <a:r>
+              <a:rPr lang="en-US" dirty="0"/>
+              <a:t>	</a:t>
+            </a:r>
+            <a:r>
+              <a:rPr lang="en-US" dirty="0" err="1" smtClean="0"/>
+              <a:t>workdate</a:t>
+            </a:r>
+            <a:r>
+              <a:rPr lang="en-US" dirty="0" smtClean="0"/>
+              <a:t> DATE NOT NULL,</a:t>
+            </a:r>
+          </a:p>
+          <a:p>
+            <a:pPr marL="0" indent="0">
+              <a:buNone/>
+            </a:pPr>
+            <a:r>
+              <a:rPr lang="en-US" dirty="0"/>
+              <a:t>	</a:t>
+            </a:r>
+            <a:r>
+              <a:rPr lang="en-US" dirty="0" smtClean="0"/>
+              <a:t>workhours INT NOT NULL,</a:t>
+            </a:r>
+          </a:p>
+          <a:p>
+            <a:pPr marL="0" indent="0">
+              <a:buNone/>
+            </a:pPr>
+            <a:r>
+              <a:rPr lang="en-US" dirty="0"/>
+              <a:t>	</a:t>
+            </a:r>
+            <a:r>
+              <a:rPr lang="en-US" dirty="0" err="1" smtClean="0"/>
+              <a:t>empno</a:t>
+            </a:r>
+            <a:r>
+              <a:rPr lang="en-US" dirty="0" smtClean="0"/>
+              <a:t> INT NOT NULL,</a:t>
+            </a:r>
+          </a:p>
+          <a:p>
+            <a:pPr marL="0" indent="0">
+              <a:buNone/>
+            </a:pPr>
+            <a:r>
+              <a:rPr lang="en-US" dirty="0"/>
+              <a:t>	</a:t>
+            </a:r>
+            <a:r>
+              <a:rPr lang="en-US" dirty="0" smtClean="0"/>
+              <a:t>CONSTRAINT </a:t>
+            </a:r>
+            <a:r>
+              <a:rPr lang="en-US" dirty="0" err="1" smtClean="0"/>
+              <a:t>pk_workhours_id</a:t>
+            </a:r>
+            <a:r>
+              <a:rPr lang="en-US" dirty="0" smtClean="0"/>
+              <a:t> PRIMARY KEY (id),</a:t>
+            </a:r>
+          </a:p>
+          <a:p>
+            <a:pPr marL="0" indent="0">
+              <a:buNone/>
+            </a:pPr>
+            <a:r>
+              <a:rPr lang="en-US" dirty="0"/>
+              <a:t>	</a:t>
+            </a:r>
+            <a:r>
+              <a:rPr lang="en-US" dirty="0" smtClean="0"/>
+              <a:t>INDEX </a:t>
+            </a:r>
+            <a:r>
+              <a:rPr lang="en-US" dirty="0" err="1" smtClean="0"/>
+              <a:t>idx_workhours_date_hours</a:t>
+            </a:r>
+            <a:r>
+              <a:rPr lang="en-US" dirty="0" smtClean="0"/>
+              <a:t> (</a:t>
+            </a:r>
+            <a:r>
+              <a:rPr lang="en-US" dirty="0" err="1" smtClean="0"/>
+              <a:t>workdate</a:t>
+            </a:r>
+            <a:r>
+              <a:rPr lang="en-US" dirty="0" smtClean="0"/>
+              <a:t>, workhours),</a:t>
+            </a:r>
+          </a:p>
+          <a:p>
+            <a:pPr marL="0" indent="0">
+              <a:buNone/>
+            </a:pPr>
+            <a:r>
+              <a:rPr lang="en-US" dirty="0"/>
+              <a:t>	</a:t>
+            </a:r>
+            <a:r>
+              <a:rPr lang="en-US" dirty="0" smtClean="0"/>
+              <a:t>CONSTRAINT </a:t>
+            </a:r>
+            <a:r>
+              <a:rPr lang="en-US" dirty="0" err="1" smtClean="0"/>
+              <a:t>fk_workhours_employees_no</a:t>
+            </a:r>
+            <a:r>
+              <a:rPr lang="en-US" dirty="0" smtClean="0"/>
+              <a:t> FOREIGN KEY (</a:t>
+            </a:r>
+            <a:r>
+              <a:rPr lang="en-US" dirty="0" err="1" smtClean="0"/>
+              <a:t>empno</a:t>
+            </a:r>
+            <a:r>
+              <a:rPr lang="en-US" dirty="0" smtClean="0"/>
+              <a:t>)</a:t>
+            </a:r>
+          </a:p>
+          <a:p>
+            <a:pPr marL="0" indent="0">
+              <a:buNone/>
+            </a:pPr>
+            <a:r>
+              <a:rPr lang="en-US" dirty="0"/>
+              <a:t>	</a:t>
+            </a:r>
+            <a:r>
+              <a:rPr lang="en-US" dirty="0" smtClean="0"/>
+              <a:t>	REFERENCES employees (</a:t>
+            </a:r>
+            <a:r>
+              <a:rPr lang="en-US" dirty="0" err="1" smtClean="0"/>
+              <a:t>empno</a:t>
+            </a:r>
+            <a:r>
+              <a:rPr lang="en-US" dirty="0" smtClean="0"/>
+              <a:t>)</a:t>
+            </a:r>
+          </a:p>
+          <a:p>
+            <a:pPr marL="0" indent="0">
+              <a:buNone/>
+            </a:pPr>
+            <a:r>
+              <a:rPr lang="en-US" dirty="0" smtClean="0"/>
+              <a:t>);</a:t>
+            </a:r>
+            <a:endParaRPr lang="en-US" dirty="0"/>
+          </a:p>
+        </p:txBody>
+      </p:sp>
+    </p:spTree>
+    <p:extLst>
+      <p:ext uri="{BB962C8B-B14F-4D97-AF65-F5344CB8AC3E}">
+        <p14:creationId xmlns:p14="http://schemas.microsoft.com/office/powerpoint/2010/main" val="1483079619"/>
       </p:ext>
     </p:extLst>
   </p:cSld>
@@ -6420,11 +7609,14 @@
           <a:p>
             <a:r>
               <a:rPr lang="en-US" dirty="0" smtClean="0"/>
-              <a:t>DB </a:t>
-            </a:r>
-            <a:r>
-              <a:rPr lang="en-US" dirty="0" smtClean="0"/>
-              <a:t>around us</a:t>
+              <a:t>Goal</a:t>
+            </a:r>
+            <a:endParaRPr lang="en-US" dirty="0" smtClean="0"/>
+          </a:p>
+          <a:p>
+            <a:r>
+              <a:rPr lang="en-US" dirty="0" smtClean="0"/>
+              <a:t>DB around us</a:t>
             </a:r>
           </a:p>
           <a:p>
@@ -6603,7 +7795,7 @@
           <a:p>
             <a:r>
               <a:rPr lang="en-US" dirty="0" smtClean="0"/>
-              <a:t>DB in daily use</a:t>
+              <a:t>Goal</a:t>
             </a:r>
             <a:endParaRPr lang="en-US" dirty="0"/>
           </a:p>
@@ -6626,60 +7818,69 @@
           <a:p>
             <a:r>
               <a:rPr lang="en-US" dirty="0" smtClean="0"/>
-              <a:t>Search engines</a:t>
-            </a:r>
-          </a:p>
-          <a:p>
-            <a:r>
-              <a:rPr lang="en-US" dirty="0" smtClean="0"/>
-              <a:t>Android/iOS</a:t>
-            </a:r>
-          </a:p>
-          <a:p>
-            <a:r>
-              <a:rPr lang="en-US" dirty="0" smtClean="0"/>
-              <a:t>Browsers</a:t>
-            </a:r>
-          </a:p>
-          <a:p>
-            <a:r>
-              <a:rPr lang="en-US" dirty="0" smtClean="0"/>
-              <a:t>Excel/Access</a:t>
-            </a:r>
-          </a:p>
-          <a:p>
-            <a:r>
-              <a:rPr lang="en-US" dirty="0" smtClean="0"/>
-              <a:t>Email systems</a:t>
-            </a:r>
-          </a:p>
-          <a:p>
-            <a:r>
-              <a:rPr lang="en-US" dirty="0" smtClean="0"/>
-              <a:t>Social media</a:t>
-            </a:r>
-          </a:p>
-          <a:p>
-            <a:pPr marL="0" indent="0">
-              <a:buNone/>
-            </a:pPr>
+              <a:t>Help you succeed with the power of good data</a:t>
+            </a:r>
+          </a:p>
+          <a:p>
+            <a:r>
+              <a:rPr lang="en-US" dirty="0" smtClean="0"/>
+              <a:t>Showcase the power and use of databases</a:t>
+            </a:r>
+          </a:p>
+          <a:p>
+            <a:r>
+              <a:rPr lang="en-US" dirty="0" smtClean="0"/>
+              <a:t>Faster access to data</a:t>
+            </a:r>
+          </a:p>
+          <a:p>
+            <a:r>
+              <a:rPr lang="en-US" dirty="0" smtClean="0"/>
+              <a:t>Career paths:</a:t>
+            </a:r>
+          </a:p>
+          <a:p>
+            <a:pPr lvl="1"/>
+            <a:r>
+              <a:rPr lang="en-US" dirty="0" smtClean="0"/>
+              <a:t>Database Developer/Database Administrator</a:t>
+            </a:r>
+          </a:p>
+          <a:p>
+            <a:pPr lvl="1"/>
+            <a:r>
+              <a:rPr lang="en-US" dirty="0" smtClean="0"/>
+              <a:t>Data Architect/Database Manager</a:t>
+            </a:r>
+          </a:p>
+          <a:p>
+            <a:pPr lvl="1"/>
+            <a:r>
+              <a:rPr lang="en-US" dirty="0" smtClean="0"/>
+              <a:t>Data Scientist</a:t>
+            </a:r>
+          </a:p>
+          <a:p>
+            <a:pPr lvl="1"/>
+            <a:r>
+              <a:rPr lang="en-US" dirty="0" smtClean="0"/>
+              <a:t>Business Intelligence Engineer</a:t>
+            </a:r>
+          </a:p>
+          <a:p>
+            <a:pPr lvl="1"/>
+            <a:r>
+              <a:rPr lang="en-US" dirty="0" smtClean="0"/>
+              <a:t>Director or VP of Enterprise Data</a:t>
+            </a:r>
             <a:endParaRPr lang="en-US" dirty="0"/>
-          </a:p>
-          <a:p>
-            <a:pPr marL="0" indent="0">
-              <a:buNone/>
-            </a:pPr>
-            <a:r>
-              <a:rPr lang="en-US" dirty="0" smtClean="0"/>
-              <a:t>Many products that we use today store data in databases. It’s all around us.</a:t>
-            </a:r>
           </a:p>
         </p:txBody>
       </p:sp>
     </p:spTree>
     <p:extLst>
       <p:ext uri="{BB962C8B-B14F-4D97-AF65-F5344CB8AC3E}">
-        <p14:creationId xmlns:p14="http://schemas.microsoft.com/office/powerpoint/2010/main" val="3118407676"/>
+        <p14:creationId xmlns:p14="http://schemas.microsoft.com/office/powerpoint/2010/main" val="1962500766"/>
       </p:ext>
     </p:extLst>
   </p:cSld>
@@ -6723,7 +7924,7 @@
           <a:p>
             <a:r>
               <a:rPr lang="en-US" dirty="0" smtClean="0"/>
-              <a:t>Why MySQL</a:t>
+              <a:t>DB in daily use</a:t>
             </a:r>
             <a:endParaRPr lang="en-US" dirty="0"/>
           </a:p>
@@ -6746,40 +7947,60 @@
           <a:p>
             <a:r>
               <a:rPr lang="en-US" dirty="0" smtClean="0"/>
-              <a:t>Open Source (GPL License)</a:t>
-            </a:r>
-          </a:p>
-          <a:p>
-            <a:r>
-              <a:rPr lang="en-US" dirty="0" smtClean="0"/>
-              <a:t>Cross-platform</a:t>
-            </a:r>
-          </a:p>
-          <a:p>
-            <a:r>
-              <a:rPr lang="en-US" dirty="0" smtClean="0"/>
-              <a:t>Easy to install and use</a:t>
-            </a:r>
-          </a:p>
-          <a:p>
-            <a:r>
-              <a:rPr lang="en-US" dirty="0" smtClean="0"/>
-              <a:t>Easily available</a:t>
-            </a:r>
-          </a:p>
-          <a:p>
-            <a:r>
-              <a:rPr lang="en-US" dirty="0" smtClean="0"/>
-              <a:t>Great community support</a:t>
-            </a:r>
+              <a:t>Search engines</a:t>
+            </a:r>
+          </a:p>
+          <a:p>
+            <a:r>
+              <a:rPr lang="en-US" dirty="0" smtClean="0"/>
+              <a:t>Android/iOS</a:t>
+            </a:r>
+          </a:p>
+          <a:p>
+            <a:r>
+              <a:rPr lang="en-US" dirty="0" smtClean="0"/>
+              <a:t>Browsers</a:t>
+            </a:r>
+          </a:p>
+          <a:p>
+            <a:r>
+              <a:rPr lang="en-US" dirty="0" smtClean="0"/>
+              <a:t>Excel/Access</a:t>
+            </a:r>
+          </a:p>
+          <a:p>
+            <a:r>
+              <a:rPr lang="en-US" dirty="0" smtClean="0"/>
+              <a:t>Email systems</a:t>
+            </a:r>
+          </a:p>
+          <a:p>
+            <a:r>
+              <a:rPr lang="en-US" dirty="0" smtClean="0"/>
+              <a:t>Social media</a:t>
+            </a:r>
+          </a:p>
+          <a:p>
+            <a:pPr marL="0" indent="0">
+              <a:buNone/>
+            </a:pPr>
             <a:endParaRPr lang="en-US" dirty="0"/>
+          </a:p>
+          <a:p>
+            <a:pPr marL="0" indent="0">
+              <a:buNone/>
+            </a:pPr>
+            <a:r>
+              <a:rPr lang="en-US" dirty="0" smtClean="0"/>
+              <a:t>Many products that we use today store data in databases. It’s all around us.</a:t>
+            </a:r>
           </a:p>
         </p:txBody>
       </p:sp>
     </p:spTree>
     <p:extLst>
       <p:ext uri="{BB962C8B-B14F-4D97-AF65-F5344CB8AC3E}">
-        <p14:creationId xmlns:p14="http://schemas.microsoft.com/office/powerpoint/2010/main" val="451513678"/>
+        <p14:creationId xmlns:p14="http://schemas.microsoft.com/office/powerpoint/2010/main" val="3118407676"/>
       </p:ext>
     </p:extLst>
   </p:cSld>
@@ -6823,7 +8044,7 @@
           <a:p>
             <a:r>
               <a:rPr lang="en-US" dirty="0" smtClean="0"/>
-              <a:t>Installing MySQL</a:t>
+              <a:t>Why MySQL</a:t>
             </a:r>
             <a:endParaRPr lang="en-US" dirty="0"/>
           </a:p>
@@ -6845,70 +8066,33 @@
           <a:lstStyle/>
           <a:p>
             <a:r>
-              <a:rPr lang="en-US" dirty="0" smtClean="0">
-                <a:hlinkClick r:id="rId2"/>
-              </a:rPr>
-              <a:t>http</a:t>
-            </a:r>
-            <a:r>
-              <a:rPr lang="en-US" dirty="0">
-                <a:hlinkClick r:id="rId2"/>
-              </a:rPr>
-              <a:t>://zedfox.us/blog/install-mysql-5-7-on-windows-10</a:t>
-            </a:r>
-            <a:r>
-              <a:rPr lang="en-US" dirty="0" smtClean="0">
-                <a:hlinkClick r:id="rId2"/>
-              </a:rPr>
-              <a:t>/</a:t>
-            </a:r>
-            <a:r>
-              <a:rPr lang="en-US" dirty="0" smtClean="0"/>
-              <a:t> for Windows users</a:t>
-            </a:r>
-          </a:p>
-          <a:p>
-            <a:r>
-              <a:rPr lang="en-US" dirty="0" smtClean="0"/>
-              <a:t>I’ll assist Mac and GNU/Linux users</a:t>
-            </a:r>
-          </a:p>
-          <a:p>
-            <a:r>
-              <a:rPr lang="en-US" dirty="0" smtClean="0"/>
-              <a:t>What to install?</a:t>
-            </a:r>
-          </a:p>
-          <a:p>
-            <a:pPr lvl="1"/>
-            <a:r>
-              <a:rPr lang="en-US" dirty="0" smtClean="0"/>
-              <a:t>Server</a:t>
-            </a:r>
-          </a:p>
-          <a:p>
-            <a:pPr lvl="1"/>
-            <a:r>
-              <a:rPr lang="en-US" dirty="0" smtClean="0"/>
-              <a:t>Workbench</a:t>
-            </a:r>
-          </a:p>
-          <a:p>
-            <a:pPr lvl="1"/>
-            <a:r>
-              <a:rPr lang="en-US" dirty="0" smtClean="0"/>
-              <a:t>Sample</a:t>
-            </a:r>
-          </a:p>
-          <a:p>
-            <a:pPr lvl="1"/>
-            <a:r>
-              <a:rPr lang="en-US" dirty="0" smtClean="0"/>
-              <a:t>Documentation (optional)</a:t>
-            </a:r>
-          </a:p>
-          <a:p>
-            <a:pPr lvl="1"/>
+              <a:rPr lang="en-US" dirty="0" smtClean="0"/>
+              <a:t>Open Source (GPL License)</a:t>
+            </a:r>
+          </a:p>
+          <a:p>
+            <a:r>
+              <a:rPr lang="en-US" dirty="0" smtClean="0"/>
+              <a:t>Cross-platform</a:t>
+            </a:r>
+          </a:p>
+          <a:p>
+            <a:r>
+              <a:rPr lang="en-US" dirty="0" smtClean="0"/>
+              <a:t>Easy to install and use</a:t>
+            </a:r>
+          </a:p>
+          <a:p>
+            <a:r>
+              <a:rPr lang="en-US" dirty="0" smtClean="0"/>
+              <a:t>Easily available</a:t>
+            </a:r>
+          </a:p>
+          <a:p>
+            <a:r>
+              <a:rPr lang="en-US" dirty="0" smtClean="0"/>
+              <a:t>Great community support</a:t>
+            </a:r>
             <a:endParaRPr lang="en-US" dirty="0"/>
           </a:p>
         </p:txBody>
@@ -6916,7 +8100,7 @@
     </p:spTree>
     <p:extLst>
       <p:ext uri="{BB962C8B-B14F-4D97-AF65-F5344CB8AC3E}">
-        <p14:creationId xmlns:p14="http://schemas.microsoft.com/office/powerpoint/2010/main" val="1321342305"/>
+        <p14:creationId xmlns:p14="http://schemas.microsoft.com/office/powerpoint/2010/main" val="451513678"/>
       </p:ext>
     </p:extLst>
   </p:cSld>
@@ -6960,7 +8144,7 @@
           <a:p>
             <a:r>
               <a:rPr lang="en-US" dirty="0" smtClean="0"/>
-              <a:t>Day 2: Exploring database</a:t>
+              <a:t>Installing MySQL</a:t>
             </a:r>
             <a:endParaRPr lang="en-US" dirty="0"/>
           </a:p>
@@ -6976,84 +8160,76 @@
             <p:ph idx="1"/>
           </p:nvPr>
         </p:nvSpPr>
-        <p:spPr>
-          <a:xfrm>
-            <a:off x="1103312" y="2052918"/>
-            <a:ext cx="8946541" cy="4262538"/>
-          </a:xfrm>
-        </p:spPr>
-        <p:txBody>
-          <a:bodyPr>
-            <a:normAutofit/>
-          </a:bodyPr>
-          <a:lstStyle/>
-          <a:p>
-            <a:r>
-              <a:rPr lang="en-US" dirty="0" smtClean="0"/>
-              <a:t>Let’s see what Workbench shows us</a:t>
-            </a:r>
-          </a:p>
-          <a:p>
-            <a:r>
-              <a:rPr lang="en-US" dirty="0" smtClean="0"/>
-              <a:t>Database terminologies</a:t>
+        <p:spPr/>
+        <p:txBody>
+          <a:bodyPr/>
+          <a:lstStyle/>
+          <a:p>
+            <a:r>
+              <a:rPr lang="en-US" dirty="0" smtClean="0">
+                <a:hlinkClick r:id="rId2"/>
+              </a:rPr>
+              <a:t>http</a:t>
+            </a:r>
+            <a:r>
+              <a:rPr lang="en-US" dirty="0">
+                <a:hlinkClick r:id="rId2"/>
+              </a:rPr>
+              <a:t>://zedfox.us/blog/install-mysql-5-7-on-windows-10</a:t>
+            </a:r>
+            <a:r>
+              <a:rPr lang="en-US" dirty="0" smtClean="0">
+                <a:hlinkClick r:id="rId2"/>
+              </a:rPr>
+              <a:t>/</a:t>
+            </a:r>
+            <a:r>
+              <a:rPr lang="en-US" dirty="0" smtClean="0"/>
+              <a:t> for Windows users</a:t>
+            </a:r>
+          </a:p>
+          <a:p>
+            <a:r>
+              <a:rPr lang="en-US" dirty="0" smtClean="0"/>
+              <a:t>I’ll assist Mac and GNU/Linux users</a:t>
+            </a:r>
+          </a:p>
+          <a:p>
+            <a:r>
+              <a:rPr lang="en-US" dirty="0" smtClean="0"/>
+              <a:t>What to install?</a:t>
             </a:r>
           </a:p>
           <a:p>
             <a:pPr lvl="1"/>
             <a:r>
               <a:rPr lang="en-US" dirty="0" smtClean="0"/>
-              <a:t>Server: Operating System</a:t>
+              <a:t>Server</a:t>
             </a:r>
           </a:p>
           <a:p>
             <a:pPr lvl="1"/>
             <a:r>
               <a:rPr lang="en-US" dirty="0" smtClean="0"/>
-              <a:t>Server: Database server</a:t>
+              <a:t>Workbench</a:t>
             </a:r>
           </a:p>
           <a:p>
             <a:pPr lvl="1"/>
             <a:r>
               <a:rPr lang="en-US" dirty="0" smtClean="0"/>
-              <a:t>Database instance</a:t>
+              <a:t>Sample</a:t>
             </a:r>
           </a:p>
           <a:p>
             <a:pPr lvl="1"/>
             <a:r>
               <a:rPr lang="en-US" dirty="0" smtClean="0"/>
-              <a:t>Schema</a:t>
-            </a:r>
-          </a:p>
-          <a:p>
-            <a:pPr lvl="2"/>
-            <a:r>
-              <a:rPr lang="en-US" dirty="0" smtClean="0"/>
-              <a:t>Table – has constraints, keys, triggers</a:t>
-            </a:r>
-          </a:p>
-          <a:p>
-            <a:pPr lvl="2"/>
-            <a:r>
-              <a:rPr lang="en-US" dirty="0" smtClean="0"/>
-              <a:t>View</a:t>
-            </a:r>
-          </a:p>
-          <a:p>
-            <a:pPr lvl="2"/>
-            <a:r>
-              <a:rPr lang="en-US" dirty="0" smtClean="0"/>
-              <a:t>Stored procedures</a:t>
-            </a:r>
-          </a:p>
-          <a:p>
-            <a:pPr lvl="2"/>
-            <a:r>
-              <a:rPr lang="en-US" dirty="0" smtClean="0"/>
-              <a:t>Functions</a:t>
-            </a:r>
+              <a:t>Documentation (optional)</a:t>
+            </a:r>
+          </a:p>
+          <a:p>
+            <a:pPr lvl="1"/>
             <a:endParaRPr lang="en-US" dirty="0"/>
           </a:p>
         </p:txBody>
@@ -7061,7 +8237,7 @@
     </p:spTree>
     <p:extLst>
       <p:ext uri="{BB962C8B-B14F-4D97-AF65-F5344CB8AC3E}">
-        <p14:creationId xmlns:p14="http://schemas.microsoft.com/office/powerpoint/2010/main" val="86598072"/>
+        <p14:creationId xmlns:p14="http://schemas.microsoft.com/office/powerpoint/2010/main" val="1321342305"/>
       </p:ext>
     </p:extLst>
   </p:cSld>
@@ -7105,7 +8281,7 @@
           <a:p>
             <a:r>
               <a:rPr lang="en-US" dirty="0" smtClean="0"/>
-              <a:t>Workbench</a:t>
+              <a:t>Day 2: Exploring database</a:t>
             </a:r>
             <a:endParaRPr lang="en-US" dirty="0"/>
           </a:p>
@@ -7121,50 +8297,83 @@
             <p:ph idx="1"/>
           </p:nvPr>
         </p:nvSpPr>
-        <p:spPr/>
-        <p:txBody>
-          <a:bodyPr/>
-          <a:lstStyle/>
-          <a:p>
-            <a:r>
-              <a:rPr lang="en-US" dirty="0" smtClean="0"/>
-              <a:t>Items that interest Database Administrators</a:t>
-            </a:r>
-          </a:p>
-          <a:p>
-            <a:r>
-              <a:rPr lang="en-US" dirty="0" smtClean="0"/>
-              <a:t>Server status</a:t>
-            </a:r>
-          </a:p>
-          <a:p>
-            <a:r>
-              <a:rPr lang="en-US" dirty="0" smtClean="0"/>
-              <a:t>Users</a:t>
-            </a:r>
-          </a:p>
-          <a:p>
-            <a:r>
-              <a:rPr lang="en-US" dirty="0" smtClean="0"/>
-              <a:t>Client connections</a:t>
-            </a:r>
-          </a:p>
-          <a:p>
-            <a:r>
-              <a:rPr lang="en-US" dirty="0" smtClean="0"/>
-              <a:t>Variables</a:t>
-            </a:r>
-          </a:p>
-          <a:p>
-            <a:r>
-              <a:rPr lang="en-US" dirty="0" smtClean="0"/>
-              <a:t>Performance</a:t>
-            </a:r>
-          </a:p>
-          <a:p>
-            <a:r>
-              <a:rPr lang="en-US" dirty="0" smtClean="0"/>
-              <a:t>Other management tasks</a:t>
+        <p:spPr>
+          <a:xfrm>
+            <a:off x="1103312" y="2052918"/>
+            <a:ext cx="8946541" cy="4262538"/>
+          </a:xfrm>
+        </p:spPr>
+        <p:txBody>
+          <a:bodyPr>
+            <a:normAutofit/>
+          </a:bodyPr>
+          <a:lstStyle/>
+          <a:p>
+            <a:r>
+              <a:rPr lang="en-US" dirty="0" smtClean="0"/>
+              <a:t>Let’s see what Workbench shows us</a:t>
+            </a:r>
+          </a:p>
+          <a:p>
+            <a:r>
+              <a:rPr lang="en-US" dirty="0" smtClean="0"/>
+              <a:t>Database terminologies</a:t>
+            </a:r>
+          </a:p>
+          <a:p>
+            <a:pPr lvl="1"/>
+            <a:r>
+              <a:rPr lang="en-US" dirty="0" smtClean="0"/>
+              <a:t>Server: Operating System</a:t>
+            </a:r>
+          </a:p>
+          <a:p>
+            <a:pPr lvl="1"/>
+            <a:r>
+              <a:rPr lang="en-US" dirty="0" smtClean="0"/>
+              <a:t>Server: Database server</a:t>
+            </a:r>
+          </a:p>
+          <a:p>
+            <a:pPr lvl="1"/>
+            <a:r>
+              <a:rPr lang="en-US" dirty="0" smtClean="0"/>
+              <a:t>Database instance</a:t>
+            </a:r>
+          </a:p>
+          <a:p>
+            <a:pPr lvl="1"/>
+            <a:r>
+              <a:rPr lang="en-US" dirty="0" smtClean="0"/>
+              <a:t>Schema</a:t>
+            </a:r>
+          </a:p>
+          <a:p>
+            <a:pPr lvl="2"/>
+            <a:r>
+              <a:rPr lang="en-US" dirty="0" smtClean="0"/>
+              <a:t>Table – has constraints, keys, triggers</a:t>
+            </a:r>
+          </a:p>
+          <a:p>
+            <a:pPr lvl="2"/>
+            <a:r>
+              <a:rPr lang="en-US" dirty="0" smtClean="0"/>
+              <a:t>View</a:t>
+            </a:r>
+          </a:p>
+          <a:p>
+            <a:pPr lvl="2"/>
+            <a:r>
+              <a:rPr lang="en-US" dirty="0" smtClean="0"/>
+              <a:t>Stored procedures</a:t>
+            </a:r>
+          </a:p>
+          <a:p>
+            <a:pPr lvl="2"/>
+            <a:r>
+              <a:rPr lang="en-US" dirty="0" smtClean="0"/>
+              <a:t>Functions</a:t>
             </a:r>
             <a:endParaRPr lang="en-US" dirty="0"/>
           </a:p>
@@ -7173,7 +8382,7 @@
     </p:spTree>
     <p:extLst>
       <p:ext uri="{BB962C8B-B14F-4D97-AF65-F5344CB8AC3E}">
-        <p14:creationId xmlns:p14="http://schemas.microsoft.com/office/powerpoint/2010/main" val="1236169324"/>
+        <p14:creationId xmlns:p14="http://schemas.microsoft.com/office/powerpoint/2010/main" val="86598072"/>
       </p:ext>
     </p:extLst>
   </p:cSld>
@@ -7217,7 +8426,7 @@
           <a:p>
             <a:r>
               <a:rPr lang="en-US" dirty="0" smtClean="0"/>
-              <a:t>Database objects</a:t>
+              <a:t>Workbench</a:t>
             </a:r>
             <a:endParaRPr lang="en-US" dirty="0"/>
           </a:p>
@@ -7240,45 +8449,44 @@
           <a:p>
             <a:r>
               <a:rPr lang="en-US" dirty="0" smtClean="0"/>
-              <a:t>Items that interest Database Developers</a:t>
-            </a:r>
-          </a:p>
-          <a:p>
-            <a:r>
-              <a:rPr lang="en-US" dirty="0" smtClean="0"/>
-              <a:t>Schema</a:t>
-            </a:r>
-            <a:endParaRPr lang="en-US" dirty="0"/>
-          </a:p>
-          <a:p>
-            <a:pPr lvl="1"/>
-            <a:r>
-              <a:rPr lang="en-US" dirty="0"/>
-              <a:t>Table – has constraints, keys, triggers</a:t>
-            </a:r>
-          </a:p>
-          <a:p>
-            <a:pPr lvl="1"/>
-            <a:r>
-              <a:rPr lang="en-US" dirty="0"/>
-              <a:t>View</a:t>
-            </a:r>
-          </a:p>
-          <a:p>
-            <a:pPr lvl="1"/>
-            <a:r>
-              <a:rPr lang="en-US" dirty="0"/>
-              <a:t>Stored procedures</a:t>
-            </a:r>
-          </a:p>
-          <a:p>
-            <a:pPr lvl="1"/>
-            <a:r>
-              <a:rPr lang="en-US" dirty="0"/>
-              <a:t>Functions</a:t>
-            </a:r>
-          </a:p>
-          <a:p>
+              <a:t>Items that interest Database Administrators</a:t>
+            </a:r>
+          </a:p>
+          <a:p>
+            <a:r>
+              <a:rPr lang="en-US" dirty="0" smtClean="0"/>
+              <a:t>Server status</a:t>
+            </a:r>
+          </a:p>
+          <a:p>
+            <a:r>
+              <a:rPr lang="en-US" dirty="0" smtClean="0"/>
+              <a:t>Users</a:t>
+            </a:r>
+          </a:p>
+          <a:p>
+            <a:r>
+              <a:rPr lang="en-US" dirty="0" smtClean="0"/>
+              <a:t>Client connections</a:t>
+            </a:r>
+          </a:p>
+          <a:p>
+            <a:r>
+              <a:rPr lang="en-US" dirty="0" smtClean="0"/>
+              <a:t>Variables</a:t>
+            </a:r>
+          </a:p>
+          <a:p>
+            <a:r>
+              <a:rPr lang="en-US" dirty="0" smtClean="0"/>
+              <a:t>Performance</a:t>
+            </a:r>
+          </a:p>
+          <a:p>
+            <a:r>
+              <a:rPr lang="en-US" dirty="0" smtClean="0"/>
+              <a:t>Other management tasks</a:t>
+            </a:r>
             <a:endParaRPr lang="en-US" dirty="0"/>
           </a:p>
         </p:txBody>
@@ -7286,7 +8494,7 @@
     </p:spTree>
     <p:extLst>
       <p:ext uri="{BB962C8B-B14F-4D97-AF65-F5344CB8AC3E}">
-        <p14:creationId xmlns:p14="http://schemas.microsoft.com/office/powerpoint/2010/main" val="3209666376"/>
+        <p14:creationId xmlns:p14="http://schemas.microsoft.com/office/powerpoint/2010/main" val="1236169324"/>
       </p:ext>
     </p:extLst>
   </p:cSld>

</xml_diff>

<commit_message>
Day 5 JOIN, Sub query, Grouping, Explain
</commit_message>
<xml_diff>
--- a/Presentation/Database-Bootcamp-Presentation.pptx
+++ b/Presentation/Database-Bootcamp-Presentation.pptx
@@ -38,6 +38,9 @@
     <p:sldId id="286" r:id="rId32"/>
     <p:sldId id="287" r:id="rId33"/>
     <p:sldId id="288" r:id="rId34"/>
+    <p:sldId id="289" r:id="rId35"/>
+    <p:sldId id="290" r:id="rId36"/>
+    <p:sldId id="291" r:id="rId37"/>
   </p:sldIdLst>
   <p:sldSz cx="12192000" cy="6858000"/>
   <p:notesSz cx="6858000" cy="9144000"/>
@@ -13100,21 +13103,45 @@
             </a:pPr>
             <a:r>
               <a:rPr lang="en-US" dirty="0" smtClean="0"/>
-              <a:t>JOIN departments d ON </a:t>
-            </a:r>
-            <a:r>
-              <a:rPr lang="en-US" dirty="0" err="1" smtClean="0"/>
+              <a:t>JOIN </a:t>
+            </a:r>
+            <a:r>
+              <a:rPr lang="en-US" dirty="0" smtClean="0">
+                <a:solidFill>
+                  <a:srgbClr val="FFFF00"/>
+                </a:solidFill>
+              </a:rPr>
+              <a:t>departments d ON </a:t>
+            </a:r>
+            <a:r>
+              <a:rPr lang="en-US" dirty="0" err="1" smtClean="0">
+                <a:solidFill>
+                  <a:srgbClr val="FFFF00"/>
+                </a:solidFill>
+              </a:rPr>
               <a:t>d.dept_no</a:t>
             </a:r>
             <a:r>
-              <a:rPr lang="en-US" dirty="0" smtClean="0"/>
+              <a:rPr lang="en-US" dirty="0" smtClean="0">
+                <a:solidFill>
+                  <a:srgbClr val="FFFF00"/>
+                </a:solidFill>
+              </a:rPr>
               <a:t> = </a:t>
             </a:r>
             <a:r>
-              <a:rPr lang="en-US" dirty="0" err="1" smtClean="0"/>
+              <a:rPr lang="en-US" dirty="0" err="1" smtClean="0">
+                <a:solidFill>
+                  <a:srgbClr val="FFFF00"/>
+                </a:solidFill>
+              </a:rPr>
               <a:t>e.dept_no</a:t>
             </a:r>
-            <a:endParaRPr lang="en-US" dirty="0"/>
+            <a:endParaRPr lang="en-US" dirty="0">
+              <a:solidFill>
+                <a:srgbClr val="FFFF00"/>
+              </a:solidFill>
+            </a:endParaRPr>
           </a:p>
           <a:p>
             <a:pPr marL="0" indent="0">
@@ -13144,30 +13171,62 @@
             </a:pPr>
             <a:r>
               <a:rPr lang="en-US" dirty="0" smtClean="0"/>
-              <a:t>JOIN family f ON </a:t>
-            </a:r>
-            <a:r>
-              <a:rPr lang="en-US" dirty="0" err="1" smtClean="0"/>
+              <a:t>JOIN </a:t>
+            </a:r>
+            <a:r>
+              <a:rPr lang="en-US" dirty="0" smtClean="0">
+                <a:solidFill>
+                  <a:srgbClr val="FFFF00"/>
+                </a:solidFill>
+              </a:rPr>
+              <a:t>family f ON </a:t>
+            </a:r>
+            <a:r>
+              <a:rPr lang="en-US" dirty="0" err="1" smtClean="0">
+                <a:solidFill>
+                  <a:srgbClr val="FFFF00"/>
+                </a:solidFill>
+              </a:rPr>
               <a:t>f.empno</a:t>
             </a:r>
             <a:r>
-              <a:rPr lang="en-US" dirty="0" smtClean="0"/>
+              <a:rPr lang="en-US" dirty="0" smtClean="0">
+                <a:solidFill>
+                  <a:srgbClr val="FFFF00"/>
+                </a:solidFill>
+              </a:rPr>
               <a:t> = </a:t>
             </a:r>
             <a:r>
-              <a:rPr lang="en-US" dirty="0" err="1" smtClean="0"/>
+              <a:rPr lang="en-US" dirty="0" err="1" smtClean="0">
+                <a:solidFill>
+                  <a:srgbClr val="FFFF00"/>
+                </a:solidFill>
+              </a:rPr>
               <a:t>e.empno</a:t>
             </a:r>
             <a:r>
-              <a:rPr lang="en-US" dirty="0" smtClean="0"/>
+              <a:rPr lang="en-US" dirty="0" smtClean="0">
+                <a:solidFill>
+                  <a:srgbClr val="FFFF00"/>
+                </a:solidFill>
+              </a:rPr>
               <a:t> AND </a:t>
             </a:r>
             <a:r>
-              <a:rPr lang="en-US" dirty="0" err="1" smtClean="0"/>
+              <a:rPr lang="en-US" dirty="0" err="1" smtClean="0">
+                <a:solidFill>
+                  <a:srgbClr val="FFFF00"/>
+                </a:solidFill>
+              </a:rPr>
               <a:t>f.rel</a:t>
             </a:r>
             <a:r>
-              <a:rPr lang="en-US" dirty="0" smtClean="0"/>
+              <a:rPr lang="en-US" dirty="0" smtClean="0">
+                <a:solidFill>
+                  <a:srgbClr val="FFFF00"/>
+                </a:solidFill>
+              </a:rPr>
               <a:t> = ‘SPOUSE’</a:t>
             </a:r>
           </a:p>
@@ -13197,19 +13256,35 @@
               <a:t>    </a:t>
             </a:r>
             <a:r>
-              <a:rPr lang="en-US" dirty="0"/>
+              <a:rPr lang="en-US" dirty="0">
+                <a:solidFill>
+                  <a:srgbClr val="FFFF00"/>
+                </a:solidFill>
+              </a:rPr>
               <a:t>A</a:t>
             </a:r>
             <a:r>
-              <a:rPr lang="en-US" dirty="0" smtClean="0"/>
+              <a:rPr lang="en-US" dirty="0" smtClean="0">
+                <a:solidFill>
+                  <a:srgbClr val="FFFF00"/>
+                </a:solidFill>
+              </a:rPr>
               <a:t>ND </a:t>
             </a:r>
             <a:r>
-              <a:rPr lang="en-US" dirty="0" err="1" smtClean="0"/>
+              <a:rPr lang="en-US" dirty="0" err="1" smtClean="0">
+                <a:solidFill>
+                  <a:srgbClr val="FFFF00"/>
+                </a:solidFill>
+              </a:rPr>
               <a:t>d.country</a:t>
             </a:r>
             <a:r>
-              <a:rPr lang="en-US" dirty="0" smtClean="0"/>
+              <a:rPr lang="en-US" dirty="0" smtClean="0">
+                <a:solidFill>
+                  <a:srgbClr val="FFFF00"/>
+                </a:solidFill>
+              </a:rPr>
               <a:t> = ‘USA’</a:t>
             </a:r>
           </a:p>
@@ -13304,22 +13379,294 @@
             <p:ph idx="1"/>
           </p:nvPr>
         </p:nvSpPr>
-        <p:spPr/>
-        <p:txBody>
-          <a:bodyPr/>
+        <p:spPr>
+          <a:xfrm>
+            <a:off x="1103312" y="2052918"/>
+            <a:ext cx="8946541" cy="4805082"/>
+          </a:xfrm>
+        </p:spPr>
+        <p:txBody>
+          <a:bodyPr>
+            <a:normAutofit/>
+          </a:bodyPr>
           <a:lstStyle/>
           <a:p>
             <a:r>
               <a:rPr lang="en-US" dirty="0" smtClean="0"/>
-              <a:t>Extract small amounts of data efficiently into on-the-fly-tables and JOIN them </a:t>
-            </a:r>
-            <a:r>
-              <a:rPr lang="en-US" smtClean="0"/>
-              <a:t>to actual tables</a:t>
-            </a:r>
-          </a:p>
-          <a:p>
-            <a:endParaRPr lang="en-US"/>
+              <a:t>Extract small amounts of data efficiently into on-the-fly-tables and JOIN them to actual </a:t>
+            </a:r>
+            <a:r>
+              <a:rPr lang="en-US" dirty="0" smtClean="0"/>
+              <a:t>tables</a:t>
+            </a:r>
+          </a:p>
+          <a:p>
+            <a:pPr marL="0" indent="0">
+              <a:buNone/>
+            </a:pPr>
+            <a:r>
+              <a:rPr lang="en-US" dirty="0"/>
+              <a:t>SELECT </a:t>
+            </a:r>
+            <a:r>
+              <a:rPr lang="en-US" dirty="0" err="1"/>
+              <a:t>e.fullname</a:t>
+            </a:r>
+            <a:r>
+              <a:rPr lang="en-US" dirty="0"/>
+              <a:t>, </a:t>
+            </a:r>
+            <a:r>
+              <a:rPr lang="en-US" dirty="0" err="1"/>
+              <a:t>f.spousename</a:t>
+            </a:r>
+            <a:r>
+              <a:rPr lang="en-US" dirty="0"/>
+              <a:t>, </a:t>
+            </a:r>
+            <a:r>
+              <a:rPr lang="en-US" dirty="0" err="1"/>
+              <a:t>d.deptname</a:t>
+            </a:r>
+            <a:r>
+              <a:rPr lang="en-US" dirty="0"/>
+              <a:t>, </a:t>
+            </a:r>
+            <a:r>
+              <a:rPr lang="en-US" dirty="0" err="1"/>
+              <a:t>l.city</a:t>
+            </a:r>
+            <a:r>
+              <a:rPr lang="en-US" dirty="0"/>
+              <a:t>, </a:t>
+            </a:r>
+            <a:r>
+              <a:rPr lang="en-US" dirty="0" err="1"/>
+              <a:t>l.state</a:t>
+            </a:r>
+            <a:endParaRPr lang="en-US" dirty="0"/>
+          </a:p>
+          <a:p>
+            <a:pPr marL="0" indent="0">
+              <a:buNone/>
+            </a:pPr>
+            <a:r>
+              <a:rPr lang="en-US" dirty="0"/>
+              <a:t>FROM employees e</a:t>
+            </a:r>
+          </a:p>
+          <a:p>
+            <a:pPr marL="0" indent="0">
+              <a:buNone/>
+            </a:pPr>
+            <a:r>
+              <a:rPr lang="en-US" dirty="0"/>
+              <a:t>JOIN </a:t>
+            </a:r>
+            <a:r>
+              <a:rPr lang="en-US" dirty="0" smtClean="0">
+                <a:solidFill>
+                  <a:srgbClr val="FFFF00"/>
+                </a:solidFill>
+              </a:rPr>
+              <a:t>(SELECT </a:t>
+            </a:r>
+            <a:r>
+              <a:rPr lang="en-US" dirty="0" err="1" smtClean="0">
+                <a:solidFill>
+                  <a:srgbClr val="FFFF00"/>
+                </a:solidFill>
+              </a:rPr>
+              <a:t>deptname</a:t>
+            </a:r>
+            <a:r>
+              <a:rPr lang="en-US" dirty="0" smtClean="0">
+                <a:solidFill>
+                  <a:srgbClr val="FFFF00"/>
+                </a:solidFill>
+              </a:rPr>
+              <a:t>, </a:t>
+            </a:r>
+            <a:r>
+              <a:rPr lang="en-US" dirty="0" err="1" smtClean="0">
+                <a:solidFill>
+                  <a:srgbClr val="FFFF00"/>
+                </a:solidFill>
+              </a:rPr>
+              <a:t>dept_no</a:t>
+            </a:r>
+            <a:r>
+              <a:rPr lang="en-US" dirty="0" smtClean="0">
+                <a:solidFill>
+                  <a:srgbClr val="FFFF00"/>
+                </a:solidFill>
+              </a:rPr>
+              <a:t> FROM departments </a:t>
+            </a:r>
+          </a:p>
+          <a:p>
+            <a:pPr marL="0" indent="0">
+              <a:buNone/>
+            </a:pPr>
+            <a:r>
+              <a:rPr lang="en-US" dirty="0">
+                <a:solidFill>
+                  <a:srgbClr val="FFFF00"/>
+                </a:solidFill>
+              </a:rPr>
+              <a:t> </a:t>
+            </a:r>
+            <a:r>
+              <a:rPr lang="en-US" dirty="0" smtClean="0">
+                <a:solidFill>
+                  <a:srgbClr val="FFFF00"/>
+                </a:solidFill>
+              </a:rPr>
+              <a:t>          WHERE country = ‘USA’)</a:t>
+            </a:r>
+            <a:r>
+              <a:rPr lang="en-US" dirty="0" smtClean="0"/>
+              <a:t> d on </a:t>
+            </a:r>
+            <a:r>
+              <a:rPr lang="en-US" dirty="0" err="1" smtClean="0"/>
+              <a:t>d.dept_no</a:t>
+            </a:r>
+            <a:r>
+              <a:rPr lang="en-US" dirty="0" smtClean="0"/>
+              <a:t> = </a:t>
+            </a:r>
+            <a:r>
+              <a:rPr lang="en-US" dirty="0" err="1" smtClean="0"/>
+              <a:t>e.dept_no</a:t>
+            </a:r>
+            <a:endParaRPr lang="en-US" dirty="0"/>
+          </a:p>
+          <a:p>
+            <a:pPr marL="0" indent="0">
+              <a:buNone/>
+            </a:pPr>
+            <a:r>
+              <a:rPr lang="en-US" dirty="0"/>
+              <a:t>JOIN locations l ON </a:t>
+            </a:r>
+            <a:r>
+              <a:rPr lang="en-US" dirty="0" err="1"/>
+              <a:t>l.loc_id</a:t>
+            </a:r>
+            <a:r>
+              <a:rPr lang="en-US" dirty="0"/>
+              <a:t> = </a:t>
+            </a:r>
+            <a:r>
+              <a:rPr lang="en-US" dirty="0" err="1"/>
+              <a:t>d.loc_id</a:t>
+            </a:r>
+            <a:endParaRPr lang="en-US" dirty="0"/>
+          </a:p>
+          <a:p>
+            <a:pPr marL="0" indent="0">
+              <a:buNone/>
+            </a:pPr>
+            <a:r>
+              <a:rPr lang="en-US" dirty="0"/>
+              <a:t>JOIN family f ON </a:t>
+            </a:r>
+            <a:r>
+              <a:rPr lang="en-US" dirty="0" err="1"/>
+              <a:t>f.empno</a:t>
+            </a:r>
+            <a:r>
+              <a:rPr lang="en-US" dirty="0"/>
+              <a:t> = </a:t>
+            </a:r>
+            <a:r>
+              <a:rPr lang="en-US" dirty="0" err="1"/>
+              <a:t>e.empno</a:t>
+            </a:r>
+            <a:r>
+              <a:rPr lang="en-US" dirty="0"/>
+              <a:t> AND </a:t>
+            </a:r>
+            <a:r>
+              <a:rPr lang="en-US" dirty="0" err="1"/>
+              <a:t>f.rel</a:t>
+            </a:r>
+            <a:r>
+              <a:rPr lang="en-US" dirty="0"/>
+              <a:t> = ‘SPOUSE’</a:t>
+            </a:r>
+          </a:p>
+          <a:p>
+            <a:pPr marL="0" indent="0">
+              <a:buNone/>
+            </a:pPr>
+            <a:r>
+              <a:rPr lang="en-US" dirty="0">
+                <a:solidFill>
+                  <a:srgbClr val="FFFF00"/>
+                </a:solidFill>
+              </a:rPr>
+              <a:t>WHERE </a:t>
+            </a:r>
+            <a:r>
+              <a:rPr lang="en-US" dirty="0" err="1">
+                <a:solidFill>
+                  <a:srgbClr val="FFFF00"/>
+                </a:solidFill>
+              </a:rPr>
+              <a:t>e.salary</a:t>
+            </a:r>
+            <a:r>
+              <a:rPr lang="en-US" dirty="0">
+                <a:solidFill>
+                  <a:srgbClr val="FFFF00"/>
+                </a:solidFill>
+              </a:rPr>
+              <a:t> &gt; </a:t>
+            </a:r>
+            <a:r>
+              <a:rPr lang="en-US" dirty="0" smtClean="0">
+                <a:solidFill>
+                  <a:srgbClr val="FFFF00"/>
+                </a:solidFill>
+              </a:rPr>
+              <a:t>100000</a:t>
+            </a:r>
+            <a:endParaRPr lang="en-US" dirty="0">
+              <a:solidFill>
+                <a:srgbClr val="FFFF00"/>
+              </a:solidFill>
+            </a:endParaRPr>
+          </a:p>
+          <a:p>
+            <a:pPr marL="0" indent="0">
+              <a:buNone/>
+            </a:pPr>
+            <a:r>
+              <a:rPr lang="en-US" dirty="0"/>
+              <a:t>ORDER BY </a:t>
+            </a:r>
+            <a:r>
+              <a:rPr lang="en-US" dirty="0" err="1"/>
+              <a:t>e.age</a:t>
+            </a:r>
+            <a:r>
+              <a:rPr lang="en-US" dirty="0"/>
+              <a:t> DESC</a:t>
+            </a:r>
+          </a:p>
+          <a:p>
+            <a:pPr marL="0" indent="0">
+              <a:buNone/>
+            </a:pPr>
+            <a:r>
+              <a:rPr lang="en-US" dirty="0"/>
+              <a:t>LIMIT 0, 100;</a:t>
+            </a:r>
+          </a:p>
+          <a:p>
+            <a:endParaRPr lang="en-US" dirty="0"/>
           </a:p>
         </p:txBody>
       </p:sp>
@@ -13327,6 +13674,697 @@
     <p:extLst>
       <p:ext uri="{BB962C8B-B14F-4D97-AF65-F5344CB8AC3E}">
         <p14:creationId xmlns:p14="http://schemas.microsoft.com/office/powerpoint/2010/main" val="1777720145"/>
+      </p:ext>
+    </p:extLst>
+  </p:cSld>
+  <p:clrMapOvr>
+    <a:masterClrMapping/>
+  </p:clrMapOvr>
+</p:sld>
+</file>
+
+<file path=ppt/slides/slide34.xml><?xml version="1.0" encoding="utf-8"?>
+<p:sld xmlns:a="http://schemas.openxmlformats.org/drawingml/2006/main" xmlns:r="http://schemas.openxmlformats.org/officeDocument/2006/relationships" xmlns:p="http://schemas.openxmlformats.org/presentationml/2006/main">
+  <p:cSld>
+    <p:spTree>
+      <p:nvGrpSpPr>
+        <p:cNvPr id="1" name=""/>
+        <p:cNvGrpSpPr/>
+        <p:nvPr/>
+      </p:nvGrpSpPr>
+      <p:grpSpPr>
+        <a:xfrm>
+          <a:off x="0" y="0"/>
+          <a:ext cx="0" cy="0"/>
+          <a:chOff x="0" y="0"/>
+          <a:chExt cx="0" cy="0"/>
+        </a:xfrm>
+      </p:grpSpPr>
+      <p:sp>
+        <p:nvSpPr>
+          <p:cNvPr id="2" name="Title 1"/>
+          <p:cNvSpPr>
+            <a:spLocks noGrp="1"/>
+          </p:cNvSpPr>
+          <p:nvPr>
+            <p:ph type="title"/>
+          </p:nvPr>
+        </p:nvSpPr>
+        <p:spPr/>
+        <p:txBody>
+          <a:bodyPr/>
+          <a:lstStyle/>
+          <a:p>
+            <a:r>
+              <a:rPr lang="en-US" dirty="0" smtClean="0"/>
+              <a:t>Count, group count</a:t>
+            </a:r>
+            <a:endParaRPr lang="en-US" dirty="0"/>
+          </a:p>
+        </p:txBody>
+      </p:sp>
+      <p:sp>
+        <p:nvSpPr>
+          <p:cNvPr id="3" name="Content Placeholder 2"/>
+          <p:cNvSpPr>
+            <a:spLocks noGrp="1"/>
+          </p:cNvSpPr>
+          <p:nvPr>
+            <p:ph idx="1"/>
+          </p:nvPr>
+        </p:nvSpPr>
+        <p:spPr>
+          <a:xfrm>
+            <a:off x="1103312" y="2052918"/>
+            <a:ext cx="8946541" cy="4701450"/>
+          </a:xfrm>
+        </p:spPr>
+        <p:txBody>
+          <a:bodyPr>
+            <a:normAutofit fontScale="92500" lnSpcReduction="10000"/>
+          </a:bodyPr>
+          <a:lstStyle/>
+          <a:p>
+            <a:r>
+              <a:rPr lang="en-US" dirty="0" smtClean="0"/>
+              <a:t>Count by &lt;something&gt; requires &lt;something&gt; to be grouped</a:t>
+            </a:r>
+          </a:p>
+          <a:p>
+            <a:r>
+              <a:rPr lang="en-US" dirty="0" smtClean="0"/>
+              <a:t>How many Honda accords are there in the parking lot?</a:t>
+            </a:r>
+          </a:p>
+          <a:p>
+            <a:pPr lvl="1"/>
+            <a:r>
+              <a:rPr lang="en-US" dirty="0" smtClean="0"/>
+              <a:t>Separate out Hondas and count, OR</a:t>
+            </a:r>
+          </a:p>
+          <a:p>
+            <a:pPr lvl="1"/>
+            <a:r>
+              <a:rPr lang="en-US" dirty="0" smtClean="0"/>
+              <a:t>Go to cars sequentially. Count when you come across Honda</a:t>
+            </a:r>
+          </a:p>
+          <a:p>
+            <a:pPr marL="0" indent="0">
+              <a:buNone/>
+            </a:pPr>
+            <a:r>
+              <a:rPr lang="en-US" dirty="0" smtClean="0"/>
+              <a:t>SELECT model, COUNT(*)</a:t>
+            </a:r>
+          </a:p>
+          <a:p>
+            <a:pPr marL="0" indent="0">
+              <a:buNone/>
+            </a:pPr>
+            <a:r>
+              <a:rPr lang="en-US" dirty="0" smtClean="0"/>
+              <a:t>FROM cars </a:t>
+            </a:r>
+            <a:r>
+              <a:rPr lang="en-US" dirty="0" smtClean="0">
+                <a:solidFill>
+                  <a:srgbClr val="FFFF00"/>
+                </a:solidFill>
+              </a:rPr>
+              <a:t>WHERE model = ‘HONDA’ </a:t>
+            </a:r>
+          </a:p>
+          <a:p>
+            <a:pPr marL="0" indent="0">
+              <a:buNone/>
+            </a:pPr>
+            <a:r>
+              <a:rPr lang="en-US" dirty="0" smtClean="0">
+                <a:solidFill>
+                  <a:srgbClr val="FFFF00"/>
+                </a:solidFill>
+              </a:rPr>
+              <a:t>(without where, get count by model)</a:t>
+            </a:r>
+          </a:p>
+          <a:p>
+            <a:pPr marL="0" indent="0">
+              <a:buNone/>
+            </a:pPr>
+            <a:r>
+              <a:rPr lang="en-US" dirty="0" smtClean="0"/>
+              <a:t>GROUP BY model; </a:t>
+            </a:r>
+            <a:r>
+              <a:rPr lang="en-US" dirty="0" smtClean="0">
+                <a:solidFill>
+                  <a:srgbClr val="FFFF00"/>
+                </a:solidFill>
+              </a:rPr>
+              <a:t>-- grouping</a:t>
+            </a:r>
+          </a:p>
+          <a:p>
+            <a:pPr marL="0" indent="0">
+              <a:buNone/>
+            </a:pPr>
+            <a:endParaRPr lang="en-US" dirty="0" smtClean="0"/>
+          </a:p>
+          <a:p>
+            <a:pPr marL="0" indent="0">
+              <a:buNone/>
+            </a:pPr>
+            <a:r>
+              <a:rPr lang="en-US" dirty="0" smtClean="0"/>
+              <a:t>SELECT COUNT(*)</a:t>
+            </a:r>
+          </a:p>
+          <a:p>
+            <a:pPr marL="0" indent="0">
+              <a:buNone/>
+            </a:pPr>
+            <a:r>
+              <a:rPr lang="en-US" dirty="0" smtClean="0"/>
+              <a:t>FROM cars</a:t>
+            </a:r>
+          </a:p>
+          <a:p>
+            <a:pPr marL="0" indent="0">
+              <a:buNone/>
+            </a:pPr>
+            <a:r>
+              <a:rPr lang="en-US" dirty="0" smtClean="0"/>
+              <a:t>WHERE model = ‘HONDA’; </a:t>
+            </a:r>
+            <a:r>
+              <a:rPr lang="en-US" dirty="0" smtClean="0">
+                <a:solidFill>
+                  <a:srgbClr val="FFFF00"/>
+                </a:solidFill>
+              </a:rPr>
+              <a:t>-- NO grouping; counting ONLY Hondas</a:t>
+            </a:r>
+            <a:endParaRPr lang="en-US" dirty="0">
+              <a:solidFill>
+                <a:srgbClr val="FFFF00"/>
+              </a:solidFill>
+            </a:endParaRPr>
+          </a:p>
+        </p:txBody>
+      </p:sp>
+    </p:spTree>
+    <p:extLst>
+      <p:ext uri="{BB962C8B-B14F-4D97-AF65-F5344CB8AC3E}">
+        <p14:creationId xmlns:p14="http://schemas.microsoft.com/office/powerpoint/2010/main" val="2174399821"/>
+      </p:ext>
+    </p:extLst>
+  </p:cSld>
+  <p:clrMapOvr>
+    <a:masterClrMapping/>
+  </p:clrMapOvr>
+</p:sld>
+</file>
+
+<file path=ppt/slides/slide35.xml><?xml version="1.0" encoding="utf-8"?>
+<p:sld xmlns:a="http://schemas.openxmlformats.org/drawingml/2006/main" xmlns:r="http://schemas.openxmlformats.org/officeDocument/2006/relationships" xmlns:p="http://schemas.openxmlformats.org/presentationml/2006/main">
+  <p:cSld>
+    <p:spTree>
+      <p:nvGrpSpPr>
+        <p:cNvPr id="1" name=""/>
+        <p:cNvGrpSpPr/>
+        <p:nvPr/>
+      </p:nvGrpSpPr>
+      <p:grpSpPr>
+        <a:xfrm>
+          <a:off x="0" y="0"/>
+          <a:ext cx="0" cy="0"/>
+          <a:chOff x="0" y="0"/>
+          <a:chExt cx="0" cy="0"/>
+        </a:xfrm>
+      </p:grpSpPr>
+      <p:sp>
+        <p:nvSpPr>
+          <p:cNvPr id="2" name="Title 1"/>
+          <p:cNvSpPr>
+            <a:spLocks noGrp="1"/>
+          </p:cNvSpPr>
+          <p:nvPr>
+            <p:ph type="title"/>
+          </p:nvPr>
+        </p:nvSpPr>
+        <p:spPr/>
+        <p:txBody>
+          <a:bodyPr/>
+          <a:lstStyle/>
+          <a:p>
+            <a:r>
+              <a:rPr lang="en-US" dirty="0" smtClean="0"/>
+              <a:t>Group multiple fields</a:t>
+            </a:r>
+            <a:endParaRPr lang="en-US" dirty="0"/>
+          </a:p>
+        </p:txBody>
+      </p:sp>
+      <p:sp>
+        <p:nvSpPr>
+          <p:cNvPr id="3" name="Content Placeholder 2"/>
+          <p:cNvSpPr>
+            <a:spLocks noGrp="1"/>
+          </p:cNvSpPr>
+          <p:nvPr>
+            <p:ph idx="1"/>
+          </p:nvPr>
+        </p:nvSpPr>
+        <p:spPr/>
+        <p:txBody>
+          <a:bodyPr/>
+          <a:lstStyle/>
+          <a:p>
+            <a:r>
+              <a:rPr lang="en-US" dirty="0" smtClean="0"/>
+              <a:t>Total salary by location and department</a:t>
+            </a:r>
+          </a:p>
+          <a:p>
+            <a:pPr marL="0" indent="0">
+              <a:buNone/>
+            </a:pPr>
+            <a:r>
+              <a:rPr lang="en-US" dirty="0" smtClean="0"/>
+              <a:t>SELECT </a:t>
+            </a:r>
+            <a:r>
+              <a:rPr lang="en-US" dirty="0" err="1" smtClean="0">
+                <a:solidFill>
+                  <a:srgbClr val="FFFF00"/>
+                </a:solidFill>
+              </a:rPr>
+              <a:t>d.location</a:t>
+            </a:r>
+            <a:r>
+              <a:rPr lang="en-US" dirty="0" smtClean="0">
+                <a:solidFill>
+                  <a:srgbClr val="FFFF00"/>
+                </a:solidFill>
+              </a:rPr>
+              <a:t>, </a:t>
+            </a:r>
+            <a:r>
+              <a:rPr lang="en-US" dirty="0" err="1" smtClean="0">
+                <a:solidFill>
+                  <a:srgbClr val="FFFF00"/>
+                </a:solidFill>
+              </a:rPr>
+              <a:t>d.deptname</a:t>
+            </a:r>
+            <a:r>
+              <a:rPr lang="en-US" dirty="0" smtClean="0"/>
+              <a:t>, SUM(</a:t>
+            </a:r>
+            <a:r>
+              <a:rPr lang="en-US" dirty="0" err="1" smtClean="0"/>
+              <a:t>e.salary</a:t>
+            </a:r>
+            <a:r>
+              <a:rPr lang="en-US" dirty="0" smtClean="0"/>
+              <a:t>) as </a:t>
+            </a:r>
+            <a:r>
+              <a:rPr lang="en-US" dirty="0" err="1" smtClean="0"/>
+              <a:t>totalsalary</a:t>
+            </a:r>
+            <a:endParaRPr lang="en-US" dirty="0" smtClean="0"/>
+          </a:p>
+          <a:p>
+            <a:pPr marL="0" indent="0">
+              <a:buNone/>
+            </a:pPr>
+            <a:r>
+              <a:rPr lang="en-US" dirty="0" smtClean="0"/>
+              <a:t>FROM employees e</a:t>
+            </a:r>
+          </a:p>
+          <a:p>
+            <a:pPr marL="0" indent="0">
+              <a:buNone/>
+            </a:pPr>
+            <a:r>
+              <a:rPr lang="en-US" dirty="0" smtClean="0"/>
+              <a:t>JOIN departments d ON </a:t>
+            </a:r>
+            <a:r>
+              <a:rPr lang="en-US" dirty="0" err="1" smtClean="0"/>
+              <a:t>d.dept_no</a:t>
+            </a:r>
+            <a:r>
+              <a:rPr lang="en-US" dirty="0" smtClean="0"/>
+              <a:t> = </a:t>
+            </a:r>
+            <a:r>
+              <a:rPr lang="en-US" dirty="0" err="1" smtClean="0"/>
+              <a:t>e.dept_no</a:t>
+            </a:r>
+            <a:endParaRPr lang="en-US" dirty="0" smtClean="0"/>
+          </a:p>
+          <a:p>
+            <a:pPr marL="0" indent="0">
+              <a:buNone/>
+            </a:pPr>
+            <a:r>
+              <a:rPr lang="en-US" dirty="0" smtClean="0"/>
+              <a:t>WHERE </a:t>
+            </a:r>
+            <a:r>
+              <a:rPr lang="en-US" dirty="0" err="1" smtClean="0"/>
+              <a:t>d.country</a:t>
+            </a:r>
+            <a:r>
+              <a:rPr lang="en-US" dirty="0" smtClean="0"/>
+              <a:t> = ‘USA’</a:t>
+            </a:r>
+          </a:p>
+          <a:p>
+            <a:pPr marL="0" indent="0">
+              <a:buNone/>
+            </a:pPr>
+            <a:r>
+              <a:rPr lang="en-US" dirty="0" smtClean="0"/>
+              <a:t>GROUP BY </a:t>
+            </a:r>
+            <a:r>
+              <a:rPr lang="en-US" dirty="0" err="1" smtClean="0">
+                <a:solidFill>
+                  <a:srgbClr val="FFFF00"/>
+                </a:solidFill>
+              </a:rPr>
+              <a:t>d.location</a:t>
+            </a:r>
+            <a:r>
+              <a:rPr lang="en-US" dirty="0" smtClean="0">
+                <a:solidFill>
+                  <a:srgbClr val="FFFF00"/>
+                </a:solidFill>
+              </a:rPr>
+              <a:t>, </a:t>
+            </a:r>
+            <a:r>
+              <a:rPr lang="en-US" dirty="0" err="1" smtClean="0">
+                <a:solidFill>
+                  <a:srgbClr val="FFFF00"/>
+                </a:solidFill>
+              </a:rPr>
+              <a:t>d.deptname</a:t>
+            </a:r>
+            <a:endParaRPr lang="en-US" dirty="0" smtClean="0">
+              <a:solidFill>
+                <a:srgbClr val="FFFF00"/>
+              </a:solidFill>
+            </a:endParaRPr>
+          </a:p>
+          <a:p>
+            <a:pPr marL="0" indent="0">
+              <a:buNone/>
+            </a:pPr>
+            <a:r>
+              <a:rPr lang="en-US" dirty="0" smtClean="0">
+                <a:solidFill>
+                  <a:srgbClr val="FFFF00"/>
+                </a:solidFill>
+              </a:rPr>
+              <a:t>HAVING SUM(</a:t>
+            </a:r>
+            <a:r>
+              <a:rPr lang="en-US" dirty="0" err="1" smtClean="0">
+                <a:solidFill>
+                  <a:srgbClr val="FFFF00"/>
+                </a:solidFill>
+              </a:rPr>
+              <a:t>e.salary</a:t>
+            </a:r>
+            <a:r>
+              <a:rPr lang="en-US" dirty="0" smtClean="0">
+                <a:solidFill>
+                  <a:srgbClr val="FFFF00"/>
+                </a:solidFill>
+              </a:rPr>
+              <a:t>) &gt; 1000000</a:t>
+            </a:r>
+            <a:r>
+              <a:rPr lang="en-US" dirty="0" smtClean="0"/>
+              <a:t>; </a:t>
+            </a:r>
+          </a:p>
+          <a:p>
+            <a:r>
+              <a:rPr lang="en-US" dirty="0" smtClean="0"/>
+              <a:t>WHERE happens before GROUP BY</a:t>
+            </a:r>
+          </a:p>
+          <a:p>
+            <a:r>
+              <a:rPr lang="en-US" dirty="0" smtClean="0"/>
+              <a:t>HAVING happens after GROUP BY</a:t>
+            </a:r>
+            <a:endParaRPr lang="en-US" dirty="0"/>
+          </a:p>
+          <a:p>
+            <a:endParaRPr lang="en-US" dirty="0"/>
+          </a:p>
+        </p:txBody>
+      </p:sp>
+    </p:spTree>
+    <p:extLst>
+      <p:ext uri="{BB962C8B-B14F-4D97-AF65-F5344CB8AC3E}">
+        <p14:creationId xmlns:p14="http://schemas.microsoft.com/office/powerpoint/2010/main" val="1179603355"/>
+      </p:ext>
+    </p:extLst>
+  </p:cSld>
+  <p:clrMapOvr>
+    <a:masterClrMapping/>
+  </p:clrMapOvr>
+</p:sld>
+</file>
+
+<file path=ppt/slides/slide36.xml><?xml version="1.0" encoding="utf-8"?>
+<p:sld xmlns:a="http://schemas.openxmlformats.org/drawingml/2006/main" xmlns:r="http://schemas.openxmlformats.org/officeDocument/2006/relationships" xmlns:p="http://schemas.openxmlformats.org/presentationml/2006/main">
+  <p:cSld>
+    <p:spTree>
+      <p:nvGrpSpPr>
+        <p:cNvPr id="1" name=""/>
+        <p:cNvGrpSpPr/>
+        <p:nvPr/>
+      </p:nvGrpSpPr>
+      <p:grpSpPr>
+        <a:xfrm>
+          <a:off x="0" y="0"/>
+          <a:ext cx="0" cy="0"/>
+          <a:chOff x="0" y="0"/>
+          <a:chExt cx="0" cy="0"/>
+        </a:xfrm>
+      </p:grpSpPr>
+      <p:sp>
+        <p:nvSpPr>
+          <p:cNvPr id="2" name="Title 1"/>
+          <p:cNvSpPr>
+            <a:spLocks noGrp="1"/>
+          </p:cNvSpPr>
+          <p:nvPr>
+            <p:ph type="title"/>
+          </p:nvPr>
+        </p:nvSpPr>
+        <p:spPr/>
+        <p:txBody>
+          <a:bodyPr/>
+          <a:lstStyle/>
+          <a:p>
+            <a:r>
+              <a:rPr lang="en-US" dirty="0" smtClean="0"/>
+              <a:t>EXPLAIN my query</a:t>
+            </a:r>
+            <a:endParaRPr lang="en-US" dirty="0"/>
+          </a:p>
+        </p:txBody>
+      </p:sp>
+      <p:sp>
+        <p:nvSpPr>
+          <p:cNvPr id="3" name="Content Placeholder 2"/>
+          <p:cNvSpPr>
+            <a:spLocks noGrp="1"/>
+          </p:cNvSpPr>
+          <p:nvPr>
+            <p:ph idx="1"/>
+          </p:nvPr>
+        </p:nvSpPr>
+        <p:spPr/>
+        <p:txBody>
+          <a:bodyPr/>
+          <a:lstStyle/>
+          <a:p>
+            <a:r>
+              <a:rPr lang="en-US" dirty="0" smtClean="0"/>
+              <a:t>Database can tell us what it is doing</a:t>
+            </a:r>
+          </a:p>
+          <a:p>
+            <a:r>
+              <a:rPr lang="en-US" dirty="0" smtClean="0"/>
+              <a:t>Understand query performance</a:t>
+            </a:r>
+          </a:p>
+          <a:p>
+            <a:pPr marL="0" indent="0">
+              <a:buNone/>
+            </a:pPr>
+            <a:r>
+              <a:rPr lang="en-US" dirty="0" smtClean="0">
+                <a:solidFill>
+                  <a:srgbClr val="FFFF00"/>
+                </a:solidFill>
+              </a:rPr>
+              <a:t>EXPLAIN</a:t>
+            </a:r>
+            <a:r>
+              <a:rPr lang="en-US" dirty="0" smtClean="0"/>
+              <a:t> SELECT code </a:t>
+            </a:r>
+            <a:r>
+              <a:rPr lang="en-US" dirty="0"/>
+              <a:t>FROM country WHERE </a:t>
+            </a:r>
+            <a:r>
+              <a:rPr lang="en-US" dirty="0" err="1"/>
+              <a:t>surfacearea</a:t>
+            </a:r>
+            <a:r>
+              <a:rPr lang="en-US" dirty="0"/>
+              <a:t> &lt; 1000 ORDER BY </a:t>
+            </a:r>
+            <a:r>
+              <a:rPr lang="en-US" dirty="0" err="1"/>
+              <a:t>surfacearea</a:t>
+            </a:r>
+            <a:r>
+              <a:rPr lang="en-US" dirty="0" smtClean="0"/>
+              <a:t>;</a:t>
+            </a:r>
+          </a:p>
+          <a:p>
+            <a:pPr marL="0" indent="0">
+              <a:buNone/>
+            </a:pPr>
+            <a:endParaRPr lang="en-US" dirty="0"/>
+          </a:p>
+          <a:p>
+            <a:pPr marL="0" indent="0">
+              <a:buNone/>
+            </a:pPr>
+            <a:endParaRPr lang="en-US" dirty="0" smtClean="0"/>
+          </a:p>
+          <a:p>
+            <a:pPr marL="0" indent="0">
+              <a:buNone/>
+            </a:pPr>
+            <a:r>
+              <a:rPr lang="en-US" dirty="0"/>
+              <a:t>CREATE INDEX </a:t>
+            </a:r>
+            <a:r>
+              <a:rPr lang="en-US" dirty="0" err="1"/>
+              <a:t>idx_country_surfacearea</a:t>
+            </a:r>
+            <a:r>
+              <a:rPr lang="en-US" dirty="0"/>
+              <a:t> ON country(</a:t>
+            </a:r>
+            <a:r>
+              <a:rPr lang="en-US" dirty="0" err="1"/>
+              <a:t>surfacearea</a:t>
+            </a:r>
+            <a:r>
+              <a:rPr lang="en-US" dirty="0" smtClean="0"/>
+              <a:t>);</a:t>
+            </a:r>
+          </a:p>
+          <a:p>
+            <a:pPr marL="0" indent="0">
+              <a:buNone/>
+            </a:pPr>
+            <a:endParaRPr lang="en-US" dirty="0"/>
+          </a:p>
+          <a:p>
+            <a:pPr marL="0" indent="0">
+              <a:buNone/>
+            </a:pPr>
+            <a:endParaRPr lang="en-US" dirty="0" smtClean="0"/>
+          </a:p>
+          <a:p>
+            <a:pPr marL="0" indent="0">
+              <a:buNone/>
+            </a:pPr>
+            <a:endParaRPr lang="en-US" dirty="0" smtClean="0"/>
+          </a:p>
+          <a:p>
+            <a:pPr marL="0" indent="0">
+              <a:buNone/>
+            </a:pPr>
+            <a:endParaRPr lang="en-US" dirty="0"/>
+          </a:p>
+        </p:txBody>
+      </p:sp>
+      <p:pic>
+        <p:nvPicPr>
+          <p:cNvPr id="4" name="Picture 3"/>
+          <p:cNvPicPr>
+            <a:picLocks noChangeAspect="1"/>
+          </p:cNvPicPr>
+          <p:nvPr/>
+        </p:nvPicPr>
+        <p:blipFill>
+          <a:blip r:embed="rId2"/>
+          <a:stretch>
+            <a:fillRect/>
+          </a:stretch>
+        </p:blipFill>
+        <p:spPr>
+          <a:xfrm>
+            <a:off x="1210627" y="3647547"/>
+            <a:ext cx="7210425" cy="695325"/>
+          </a:xfrm>
+          <a:prstGeom prst="rect">
+            <a:avLst/>
+          </a:prstGeom>
+        </p:spPr>
+      </p:pic>
+      <p:pic>
+        <p:nvPicPr>
+          <p:cNvPr id="6" name="Picture 5"/>
+          <p:cNvPicPr>
+            <a:picLocks noChangeAspect="1"/>
+          </p:cNvPicPr>
+          <p:nvPr/>
+        </p:nvPicPr>
+        <p:blipFill>
+          <a:blip r:embed="rId3"/>
+          <a:stretch>
+            <a:fillRect/>
+          </a:stretch>
+        </p:blipFill>
+        <p:spPr>
+          <a:xfrm>
+            <a:off x="1210627" y="4916540"/>
+            <a:ext cx="8486775" cy="638175"/>
+          </a:xfrm>
+          <a:prstGeom prst="rect">
+            <a:avLst/>
+          </a:prstGeom>
+        </p:spPr>
+      </p:pic>
+    </p:spTree>
+    <p:extLst>
+      <p:ext uri="{BB962C8B-B14F-4D97-AF65-F5344CB8AC3E}">
+        <p14:creationId xmlns:p14="http://schemas.microsoft.com/office/powerpoint/2010/main" val="3790605170"/>
       </p:ext>
     </p:extLst>
   </p:cSld>

</xml_diff>

<commit_message>
Safely execute updates and deletes
</commit_message>
<xml_diff>
--- a/Presentation/Database-Bootcamp-Presentation.pptx
+++ b/Presentation/Database-Bootcamp-Presentation.pptx
@@ -41,6 +41,9 @@
     <p:sldId id="289" r:id="rId35"/>
     <p:sldId id="290" r:id="rId36"/>
     <p:sldId id="291" r:id="rId37"/>
+    <p:sldId id="292" r:id="rId38"/>
+    <p:sldId id="293" r:id="rId39"/>
+    <p:sldId id="294" r:id="rId40"/>
   </p:sldIdLst>
   <p:sldSz cx="12192000" cy="6858000"/>
   <p:notesSz cx="6858000" cy="9144000"/>
@@ -333,7 +336,7 @@
           <a:p>
             <a:fld id="{9DC1F441-9BCC-4383-B80D-68C31DF95A71}" type="datetimeFigureOut">
               <a:rPr lang="en-US" smtClean="0"/>
-              <a:t>1/10/2016</a:t>
+              <a:t>1/12/2016</a:t>
             </a:fld>
             <a:endParaRPr lang="en-US"/>
           </a:p>
@@ -613,7 +616,7 @@
           <a:p>
             <a:fld id="{9DC1F441-9BCC-4383-B80D-68C31DF95A71}" type="datetimeFigureOut">
               <a:rPr lang="en-US" smtClean="0"/>
-              <a:t>1/10/2016</a:t>
+              <a:t>1/12/2016</a:t>
             </a:fld>
             <a:endParaRPr lang="en-US"/>
           </a:p>
@@ -807,7 +810,7 @@
           <a:p>
             <a:fld id="{9DC1F441-9BCC-4383-B80D-68C31DF95A71}" type="datetimeFigureOut">
               <a:rPr lang="en-US" smtClean="0"/>
-              <a:t>1/10/2016</a:t>
+              <a:t>1/12/2016</a:t>
             </a:fld>
             <a:endParaRPr lang="en-US"/>
           </a:p>
@@ -1080,7 +1083,7 @@
           <a:p>
             <a:fld id="{9DC1F441-9BCC-4383-B80D-68C31DF95A71}" type="datetimeFigureOut">
               <a:rPr lang="en-US" smtClean="0"/>
-              <a:t>1/10/2016</a:t>
+              <a:t>1/12/2016</a:t>
             </a:fld>
             <a:endParaRPr lang="en-US"/>
           </a:p>
@@ -1421,7 +1424,7 @@
           <a:p>
             <a:fld id="{9DC1F441-9BCC-4383-B80D-68C31DF95A71}" type="datetimeFigureOut">
               <a:rPr lang="en-US" smtClean="0"/>
-              <a:t>1/10/2016</a:t>
+              <a:t>1/12/2016</a:t>
             </a:fld>
             <a:endParaRPr lang="en-US"/>
           </a:p>
@@ -2044,7 +2047,7 @@
           <a:p>
             <a:fld id="{9DC1F441-9BCC-4383-B80D-68C31DF95A71}" type="datetimeFigureOut">
               <a:rPr lang="en-US" smtClean="0"/>
-              <a:t>1/10/2016</a:t>
+              <a:t>1/12/2016</a:t>
             </a:fld>
             <a:endParaRPr lang="en-US"/>
           </a:p>
@@ -2904,7 +2907,7 @@
           <a:p>
             <a:fld id="{9DC1F441-9BCC-4383-B80D-68C31DF95A71}" type="datetimeFigureOut">
               <a:rPr lang="en-US" smtClean="0"/>
-              <a:t>1/10/2016</a:t>
+              <a:t>1/12/2016</a:t>
             </a:fld>
             <a:endParaRPr lang="en-US"/>
           </a:p>
@@ -3074,7 +3077,7 @@
           <a:p>
             <a:fld id="{9DC1F441-9BCC-4383-B80D-68C31DF95A71}" type="datetimeFigureOut">
               <a:rPr lang="en-US" smtClean="0"/>
-              <a:t>1/10/2016</a:t>
+              <a:t>1/12/2016</a:t>
             </a:fld>
             <a:endParaRPr lang="en-US"/>
           </a:p>
@@ -3254,7 +3257,7 @@
           <a:p>
             <a:fld id="{9DC1F441-9BCC-4383-B80D-68C31DF95A71}" type="datetimeFigureOut">
               <a:rPr lang="en-US" smtClean="0"/>
-              <a:t>1/10/2016</a:t>
+              <a:t>1/12/2016</a:t>
             </a:fld>
             <a:endParaRPr lang="en-US"/>
           </a:p>
@@ -3429,7 +3432,7 @@
           <a:p>
             <a:fld id="{9DC1F441-9BCC-4383-B80D-68C31DF95A71}" type="datetimeFigureOut">
               <a:rPr lang="en-US" smtClean="0"/>
-              <a:t>1/10/2016</a:t>
+              <a:t>1/12/2016</a:t>
             </a:fld>
             <a:endParaRPr lang="en-US"/>
           </a:p>
@@ -3676,7 +3679,7 @@
           <a:p>
             <a:fld id="{9DC1F441-9BCC-4383-B80D-68C31DF95A71}" type="datetimeFigureOut">
               <a:rPr lang="en-US" smtClean="0"/>
-              <a:t>1/10/2016</a:t>
+              <a:t>1/12/2016</a:t>
             </a:fld>
             <a:endParaRPr lang="en-US"/>
           </a:p>
@@ -3973,7 +3976,7 @@
           <a:p>
             <a:fld id="{9DC1F441-9BCC-4383-B80D-68C31DF95A71}" type="datetimeFigureOut">
               <a:rPr lang="en-US" smtClean="0"/>
-              <a:t>1/10/2016</a:t>
+              <a:t>1/12/2016</a:t>
             </a:fld>
             <a:endParaRPr lang="en-US"/>
           </a:p>
@@ -4417,7 +4420,7 @@
           <a:p>
             <a:fld id="{9DC1F441-9BCC-4383-B80D-68C31DF95A71}" type="datetimeFigureOut">
               <a:rPr lang="en-US" smtClean="0"/>
-              <a:t>1/10/2016</a:t>
+              <a:t>1/12/2016</a:t>
             </a:fld>
             <a:endParaRPr lang="en-US"/>
           </a:p>
@@ -4535,7 +4538,7 @@
           <a:p>
             <a:fld id="{9DC1F441-9BCC-4383-B80D-68C31DF95A71}" type="datetimeFigureOut">
               <a:rPr lang="en-US" smtClean="0"/>
-              <a:t>1/10/2016</a:t>
+              <a:t>1/12/2016</a:t>
             </a:fld>
             <a:endParaRPr lang="en-US"/>
           </a:p>
@@ -4630,7 +4633,7 @@
           <a:p>
             <a:fld id="{9DC1F441-9BCC-4383-B80D-68C31DF95A71}" type="datetimeFigureOut">
               <a:rPr lang="en-US" smtClean="0"/>
-              <a:t>1/10/2016</a:t>
+              <a:t>1/12/2016</a:t>
             </a:fld>
             <a:endParaRPr lang="en-US"/>
           </a:p>
@@ -4914,7 +4917,7 @@
           <a:p>
             <a:fld id="{9DC1F441-9BCC-4383-B80D-68C31DF95A71}" type="datetimeFigureOut">
               <a:rPr lang="en-US" smtClean="0"/>
-              <a:t>1/10/2016</a:t>
+              <a:t>1/12/2016</a:t>
             </a:fld>
             <a:endParaRPr lang="en-US"/>
           </a:p>
@@ -5194,7 +5197,7 @@
           <a:p>
             <a:fld id="{9DC1F441-9BCC-4383-B80D-68C31DF95A71}" type="datetimeFigureOut">
               <a:rPr lang="en-US" smtClean="0"/>
-              <a:t>1/10/2016</a:t>
+              <a:t>1/12/2016</a:t>
             </a:fld>
             <a:endParaRPr lang="en-US"/>
           </a:p>
@@ -5623,7 +5626,7 @@
           <a:p>
             <a:fld id="{9DC1F441-9BCC-4383-B80D-68C31DF95A71}" type="datetimeFigureOut">
               <a:rPr lang="en-US" smtClean="0"/>
-              <a:t>1/10/2016</a:t>
+              <a:t>1/12/2016</a:t>
             </a:fld>
             <a:endParaRPr lang="en-US"/>
           </a:p>
@@ -13393,11 +13396,7 @@
           <a:p>
             <a:r>
               <a:rPr lang="en-US" dirty="0" smtClean="0"/>
-              <a:t>Extract small amounts of data efficiently into on-the-fly-tables and JOIN them to actual </a:t>
-            </a:r>
-            <a:r>
-              <a:rPr lang="en-US" dirty="0" smtClean="0"/>
-              <a:t>tables</a:t>
+              <a:t>Extract small amounts of data efficiently into on-the-fly-tables and JOIN them to actual tables</a:t>
             </a:r>
           </a:p>
           <a:p>
@@ -14365,6 +14364,499 @@
     <p:extLst>
       <p:ext uri="{BB962C8B-B14F-4D97-AF65-F5344CB8AC3E}">
         <p14:creationId xmlns:p14="http://schemas.microsoft.com/office/powerpoint/2010/main" val="3790605170"/>
+      </p:ext>
+    </p:extLst>
+  </p:cSld>
+  <p:clrMapOvr>
+    <a:masterClrMapping/>
+  </p:clrMapOvr>
+</p:sld>
+</file>
+
+<file path=ppt/slides/slide37.xml><?xml version="1.0" encoding="utf-8"?>
+<p:sld xmlns:a="http://schemas.openxmlformats.org/drawingml/2006/main" xmlns:r="http://schemas.openxmlformats.org/officeDocument/2006/relationships" xmlns:p="http://schemas.openxmlformats.org/presentationml/2006/main">
+  <p:cSld>
+    <p:spTree>
+      <p:nvGrpSpPr>
+        <p:cNvPr id="1" name=""/>
+        <p:cNvGrpSpPr/>
+        <p:nvPr/>
+      </p:nvGrpSpPr>
+      <p:grpSpPr>
+        <a:xfrm>
+          <a:off x="0" y="0"/>
+          <a:ext cx="0" cy="0"/>
+          <a:chOff x="0" y="0"/>
+          <a:chExt cx="0" cy="0"/>
+        </a:xfrm>
+      </p:grpSpPr>
+      <p:sp>
+        <p:nvSpPr>
+          <p:cNvPr id="2" name="Title 1"/>
+          <p:cNvSpPr>
+            <a:spLocks noGrp="1"/>
+          </p:cNvSpPr>
+          <p:nvPr>
+            <p:ph type="title"/>
+          </p:nvPr>
+        </p:nvSpPr>
+        <p:spPr/>
+        <p:txBody>
+          <a:bodyPr/>
+          <a:lstStyle/>
+          <a:p>
+            <a:r>
+              <a:rPr lang="en-US" dirty="0" smtClean="0"/>
+              <a:t>Day 6:</a:t>
+            </a:r>
+            <a:endParaRPr lang="en-US" dirty="0"/>
+          </a:p>
+        </p:txBody>
+      </p:sp>
+      <p:sp>
+        <p:nvSpPr>
+          <p:cNvPr id="3" name="Content Placeholder 2"/>
+          <p:cNvSpPr>
+            <a:spLocks noGrp="1"/>
+          </p:cNvSpPr>
+          <p:nvPr>
+            <p:ph idx="1"/>
+          </p:nvPr>
+        </p:nvSpPr>
+        <p:spPr/>
+        <p:txBody>
+          <a:bodyPr/>
+          <a:lstStyle/>
+          <a:p>
+            <a:r>
+              <a:rPr lang="en-US" dirty="0" smtClean="0"/>
+              <a:t>Safely update data</a:t>
+            </a:r>
+          </a:p>
+          <a:p>
+            <a:r>
+              <a:rPr lang="en-US" dirty="0" smtClean="0"/>
+              <a:t>Safely delete data</a:t>
+            </a:r>
+            <a:endParaRPr lang="en-US" dirty="0"/>
+          </a:p>
+        </p:txBody>
+      </p:sp>
+    </p:spTree>
+    <p:extLst>
+      <p:ext uri="{BB962C8B-B14F-4D97-AF65-F5344CB8AC3E}">
+        <p14:creationId xmlns:p14="http://schemas.microsoft.com/office/powerpoint/2010/main" val="1299707278"/>
+      </p:ext>
+    </p:extLst>
+  </p:cSld>
+  <p:clrMapOvr>
+    <a:masterClrMapping/>
+  </p:clrMapOvr>
+</p:sld>
+</file>
+
+<file path=ppt/slides/slide38.xml><?xml version="1.0" encoding="utf-8"?>
+<p:sld xmlns:a="http://schemas.openxmlformats.org/drawingml/2006/main" xmlns:r="http://schemas.openxmlformats.org/officeDocument/2006/relationships" xmlns:p="http://schemas.openxmlformats.org/presentationml/2006/main">
+  <p:cSld>
+    <p:spTree>
+      <p:nvGrpSpPr>
+        <p:cNvPr id="1" name=""/>
+        <p:cNvGrpSpPr/>
+        <p:nvPr/>
+      </p:nvGrpSpPr>
+      <p:grpSpPr>
+        <a:xfrm>
+          <a:off x="0" y="0"/>
+          <a:ext cx="0" cy="0"/>
+          <a:chOff x="0" y="0"/>
+          <a:chExt cx="0" cy="0"/>
+        </a:xfrm>
+      </p:grpSpPr>
+      <p:sp>
+        <p:nvSpPr>
+          <p:cNvPr id="2" name="Title 1"/>
+          <p:cNvSpPr>
+            <a:spLocks noGrp="1"/>
+          </p:cNvSpPr>
+          <p:nvPr>
+            <p:ph type="title"/>
+          </p:nvPr>
+        </p:nvSpPr>
+        <p:spPr/>
+        <p:txBody>
+          <a:bodyPr/>
+          <a:lstStyle/>
+          <a:p>
+            <a:r>
+              <a:rPr lang="en-US" dirty="0" smtClean="0"/>
+              <a:t>Update safely</a:t>
+            </a:r>
+            <a:endParaRPr lang="en-US" dirty="0"/>
+          </a:p>
+        </p:txBody>
+      </p:sp>
+      <p:sp>
+        <p:nvSpPr>
+          <p:cNvPr id="3" name="Content Placeholder 2"/>
+          <p:cNvSpPr>
+            <a:spLocks noGrp="1"/>
+          </p:cNvSpPr>
+          <p:nvPr>
+            <p:ph idx="1"/>
+          </p:nvPr>
+        </p:nvSpPr>
+        <p:spPr/>
+        <p:txBody>
+          <a:bodyPr/>
+          <a:lstStyle/>
+          <a:p>
+            <a:r>
+              <a:rPr lang="en-US" dirty="0" smtClean="0"/>
+              <a:t>Do SELECT to determine # of rows that must be updated. Then run UPDATE</a:t>
+            </a:r>
+          </a:p>
+          <a:p>
+            <a:r>
+              <a:rPr lang="en-US" dirty="0" smtClean="0"/>
+              <a:t>Use WHERE clause; very few times will you NOT need WHERE</a:t>
+            </a:r>
+          </a:p>
+          <a:p>
+            <a:r>
+              <a:rPr lang="en-US" dirty="0" smtClean="0"/>
+              <a:t>Take a backup before large UPDATEs</a:t>
+            </a:r>
+          </a:p>
+          <a:p>
+            <a:r>
+              <a:rPr lang="en-US" dirty="0" smtClean="0"/>
+              <a:t>If column needs to be updated, create a new column, copy data from target column to new column, and then update target column</a:t>
+            </a:r>
+          </a:p>
+          <a:p>
+            <a:pPr marL="0" indent="0">
+              <a:buNone/>
+            </a:pPr>
+            <a:endParaRPr lang="en-US" dirty="0" smtClean="0"/>
+          </a:p>
+          <a:p>
+            <a:pPr marL="0" indent="0">
+              <a:buNone/>
+            </a:pPr>
+            <a:r>
+              <a:rPr lang="en-US" dirty="0" smtClean="0"/>
+              <a:t>SELECT COUNT(*) FROM city </a:t>
+            </a:r>
+            <a:r>
+              <a:rPr lang="en-US" dirty="0" smtClean="0">
+                <a:solidFill>
+                  <a:srgbClr val="FFFF00"/>
+                </a:solidFill>
+              </a:rPr>
+              <a:t>WHERE </a:t>
+            </a:r>
+            <a:r>
+              <a:rPr lang="en-US" dirty="0" err="1" smtClean="0">
+                <a:solidFill>
+                  <a:srgbClr val="FFFF00"/>
+                </a:solidFill>
+              </a:rPr>
+              <a:t>countrycode</a:t>
+            </a:r>
+            <a:r>
+              <a:rPr lang="en-US" dirty="0" smtClean="0">
+                <a:solidFill>
+                  <a:srgbClr val="FFFF00"/>
+                </a:solidFill>
+              </a:rPr>
+              <a:t> = ‘NLD’;</a:t>
+            </a:r>
+          </a:p>
+          <a:p>
+            <a:pPr marL="0" indent="0">
+              <a:buNone/>
+            </a:pPr>
+            <a:r>
+              <a:rPr lang="en-US" dirty="0" smtClean="0"/>
+              <a:t>UPDATE city SET population=population*1.05 </a:t>
+            </a:r>
+            <a:r>
+              <a:rPr lang="en-US" dirty="0" smtClean="0">
+                <a:solidFill>
+                  <a:srgbClr val="FFFF00"/>
+                </a:solidFill>
+              </a:rPr>
+              <a:t>WHERE </a:t>
+            </a:r>
+          </a:p>
+          <a:p>
+            <a:pPr marL="0" indent="0">
+              <a:buNone/>
+            </a:pPr>
+            <a:r>
+              <a:rPr lang="en-US" dirty="0">
+                <a:solidFill>
+                  <a:srgbClr val="FFFF00"/>
+                </a:solidFill>
+              </a:rPr>
+              <a:t> </a:t>
+            </a:r>
+            <a:r>
+              <a:rPr lang="en-US" dirty="0" smtClean="0">
+                <a:solidFill>
+                  <a:srgbClr val="FFFF00"/>
+                </a:solidFill>
+              </a:rPr>
+              <a:t>   </a:t>
+            </a:r>
+            <a:r>
+              <a:rPr lang="en-US" dirty="0" err="1" smtClean="0">
+                <a:solidFill>
+                  <a:srgbClr val="FFFF00"/>
+                </a:solidFill>
+              </a:rPr>
+              <a:t>countrycode</a:t>
+            </a:r>
+            <a:r>
+              <a:rPr lang="en-US" dirty="0" smtClean="0">
+                <a:solidFill>
+                  <a:srgbClr val="FFFF00"/>
+                </a:solidFill>
+              </a:rPr>
+              <a:t> = ‘NLD’;</a:t>
+            </a:r>
+          </a:p>
+          <a:p>
+            <a:pPr marL="0" indent="0">
+              <a:buNone/>
+            </a:pPr>
+            <a:endParaRPr lang="en-US" dirty="0" smtClean="0"/>
+          </a:p>
+        </p:txBody>
+      </p:sp>
+    </p:spTree>
+    <p:extLst>
+      <p:ext uri="{BB962C8B-B14F-4D97-AF65-F5344CB8AC3E}">
+        <p14:creationId xmlns:p14="http://schemas.microsoft.com/office/powerpoint/2010/main" val="2073229223"/>
+      </p:ext>
+    </p:extLst>
+  </p:cSld>
+  <p:clrMapOvr>
+    <a:masterClrMapping/>
+  </p:clrMapOvr>
+</p:sld>
+</file>
+
+<file path=ppt/slides/slide39.xml><?xml version="1.0" encoding="utf-8"?>
+<p:sld xmlns:a="http://schemas.openxmlformats.org/drawingml/2006/main" xmlns:r="http://schemas.openxmlformats.org/officeDocument/2006/relationships" xmlns:p="http://schemas.openxmlformats.org/presentationml/2006/main">
+  <p:cSld>
+    <p:spTree>
+      <p:nvGrpSpPr>
+        <p:cNvPr id="1" name=""/>
+        <p:cNvGrpSpPr/>
+        <p:nvPr/>
+      </p:nvGrpSpPr>
+      <p:grpSpPr>
+        <a:xfrm>
+          <a:off x="0" y="0"/>
+          <a:ext cx="0" cy="0"/>
+          <a:chOff x="0" y="0"/>
+          <a:chExt cx="0" cy="0"/>
+        </a:xfrm>
+      </p:grpSpPr>
+      <p:sp>
+        <p:nvSpPr>
+          <p:cNvPr id="2" name="Title 1"/>
+          <p:cNvSpPr>
+            <a:spLocks noGrp="1"/>
+          </p:cNvSpPr>
+          <p:nvPr>
+            <p:ph type="title"/>
+          </p:nvPr>
+        </p:nvSpPr>
+        <p:spPr/>
+        <p:txBody>
+          <a:bodyPr/>
+          <a:lstStyle/>
+          <a:p>
+            <a:r>
+              <a:rPr lang="en-US" dirty="0" smtClean="0"/>
+              <a:t>Update column safely</a:t>
+            </a:r>
+            <a:endParaRPr lang="en-US" dirty="0"/>
+          </a:p>
+        </p:txBody>
+      </p:sp>
+      <p:sp>
+        <p:nvSpPr>
+          <p:cNvPr id="3" name="Content Placeholder 2"/>
+          <p:cNvSpPr>
+            <a:spLocks noGrp="1"/>
+          </p:cNvSpPr>
+          <p:nvPr>
+            <p:ph idx="1"/>
+          </p:nvPr>
+        </p:nvSpPr>
+        <p:spPr>
+          <a:xfrm>
+            <a:off x="1103312" y="2052918"/>
+            <a:ext cx="8946541" cy="4640490"/>
+          </a:xfrm>
+        </p:spPr>
+        <p:txBody>
+          <a:bodyPr/>
+          <a:lstStyle/>
+          <a:p>
+            <a:r>
+              <a:rPr lang="en-US" dirty="0" smtClean="0"/>
+              <a:t>Raise population of cities in NLD by 5%</a:t>
+            </a:r>
+          </a:p>
+          <a:p>
+            <a:r>
+              <a:rPr lang="en-US" dirty="0" smtClean="0"/>
+              <a:t>But…I am </a:t>
+            </a:r>
+            <a:r>
+              <a:rPr lang="en-US" smtClean="0"/>
+              <a:t>not sure</a:t>
+            </a:r>
+          </a:p>
+          <a:p>
+            <a:endParaRPr lang="en-US" dirty="0"/>
+          </a:p>
+          <a:p>
+            <a:pPr marL="0" indent="0">
+              <a:buNone/>
+            </a:pPr>
+            <a:r>
+              <a:rPr lang="en-US" dirty="0" smtClean="0"/>
+              <a:t>ALTER TABLE city ADD COLUMN </a:t>
+            </a:r>
+            <a:r>
+              <a:rPr lang="en-US" dirty="0" err="1" smtClean="0"/>
+              <a:t>population_orig</a:t>
+            </a:r>
+            <a:r>
+              <a:rPr lang="en-US" dirty="0" smtClean="0"/>
+              <a:t> </a:t>
+            </a:r>
+            <a:r>
+              <a:rPr lang="en-US" dirty="0" err="1" smtClean="0"/>
+              <a:t>int</a:t>
+            </a:r>
+            <a:r>
+              <a:rPr lang="en-US" dirty="0" smtClean="0"/>
+              <a:t>;</a:t>
+            </a:r>
+          </a:p>
+          <a:p>
+            <a:pPr marL="0" indent="0">
+              <a:buNone/>
+            </a:pPr>
+            <a:r>
+              <a:rPr lang="en-US" dirty="0" smtClean="0"/>
+              <a:t>UPDATE city SET </a:t>
+            </a:r>
+            <a:r>
+              <a:rPr lang="en-US" dirty="0" err="1" smtClean="0"/>
+              <a:t>population_orig</a:t>
+            </a:r>
+            <a:r>
+              <a:rPr lang="en-US" dirty="0" smtClean="0"/>
+              <a:t> = population;</a:t>
+            </a:r>
+          </a:p>
+          <a:p>
+            <a:pPr marL="0" indent="0">
+              <a:buNone/>
+            </a:pPr>
+            <a:r>
+              <a:rPr lang="en-US" dirty="0" smtClean="0"/>
+              <a:t>SELECT COUNT(*) FROM city WHERE </a:t>
+            </a:r>
+            <a:r>
+              <a:rPr lang="en-US" dirty="0" err="1" smtClean="0"/>
+              <a:t>countrycode</a:t>
+            </a:r>
+            <a:r>
+              <a:rPr lang="en-US" dirty="0" smtClean="0"/>
+              <a:t> = ‘NLD’;</a:t>
+            </a:r>
+          </a:p>
+          <a:p>
+            <a:pPr marL="0" indent="0">
+              <a:buNone/>
+            </a:pPr>
+            <a:r>
+              <a:rPr lang="en-US" dirty="0" smtClean="0"/>
+              <a:t>UPDATE city SET population=population*1.05 </a:t>
+            </a:r>
+            <a:r>
+              <a:rPr lang="en-US" dirty="0" smtClean="0">
+                <a:solidFill>
+                  <a:srgbClr val="FFFF00"/>
+                </a:solidFill>
+              </a:rPr>
+              <a:t>WHERE</a:t>
+            </a:r>
+          </a:p>
+          <a:p>
+            <a:pPr marL="0" indent="0">
+              <a:buNone/>
+            </a:pPr>
+            <a:r>
+              <a:rPr lang="en-US" dirty="0">
+                <a:solidFill>
+                  <a:srgbClr val="FFFF00"/>
+                </a:solidFill>
+              </a:rPr>
+              <a:t> </a:t>
+            </a:r>
+            <a:r>
+              <a:rPr lang="en-US" dirty="0" smtClean="0">
+                <a:solidFill>
+                  <a:srgbClr val="FFFF00"/>
+                </a:solidFill>
+              </a:rPr>
+              <a:t>   </a:t>
+            </a:r>
+            <a:r>
+              <a:rPr lang="en-US" dirty="0" err="1" smtClean="0">
+                <a:solidFill>
+                  <a:srgbClr val="FFFF00"/>
+                </a:solidFill>
+              </a:rPr>
+              <a:t>countrycode</a:t>
+            </a:r>
+            <a:r>
+              <a:rPr lang="en-US" dirty="0" smtClean="0">
+                <a:solidFill>
+                  <a:srgbClr val="FFFF00"/>
+                </a:solidFill>
+              </a:rPr>
+              <a:t> = ‘NLD’;</a:t>
+            </a:r>
+          </a:p>
+          <a:p>
+            <a:pPr marL="0" indent="0">
+              <a:buNone/>
+            </a:pPr>
+            <a:endParaRPr lang="en-US" dirty="0" smtClean="0"/>
+          </a:p>
+          <a:p>
+            <a:r>
+              <a:rPr lang="en-US" dirty="0" smtClean="0"/>
+              <a:t>Make sure entire UPDATE statement is selected and executed. Double-check statement before execution!!</a:t>
+            </a:r>
+            <a:endParaRPr lang="en-US" dirty="0"/>
+          </a:p>
+        </p:txBody>
+      </p:sp>
+    </p:spTree>
+    <p:extLst>
+      <p:ext uri="{BB962C8B-B14F-4D97-AF65-F5344CB8AC3E}">
+        <p14:creationId xmlns:p14="http://schemas.microsoft.com/office/powerpoint/2010/main" val="1440845127"/>
       </p:ext>
     </p:extLst>
   </p:cSld>

</xml_diff>

<commit_message>
Logging in as a user
</commit_message>
<xml_diff>
--- a/Presentation/Database-Bootcamp-Presentation.pptx
+++ b/Presentation/Database-Bootcamp-Presentation.pptx
@@ -64,6 +64,7 @@
     <p:sldId id="312" r:id="rId58"/>
     <p:sldId id="313" r:id="rId59"/>
     <p:sldId id="314" r:id="rId60"/>
+    <p:sldId id="315" r:id="rId61"/>
   </p:sldIdLst>
   <p:sldSz cx="12192000" cy="6858000"/>
   <p:notesSz cx="6858000" cy="9144000"/>
@@ -19736,10 +19737,9 @@
               <a:buNone/>
             </a:pPr>
             <a:r>
-              <a:rPr lang="en-US" smtClean="0"/>
+              <a:rPr lang="en-US" dirty="0" smtClean="0"/>
               <a:t>FLUSH PRIVILEGES;</a:t>
             </a:r>
-            <a:endParaRPr lang="en-US" dirty="0" smtClean="0"/>
           </a:p>
           <a:p>
             <a:r>
@@ -19859,6 +19859,135 @@
     <p:extLst>
       <p:ext uri="{BB962C8B-B14F-4D97-AF65-F5344CB8AC3E}">
         <p14:creationId xmlns:p14="http://schemas.microsoft.com/office/powerpoint/2010/main" val="451513678"/>
+      </p:ext>
+    </p:extLst>
+  </p:cSld>
+  <p:clrMapOvr>
+    <a:masterClrMapping/>
+  </p:clrMapOvr>
+</p:sld>
+</file>
+
+<file path=ppt/slides/slide60.xml><?xml version="1.0" encoding="utf-8"?>
+<p:sld xmlns:a="http://schemas.openxmlformats.org/drawingml/2006/main" xmlns:r="http://schemas.openxmlformats.org/officeDocument/2006/relationships" xmlns:p="http://schemas.openxmlformats.org/presentationml/2006/main">
+  <p:cSld>
+    <p:spTree>
+      <p:nvGrpSpPr>
+        <p:cNvPr id="1" name=""/>
+        <p:cNvGrpSpPr/>
+        <p:nvPr/>
+      </p:nvGrpSpPr>
+      <p:grpSpPr>
+        <a:xfrm>
+          <a:off x="0" y="0"/>
+          <a:ext cx="0" cy="0"/>
+          <a:chOff x="0" y="0"/>
+          <a:chExt cx="0" cy="0"/>
+        </a:xfrm>
+      </p:grpSpPr>
+      <p:sp>
+        <p:nvSpPr>
+          <p:cNvPr id="2" name="Title 1"/>
+          <p:cNvSpPr>
+            <a:spLocks noGrp="1"/>
+          </p:cNvSpPr>
+          <p:nvPr>
+            <p:ph type="title"/>
+          </p:nvPr>
+        </p:nvSpPr>
+        <p:spPr/>
+        <p:txBody>
+          <a:bodyPr/>
+          <a:lstStyle/>
+          <a:p>
+            <a:r>
+              <a:rPr lang="en-US" dirty="0" smtClean="0"/>
+              <a:t>Logging in as a user</a:t>
+            </a:r>
+            <a:endParaRPr lang="en-US" dirty="0"/>
+          </a:p>
+        </p:txBody>
+      </p:sp>
+      <p:sp>
+        <p:nvSpPr>
+          <p:cNvPr id="3" name="Content Placeholder 2"/>
+          <p:cNvSpPr>
+            <a:spLocks noGrp="1"/>
+          </p:cNvSpPr>
+          <p:nvPr>
+            <p:ph idx="1"/>
+          </p:nvPr>
+        </p:nvSpPr>
+        <p:spPr/>
+        <p:txBody>
+          <a:bodyPr/>
+          <a:lstStyle/>
+          <a:p>
+            <a:r>
+              <a:rPr lang="en-US" dirty="0" err="1" smtClean="0"/>
+              <a:t>mysql</a:t>
+            </a:r>
+            <a:r>
+              <a:rPr lang="en-US" dirty="0" smtClean="0"/>
+              <a:t> –u username –h hostname –p</a:t>
+            </a:r>
+          </a:p>
+          <a:p>
+            <a:pPr marL="0" indent="0">
+              <a:buNone/>
+            </a:pPr>
+            <a:r>
+              <a:rPr lang="en-US" dirty="0" smtClean="0"/>
+              <a:t>Password:</a:t>
+            </a:r>
+          </a:p>
+          <a:p>
+            <a:pPr marL="0" indent="0">
+              <a:buNone/>
+            </a:pPr>
+            <a:endParaRPr lang="en-US" dirty="0"/>
+          </a:p>
+          <a:p>
+            <a:pPr marL="0" indent="0">
+              <a:buNone/>
+            </a:pPr>
+            <a:r>
+              <a:rPr lang="en-US" dirty="0" smtClean="0"/>
+              <a:t>Username and hostname should correspond to the user, host </a:t>
+            </a:r>
+            <a:r>
+              <a:rPr lang="en-US" smtClean="0"/>
+              <a:t>and password used </a:t>
+            </a:r>
+            <a:r>
+              <a:rPr lang="en-US" dirty="0" smtClean="0"/>
+              <a:t>in:</a:t>
+            </a:r>
+          </a:p>
+          <a:p>
+            <a:pPr marL="0" indent="0">
+              <a:buNone/>
+            </a:pPr>
+            <a:r>
+              <a:rPr lang="en-US" dirty="0" smtClean="0"/>
+              <a:t>CREATE USER ‘</a:t>
+            </a:r>
+            <a:r>
+              <a:rPr lang="en-US" dirty="0" err="1" smtClean="0"/>
+              <a:t>user’@’host</a:t>
+            </a:r>
+            <a:r>
+              <a:rPr lang="en-US" dirty="0" smtClean="0"/>
+              <a:t>’ IDENTIFIED BY ‘password’;</a:t>
+            </a:r>
+            <a:endParaRPr lang="en-US" dirty="0"/>
+          </a:p>
+        </p:txBody>
+      </p:sp>
+    </p:spTree>
+    <p:extLst>
+      <p:ext uri="{BB962C8B-B14F-4D97-AF65-F5344CB8AC3E}">
+        <p14:creationId xmlns:p14="http://schemas.microsoft.com/office/powerpoint/2010/main" val="512282959"/>
       </p:ext>
     </p:extLst>
   </p:cSld>

</xml_diff>

<commit_message>
User privileges and reset password
</commit_message>
<xml_diff>
--- a/Presentation/Database-Bootcamp-Presentation.pptx
+++ b/Presentation/Database-Bootcamp-Presentation.pptx
@@ -65,6 +65,10 @@
     <p:sldId id="313" r:id="rId59"/>
     <p:sldId id="314" r:id="rId60"/>
     <p:sldId id="315" r:id="rId61"/>
+    <p:sldId id="316" r:id="rId62"/>
+    <p:sldId id="317" r:id="rId63"/>
+    <p:sldId id="318" r:id="rId64"/>
+    <p:sldId id="319" r:id="rId65"/>
   </p:sldIdLst>
   <p:sldSz cx="12192000" cy="6858000"/>
   <p:notesSz cx="6858000" cy="9144000"/>
@@ -357,7 +361,7 @@
           <a:p>
             <a:fld id="{9DC1F441-9BCC-4383-B80D-68C31DF95A71}" type="datetimeFigureOut">
               <a:rPr lang="en-US" smtClean="0"/>
-              <a:t>1/19/2016</a:t>
+              <a:t>1/20/2016</a:t>
             </a:fld>
             <a:endParaRPr lang="en-US"/>
           </a:p>
@@ -637,7 +641,7 @@
           <a:p>
             <a:fld id="{9DC1F441-9BCC-4383-B80D-68C31DF95A71}" type="datetimeFigureOut">
               <a:rPr lang="en-US" smtClean="0"/>
-              <a:t>1/19/2016</a:t>
+              <a:t>1/20/2016</a:t>
             </a:fld>
             <a:endParaRPr lang="en-US"/>
           </a:p>
@@ -831,7 +835,7 @@
           <a:p>
             <a:fld id="{9DC1F441-9BCC-4383-B80D-68C31DF95A71}" type="datetimeFigureOut">
               <a:rPr lang="en-US" smtClean="0"/>
-              <a:t>1/19/2016</a:t>
+              <a:t>1/20/2016</a:t>
             </a:fld>
             <a:endParaRPr lang="en-US"/>
           </a:p>
@@ -1104,7 +1108,7 @@
           <a:p>
             <a:fld id="{9DC1F441-9BCC-4383-B80D-68C31DF95A71}" type="datetimeFigureOut">
               <a:rPr lang="en-US" smtClean="0"/>
-              <a:t>1/19/2016</a:t>
+              <a:t>1/20/2016</a:t>
             </a:fld>
             <a:endParaRPr lang="en-US"/>
           </a:p>
@@ -1445,7 +1449,7 @@
           <a:p>
             <a:fld id="{9DC1F441-9BCC-4383-B80D-68C31DF95A71}" type="datetimeFigureOut">
               <a:rPr lang="en-US" smtClean="0"/>
-              <a:t>1/19/2016</a:t>
+              <a:t>1/20/2016</a:t>
             </a:fld>
             <a:endParaRPr lang="en-US"/>
           </a:p>
@@ -2068,7 +2072,7 @@
           <a:p>
             <a:fld id="{9DC1F441-9BCC-4383-B80D-68C31DF95A71}" type="datetimeFigureOut">
               <a:rPr lang="en-US" smtClean="0"/>
-              <a:t>1/19/2016</a:t>
+              <a:t>1/20/2016</a:t>
             </a:fld>
             <a:endParaRPr lang="en-US"/>
           </a:p>
@@ -2928,7 +2932,7 @@
           <a:p>
             <a:fld id="{9DC1F441-9BCC-4383-B80D-68C31DF95A71}" type="datetimeFigureOut">
               <a:rPr lang="en-US" smtClean="0"/>
-              <a:t>1/19/2016</a:t>
+              <a:t>1/20/2016</a:t>
             </a:fld>
             <a:endParaRPr lang="en-US"/>
           </a:p>
@@ -3098,7 +3102,7 @@
           <a:p>
             <a:fld id="{9DC1F441-9BCC-4383-B80D-68C31DF95A71}" type="datetimeFigureOut">
               <a:rPr lang="en-US" smtClean="0"/>
-              <a:t>1/19/2016</a:t>
+              <a:t>1/20/2016</a:t>
             </a:fld>
             <a:endParaRPr lang="en-US"/>
           </a:p>
@@ -3278,7 +3282,7 @@
           <a:p>
             <a:fld id="{9DC1F441-9BCC-4383-B80D-68C31DF95A71}" type="datetimeFigureOut">
               <a:rPr lang="en-US" smtClean="0"/>
-              <a:t>1/19/2016</a:t>
+              <a:t>1/20/2016</a:t>
             </a:fld>
             <a:endParaRPr lang="en-US"/>
           </a:p>
@@ -3453,7 +3457,7 @@
           <a:p>
             <a:fld id="{9DC1F441-9BCC-4383-B80D-68C31DF95A71}" type="datetimeFigureOut">
               <a:rPr lang="en-US" smtClean="0"/>
-              <a:t>1/19/2016</a:t>
+              <a:t>1/20/2016</a:t>
             </a:fld>
             <a:endParaRPr lang="en-US"/>
           </a:p>
@@ -3700,7 +3704,7 @@
           <a:p>
             <a:fld id="{9DC1F441-9BCC-4383-B80D-68C31DF95A71}" type="datetimeFigureOut">
               <a:rPr lang="en-US" smtClean="0"/>
-              <a:t>1/19/2016</a:t>
+              <a:t>1/20/2016</a:t>
             </a:fld>
             <a:endParaRPr lang="en-US"/>
           </a:p>
@@ -3997,7 +4001,7 @@
           <a:p>
             <a:fld id="{9DC1F441-9BCC-4383-B80D-68C31DF95A71}" type="datetimeFigureOut">
               <a:rPr lang="en-US" smtClean="0"/>
-              <a:t>1/19/2016</a:t>
+              <a:t>1/20/2016</a:t>
             </a:fld>
             <a:endParaRPr lang="en-US"/>
           </a:p>
@@ -4441,7 +4445,7 @@
           <a:p>
             <a:fld id="{9DC1F441-9BCC-4383-B80D-68C31DF95A71}" type="datetimeFigureOut">
               <a:rPr lang="en-US" smtClean="0"/>
-              <a:t>1/19/2016</a:t>
+              <a:t>1/20/2016</a:t>
             </a:fld>
             <a:endParaRPr lang="en-US"/>
           </a:p>
@@ -4559,7 +4563,7 @@
           <a:p>
             <a:fld id="{9DC1F441-9BCC-4383-B80D-68C31DF95A71}" type="datetimeFigureOut">
               <a:rPr lang="en-US" smtClean="0"/>
-              <a:t>1/19/2016</a:t>
+              <a:t>1/20/2016</a:t>
             </a:fld>
             <a:endParaRPr lang="en-US"/>
           </a:p>
@@ -4654,7 +4658,7 @@
           <a:p>
             <a:fld id="{9DC1F441-9BCC-4383-B80D-68C31DF95A71}" type="datetimeFigureOut">
               <a:rPr lang="en-US" smtClean="0"/>
-              <a:t>1/19/2016</a:t>
+              <a:t>1/20/2016</a:t>
             </a:fld>
             <a:endParaRPr lang="en-US"/>
           </a:p>
@@ -4938,7 +4942,7 @@
           <a:p>
             <a:fld id="{9DC1F441-9BCC-4383-B80D-68C31DF95A71}" type="datetimeFigureOut">
               <a:rPr lang="en-US" smtClean="0"/>
-              <a:t>1/19/2016</a:t>
+              <a:t>1/20/2016</a:t>
             </a:fld>
             <a:endParaRPr lang="en-US"/>
           </a:p>
@@ -5218,7 +5222,7 @@
           <a:p>
             <a:fld id="{9DC1F441-9BCC-4383-B80D-68C31DF95A71}" type="datetimeFigureOut">
               <a:rPr lang="en-US" smtClean="0"/>
-              <a:t>1/19/2016</a:t>
+              <a:t>1/20/2016</a:t>
             </a:fld>
             <a:endParaRPr lang="en-US"/>
           </a:p>
@@ -5647,7 +5651,7 @@
           <a:p>
             <a:fld id="{9DC1F441-9BCC-4383-B80D-68C31DF95A71}" type="datetimeFigureOut">
               <a:rPr lang="en-US" smtClean="0"/>
-              <a:t>1/19/2016</a:t>
+              <a:t>1/20/2016</a:t>
             </a:fld>
             <a:endParaRPr lang="en-US"/>
           </a:p>
@@ -19356,21 +19360,34 @@
           <a:p>
             <a:r>
               <a:rPr lang="en-US" dirty="0" smtClean="0"/>
-              <a:t>Resetting password</a:t>
-            </a:r>
-          </a:p>
-          <a:p>
-            <a:r>
-              <a:rPr lang="en-US" dirty="0" smtClean="0"/>
-              <a:t>Different kinds of permissions</a:t>
-            </a:r>
-          </a:p>
-          <a:p>
-            <a:r>
-              <a:rPr lang="en-US" dirty="0" smtClean="0"/>
-              <a:t>Removing user</a:t>
-            </a:r>
-            <a:endParaRPr lang="en-US" dirty="0"/>
+              <a:t>Resetting </a:t>
+            </a:r>
+            <a:r>
+              <a:rPr lang="en-US" dirty="0" smtClean="0"/>
+              <a:t>password</a:t>
+            </a:r>
+          </a:p>
+          <a:p>
+            <a:r>
+              <a:rPr lang="en-US" dirty="0"/>
+              <a:t>Removing </a:t>
+            </a:r>
+            <a:r>
+              <a:rPr lang="en-US" dirty="0" smtClean="0"/>
+              <a:t>user</a:t>
+            </a:r>
+            <a:endParaRPr lang="en-US" dirty="0" smtClean="0"/>
+          </a:p>
+          <a:p>
+            <a:r>
+              <a:rPr lang="en-US" dirty="0" smtClean="0"/>
+              <a:t>Different kinds of </a:t>
+            </a:r>
+            <a:r>
+              <a:rPr lang="en-US" dirty="0" smtClean="0"/>
+              <a:t>permissions</a:t>
+            </a:r>
+            <a:endParaRPr lang="en-US" dirty="0" smtClean="0"/>
           </a:p>
         </p:txBody>
       </p:sp>
@@ -19953,11 +19970,27 @@
             </a:pPr>
             <a:r>
               <a:rPr lang="en-US" dirty="0" smtClean="0"/>
-              <a:t>Username and hostname should correspond to the user, host </a:t>
-            </a:r>
-            <a:r>
-              <a:rPr lang="en-US" smtClean="0"/>
-              <a:t>and password used </a:t>
+              <a:t>Username </a:t>
+            </a:r>
+            <a:r>
+              <a:rPr lang="en-US" dirty="0" smtClean="0"/>
+              <a:t>(-u) and </a:t>
+            </a:r>
+            <a:r>
+              <a:rPr lang="en-US" dirty="0" smtClean="0"/>
+              <a:t>hostname </a:t>
+            </a:r>
+            <a:r>
+              <a:rPr lang="en-US" dirty="0" smtClean="0"/>
+              <a:t>(-h) should </a:t>
+            </a:r>
+            <a:r>
+              <a:rPr lang="en-US" dirty="0" smtClean="0"/>
+              <a:t>correspond to the user, host and password </a:t>
+            </a:r>
+            <a:r>
+              <a:rPr lang="en-US" dirty="0" smtClean="0"/>
+              <a:t>(-p password prompt) used </a:t>
             </a:r>
             <a:r>
               <a:rPr lang="en-US" dirty="0" smtClean="0"/>
@@ -19988,6 +20021,486 @@
     <p:extLst>
       <p:ext uri="{BB962C8B-B14F-4D97-AF65-F5344CB8AC3E}">
         <p14:creationId xmlns:p14="http://schemas.microsoft.com/office/powerpoint/2010/main" val="512282959"/>
+      </p:ext>
+    </p:extLst>
+  </p:cSld>
+  <p:clrMapOvr>
+    <a:masterClrMapping/>
+  </p:clrMapOvr>
+</p:sld>
+</file>
+
+<file path=ppt/slides/slide61.xml><?xml version="1.0" encoding="utf-8"?>
+<p:sld xmlns:a="http://schemas.openxmlformats.org/drawingml/2006/main" xmlns:r="http://schemas.openxmlformats.org/officeDocument/2006/relationships" xmlns:p="http://schemas.openxmlformats.org/presentationml/2006/main">
+  <p:cSld>
+    <p:spTree>
+      <p:nvGrpSpPr>
+        <p:cNvPr id="1" name=""/>
+        <p:cNvGrpSpPr/>
+        <p:nvPr/>
+      </p:nvGrpSpPr>
+      <p:grpSpPr>
+        <a:xfrm>
+          <a:off x="0" y="0"/>
+          <a:ext cx="0" cy="0"/>
+          <a:chOff x="0" y="0"/>
+          <a:chExt cx="0" cy="0"/>
+        </a:xfrm>
+      </p:grpSpPr>
+      <p:sp>
+        <p:nvSpPr>
+          <p:cNvPr id="2" name="Title 1"/>
+          <p:cNvSpPr>
+            <a:spLocks noGrp="1"/>
+          </p:cNvSpPr>
+          <p:nvPr>
+            <p:ph type="title"/>
+          </p:nvPr>
+        </p:nvSpPr>
+        <p:spPr/>
+        <p:txBody>
+          <a:bodyPr/>
+          <a:lstStyle/>
+          <a:p>
+            <a:r>
+              <a:rPr lang="en-US" dirty="0" smtClean="0"/>
+              <a:t>Resetting password after login</a:t>
+            </a:r>
+            <a:endParaRPr lang="en-US" dirty="0"/>
+          </a:p>
+        </p:txBody>
+      </p:sp>
+      <p:sp>
+        <p:nvSpPr>
+          <p:cNvPr id="3" name="Content Placeholder 2"/>
+          <p:cNvSpPr>
+            <a:spLocks noGrp="1"/>
+          </p:cNvSpPr>
+          <p:nvPr>
+            <p:ph idx="1"/>
+          </p:nvPr>
+        </p:nvSpPr>
+        <p:spPr/>
+        <p:txBody>
+          <a:bodyPr/>
+          <a:lstStyle/>
+          <a:p>
+            <a:r>
+              <a:rPr lang="en-US" dirty="0" smtClean="0"/>
+              <a:t>An administrator may set up a default password in MySQL</a:t>
+            </a:r>
+          </a:p>
+          <a:p>
+            <a:r>
+              <a:rPr lang="en-US" dirty="0" smtClean="0"/>
+              <a:t>User can change the password using </a:t>
+            </a:r>
+          </a:p>
+          <a:p>
+            <a:pPr marL="0" indent="0">
+              <a:buNone/>
+            </a:pPr>
+            <a:endParaRPr lang="en-US" dirty="0"/>
+          </a:p>
+          <a:p>
+            <a:pPr marL="0" indent="0">
+              <a:buNone/>
+            </a:pPr>
+            <a:r>
+              <a:rPr lang="en-US" dirty="0" smtClean="0"/>
+              <a:t>SET PASSWORD = ‘</a:t>
+            </a:r>
+            <a:r>
+              <a:rPr lang="en-US" dirty="0" err="1" smtClean="0"/>
+              <a:t>my_new_password</a:t>
+            </a:r>
+            <a:r>
+              <a:rPr lang="en-US" dirty="0" smtClean="0"/>
+              <a:t>’;</a:t>
+            </a:r>
+            <a:endParaRPr lang="en-US" dirty="0"/>
+          </a:p>
+        </p:txBody>
+      </p:sp>
+    </p:spTree>
+    <p:extLst>
+      <p:ext uri="{BB962C8B-B14F-4D97-AF65-F5344CB8AC3E}">
+        <p14:creationId xmlns:p14="http://schemas.microsoft.com/office/powerpoint/2010/main" val="4157936754"/>
+      </p:ext>
+    </p:extLst>
+  </p:cSld>
+  <p:clrMapOvr>
+    <a:masterClrMapping/>
+  </p:clrMapOvr>
+</p:sld>
+</file>
+
+<file path=ppt/slides/slide62.xml><?xml version="1.0" encoding="utf-8"?>
+<p:sld xmlns:a="http://schemas.openxmlformats.org/drawingml/2006/main" xmlns:r="http://schemas.openxmlformats.org/officeDocument/2006/relationships" xmlns:p="http://schemas.openxmlformats.org/presentationml/2006/main">
+  <p:cSld>
+    <p:spTree>
+      <p:nvGrpSpPr>
+        <p:cNvPr id="1" name=""/>
+        <p:cNvGrpSpPr/>
+        <p:nvPr/>
+      </p:nvGrpSpPr>
+      <p:grpSpPr>
+        <a:xfrm>
+          <a:off x="0" y="0"/>
+          <a:ext cx="0" cy="0"/>
+          <a:chOff x="0" y="0"/>
+          <a:chExt cx="0" cy="0"/>
+        </a:xfrm>
+      </p:grpSpPr>
+      <p:sp>
+        <p:nvSpPr>
+          <p:cNvPr id="2" name="Title 1"/>
+          <p:cNvSpPr>
+            <a:spLocks noGrp="1"/>
+          </p:cNvSpPr>
+          <p:nvPr>
+            <p:ph type="title"/>
+          </p:nvPr>
+        </p:nvSpPr>
+        <p:spPr/>
+        <p:txBody>
+          <a:bodyPr/>
+          <a:lstStyle/>
+          <a:p>
+            <a:r>
+              <a:rPr lang="en-US" dirty="0" smtClean="0"/>
+              <a:t>Permissions</a:t>
+            </a:r>
+            <a:endParaRPr lang="en-US" dirty="0"/>
+          </a:p>
+        </p:txBody>
+      </p:sp>
+      <p:sp>
+        <p:nvSpPr>
+          <p:cNvPr id="3" name="Content Placeholder 2"/>
+          <p:cNvSpPr>
+            <a:spLocks noGrp="1"/>
+          </p:cNvSpPr>
+          <p:nvPr>
+            <p:ph idx="1"/>
+          </p:nvPr>
+        </p:nvSpPr>
+        <p:spPr>
+          <a:xfrm>
+            <a:off x="1103312" y="2052918"/>
+            <a:ext cx="8946541" cy="4805082"/>
+          </a:xfrm>
+        </p:spPr>
+        <p:txBody>
+          <a:bodyPr>
+            <a:normAutofit lnSpcReduction="10000"/>
+          </a:bodyPr>
+          <a:lstStyle/>
+          <a:p>
+            <a:r>
+              <a:rPr lang="en-US" dirty="0" smtClean="0"/>
+              <a:t>Over 30 different privileges</a:t>
+            </a:r>
+          </a:p>
+          <a:p>
+            <a:r>
+              <a:rPr lang="en-US" dirty="0" smtClean="0"/>
+              <a:t>Most popular ones:</a:t>
+            </a:r>
+          </a:p>
+          <a:p>
+            <a:pPr lvl="1"/>
+            <a:r>
+              <a:rPr lang="en-US" dirty="0" smtClean="0"/>
+              <a:t>ALL – give all privileges</a:t>
+            </a:r>
+          </a:p>
+          <a:p>
+            <a:pPr lvl="1"/>
+            <a:r>
+              <a:rPr lang="en-US" dirty="0" smtClean="0"/>
+              <a:t>SELECT, INSERT, DELETE, UPDATE</a:t>
+            </a:r>
+          </a:p>
+          <a:p>
+            <a:pPr lvl="1"/>
+            <a:r>
+              <a:rPr lang="en-US" dirty="0" smtClean="0"/>
+              <a:t>ALTER</a:t>
+            </a:r>
+          </a:p>
+          <a:p>
+            <a:pPr lvl="1"/>
+            <a:r>
+              <a:rPr lang="en-US" dirty="0" smtClean="0"/>
+              <a:t>EXECUTE – Execute stored proc</a:t>
+            </a:r>
+          </a:p>
+          <a:p>
+            <a:pPr lvl="1"/>
+            <a:r>
+              <a:rPr lang="en-US" dirty="0" smtClean="0"/>
+              <a:t>CREATE</a:t>
+            </a:r>
+          </a:p>
+          <a:p>
+            <a:pPr lvl="1"/>
+            <a:r>
+              <a:rPr lang="en-US" dirty="0" smtClean="0"/>
+              <a:t>DROP</a:t>
+            </a:r>
+          </a:p>
+          <a:p>
+            <a:pPr lvl="1"/>
+            <a:r>
+              <a:rPr lang="en-US" dirty="0" smtClean="0"/>
+              <a:t>TRIGGER</a:t>
+            </a:r>
+          </a:p>
+          <a:p>
+            <a:pPr lvl="1"/>
+            <a:r>
+              <a:rPr lang="en-US" dirty="0" smtClean="0"/>
+              <a:t>CREATE/SHOW VIEW</a:t>
+            </a:r>
+          </a:p>
+          <a:p>
+            <a:pPr lvl="1"/>
+            <a:r>
+              <a:rPr lang="en-US" dirty="0" smtClean="0"/>
+              <a:t>CREATE/ALTER ROUTINE – Create/Alter stored procedures/functions</a:t>
+            </a:r>
+          </a:p>
+          <a:p>
+            <a:pPr lvl="1"/>
+            <a:r>
+              <a:rPr lang="en-US" dirty="0" smtClean="0"/>
+              <a:t>PROCESS – Show MySQL </a:t>
+            </a:r>
+            <a:r>
+              <a:rPr lang="en-US" dirty="0" err="1" smtClean="0"/>
+              <a:t>processlist</a:t>
+            </a:r>
+            <a:r>
+              <a:rPr lang="en-US" dirty="0" smtClean="0"/>
+              <a:t>/threads</a:t>
+            </a:r>
+            <a:endParaRPr lang="en-US" dirty="0"/>
+          </a:p>
+        </p:txBody>
+      </p:sp>
+    </p:spTree>
+    <p:extLst>
+      <p:ext uri="{BB962C8B-B14F-4D97-AF65-F5344CB8AC3E}">
+        <p14:creationId xmlns:p14="http://schemas.microsoft.com/office/powerpoint/2010/main" val="3332371934"/>
+      </p:ext>
+    </p:extLst>
+  </p:cSld>
+  <p:clrMapOvr>
+    <a:masterClrMapping/>
+  </p:clrMapOvr>
+</p:sld>
+</file>
+
+<file path=ppt/slides/slide63.xml><?xml version="1.0" encoding="utf-8"?>
+<p:sld xmlns:a="http://schemas.openxmlformats.org/drawingml/2006/main" xmlns:r="http://schemas.openxmlformats.org/officeDocument/2006/relationships" xmlns:p="http://schemas.openxmlformats.org/presentationml/2006/main">
+  <p:cSld>
+    <p:spTree>
+      <p:nvGrpSpPr>
+        <p:cNvPr id="1" name=""/>
+        <p:cNvGrpSpPr/>
+        <p:nvPr/>
+      </p:nvGrpSpPr>
+      <p:grpSpPr>
+        <a:xfrm>
+          <a:off x="0" y="0"/>
+          <a:ext cx="0" cy="0"/>
+          <a:chOff x="0" y="0"/>
+          <a:chExt cx="0" cy="0"/>
+        </a:xfrm>
+      </p:grpSpPr>
+      <p:sp>
+        <p:nvSpPr>
+          <p:cNvPr id="2" name="Title 1"/>
+          <p:cNvSpPr>
+            <a:spLocks noGrp="1"/>
+          </p:cNvSpPr>
+          <p:nvPr>
+            <p:ph type="title"/>
+          </p:nvPr>
+        </p:nvSpPr>
+        <p:spPr/>
+        <p:txBody>
+          <a:bodyPr/>
+          <a:lstStyle/>
+          <a:p>
+            <a:r>
+              <a:rPr lang="en-US" dirty="0" smtClean="0"/>
+              <a:t>Remove a user</a:t>
+            </a:r>
+            <a:endParaRPr lang="en-US" dirty="0"/>
+          </a:p>
+        </p:txBody>
+      </p:sp>
+      <p:sp>
+        <p:nvSpPr>
+          <p:cNvPr id="3" name="Content Placeholder 2"/>
+          <p:cNvSpPr>
+            <a:spLocks noGrp="1"/>
+          </p:cNvSpPr>
+          <p:nvPr>
+            <p:ph idx="1"/>
+          </p:nvPr>
+        </p:nvSpPr>
+        <p:spPr/>
+        <p:txBody>
+          <a:bodyPr/>
+          <a:lstStyle/>
+          <a:p>
+            <a:r>
+              <a:rPr lang="en-US" dirty="0" smtClean="0"/>
+              <a:t>When a person is no longer with the company or does not need to access a database, user can be carefully removed</a:t>
+            </a:r>
+          </a:p>
+          <a:p>
+            <a:r>
+              <a:rPr lang="en-US" dirty="0" smtClean="0"/>
+              <a:t>Always note down the GRANTS for that user before dropping </a:t>
+            </a:r>
+          </a:p>
+          <a:p>
+            <a:pPr marL="0" indent="0">
+              <a:buNone/>
+            </a:pPr>
+            <a:endParaRPr lang="en-US" dirty="0"/>
+          </a:p>
+          <a:p>
+            <a:pPr marL="0" indent="0">
+              <a:buNone/>
+            </a:pPr>
+            <a:r>
+              <a:rPr lang="en-US" dirty="0" smtClean="0"/>
+              <a:t>SHOW GRANTS FOR ‘</a:t>
+            </a:r>
+            <a:r>
+              <a:rPr lang="en-US" dirty="0" err="1" smtClean="0"/>
+              <a:t>jose</a:t>
+            </a:r>
+            <a:r>
+              <a:rPr lang="en-US" dirty="0" smtClean="0"/>
+              <a:t>’@’localhost’;</a:t>
+            </a:r>
+          </a:p>
+          <a:p>
+            <a:pPr marL="0" indent="0">
+              <a:buNone/>
+            </a:pPr>
+            <a:r>
+              <a:rPr lang="en-US" dirty="0" smtClean="0"/>
+              <a:t>DROP USER ‘</a:t>
+            </a:r>
+            <a:r>
+              <a:rPr lang="en-US" dirty="0" err="1" smtClean="0"/>
+              <a:t>jose</a:t>
+            </a:r>
+            <a:r>
+              <a:rPr lang="en-US" dirty="0" smtClean="0"/>
+              <a:t>’@’localhost’;</a:t>
+            </a:r>
+            <a:endParaRPr lang="en-US" dirty="0"/>
+          </a:p>
+        </p:txBody>
+      </p:sp>
+    </p:spTree>
+    <p:extLst>
+      <p:ext uri="{BB962C8B-B14F-4D97-AF65-F5344CB8AC3E}">
+        <p14:creationId xmlns:p14="http://schemas.microsoft.com/office/powerpoint/2010/main" val="4093040127"/>
+      </p:ext>
+    </p:extLst>
+  </p:cSld>
+  <p:clrMapOvr>
+    <a:masterClrMapping/>
+  </p:clrMapOvr>
+</p:sld>
+</file>
+
+<file path=ppt/slides/slide64.xml><?xml version="1.0" encoding="utf-8"?>
+<p:sld xmlns:a="http://schemas.openxmlformats.org/drawingml/2006/main" xmlns:r="http://schemas.openxmlformats.org/officeDocument/2006/relationships" xmlns:p="http://schemas.openxmlformats.org/presentationml/2006/main">
+  <p:cSld>
+    <p:spTree>
+      <p:nvGrpSpPr>
+        <p:cNvPr id="1" name=""/>
+        <p:cNvGrpSpPr/>
+        <p:nvPr/>
+      </p:nvGrpSpPr>
+      <p:grpSpPr>
+        <a:xfrm>
+          <a:off x="0" y="0"/>
+          <a:ext cx="0" cy="0"/>
+          <a:chOff x="0" y="0"/>
+          <a:chExt cx="0" cy="0"/>
+        </a:xfrm>
+      </p:grpSpPr>
+      <p:sp>
+        <p:nvSpPr>
+          <p:cNvPr id="2" name="Title 1"/>
+          <p:cNvSpPr>
+            <a:spLocks noGrp="1"/>
+          </p:cNvSpPr>
+          <p:nvPr>
+            <p:ph type="title"/>
+          </p:nvPr>
+        </p:nvSpPr>
+        <p:spPr/>
+        <p:txBody>
+          <a:bodyPr/>
+          <a:lstStyle/>
+          <a:p>
+            <a:r>
+              <a:rPr lang="en-US" dirty="0" smtClean="0"/>
+              <a:t>Day 12:</a:t>
+            </a:r>
+            <a:endParaRPr lang="en-US" dirty="0"/>
+          </a:p>
+        </p:txBody>
+      </p:sp>
+      <p:sp>
+        <p:nvSpPr>
+          <p:cNvPr id="3" name="Content Placeholder 2"/>
+          <p:cNvSpPr>
+            <a:spLocks noGrp="1"/>
+          </p:cNvSpPr>
+          <p:nvPr>
+            <p:ph idx="1"/>
+          </p:nvPr>
+        </p:nvSpPr>
+        <p:spPr/>
+        <p:txBody>
+          <a:bodyPr/>
+          <a:lstStyle/>
+          <a:p>
+            <a:r>
+              <a:rPr lang="en-US" dirty="0" smtClean="0"/>
+              <a:t>Setting correct permissions</a:t>
+            </a:r>
+          </a:p>
+          <a:p>
+            <a:r>
+              <a:rPr lang="en-US" dirty="0" smtClean="0"/>
+              <a:t>Hardening the </a:t>
+            </a:r>
+            <a:r>
+              <a:rPr lang="en-US" smtClean="0"/>
+              <a:t>database server</a:t>
+            </a:r>
+            <a:endParaRPr lang="en-US"/>
+          </a:p>
+        </p:txBody>
+      </p:sp>
+    </p:spTree>
+    <p:extLst>
+      <p:ext uri="{BB962C8B-B14F-4D97-AF65-F5344CB8AC3E}">
+        <p14:creationId xmlns:p14="http://schemas.microsoft.com/office/powerpoint/2010/main" val="519937272"/>
       </p:ext>
     </p:extLst>
   </p:cSld>

</xml_diff>